<commit_message>
Add fctp-typ (like in DDM); update readmes
</commit_message>
<xml_diff>
--- a/spec/InformationStructure/diagrams/InformationStructure.pptx
+++ b/spec/InformationStructure/diagrams/InformationStructure.pptx
@@ -201,7 +201,7 @@
           <a:p>
             <a:fld id="{37CCF725-7468-4D3D-9E24-A16745BBBA77}" type="datetimeFigureOut">
               <a:rPr lang="de-DE" smtClean="0"/>
-              <a:t>22.06.2025</a:t>
+              <a:t>27.06.2025</a:t>
             </a:fld>
             <a:endParaRPr lang="de-DE"/>
           </a:p>
@@ -688,7 +688,7 @@
           <a:p>
             <a:fld id="{9A2764DB-E7DF-4EA7-A1AF-05A77C280FCA}" type="datetimeFigureOut">
               <a:rPr lang="de-DE" smtClean="0"/>
-              <a:t>22.06.2025</a:t>
+              <a:t>27.06.2025</a:t>
             </a:fld>
             <a:endParaRPr lang="de-DE"/>
           </a:p>
@@ -858,7 +858,7 @@
           <a:p>
             <a:fld id="{9A2764DB-E7DF-4EA7-A1AF-05A77C280FCA}" type="datetimeFigureOut">
               <a:rPr lang="de-DE" smtClean="0"/>
-              <a:t>22.06.2025</a:t>
+              <a:t>27.06.2025</a:t>
             </a:fld>
             <a:endParaRPr lang="de-DE"/>
           </a:p>
@@ -1038,7 +1038,7 @@
           <a:p>
             <a:fld id="{9A2764DB-E7DF-4EA7-A1AF-05A77C280FCA}" type="datetimeFigureOut">
               <a:rPr lang="de-DE" smtClean="0"/>
-              <a:t>22.06.2025</a:t>
+              <a:t>27.06.2025</a:t>
             </a:fld>
             <a:endParaRPr lang="de-DE"/>
           </a:p>
@@ -1208,7 +1208,7 @@
           <a:p>
             <a:fld id="{9A2764DB-E7DF-4EA7-A1AF-05A77C280FCA}" type="datetimeFigureOut">
               <a:rPr lang="de-DE" smtClean="0"/>
-              <a:t>22.06.2025</a:t>
+              <a:t>27.06.2025</a:t>
             </a:fld>
             <a:endParaRPr lang="de-DE"/>
           </a:p>
@@ -1454,7 +1454,7 @@
           <a:p>
             <a:fld id="{9A2764DB-E7DF-4EA7-A1AF-05A77C280FCA}" type="datetimeFigureOut">
               <a:rPr lang="de-DE" smtClean="0"/>
-              <a:t>22.06.2025</a:t>
+              <a:t>27.06.2025</a:t>
             </a:fld>
             <a:endParaRPr lang="de-DE"/>
           </a:p>
@@ -1686,7 +1686,7 @@
           <a:p>
             <a:fld id="{9A2764DB-E7DF-4EA7-A1AF-05A77C280FCA}" type="datetimeFigureOut">
               <a:rPr lang="de-DE" smtClean="0"/>
-              <a:t>22.06.2025</a:t>
+              <a:t>27.06.2025</a:t>
             </a:fld>
             <a:endParaRPr lang="de-DE"/>
           </a:p>
@@ -2053,7 +2053,7 @@
           <a:p>
             <a:fld id="{9A2764DB-E7DF-4EA7-A1AF-05A77C280FCA}" type="datetimeFigureOut">
               <a:rPr lang="de-DE" smtClean="0"/>
-              <a:t>22.06.2025</a:t>
+              <a:t>27.06.2025</a:t>
             </a:fld>
             <a:endParaRPr lang="de-DE"/>
           </a:p>
@@ -2171,7 +2171,7 @@
           <a:p>
             <a:fld id="{9A2764DB-E7DF-4EA7-A1AF-05A77C280FCA}" type="datetimeFigureOut">
               <a:rPr lang="de-DE" smtClean="0"/>
-              <a:t>22.06.2025</a:t>
+              <a:t>27.06.2025</a:t>
             </a:fld>
             <a:endParaRPr lang="de-DE"/>
           </a:p>
@@ -2266,7 +2266,7 @@
           <a:p>
             <a:fld id="{9A2764DB-E7DF-4EA7-A1AF-05A77C280FCA}" type="datetimeFigureOut">
               <a:rPr lang="de-DE" smtClean="0"/>
-              <a:t>22.06.2025</a:t>
+              <a:t>27.06.2025</a:t>
             </a:fld>
             <a:endParaRPr lang="de-DE"/>
           </a:p>
@@ -2543,7 +2543,7 @@
           <a:p>
             <a:fld id="{9A2764DB-E7DF-4EA7-A1AF-05A77C280FCA}" type="datetimeFigureOut">
               <a:rPr lang="de-DE" smtClean="0"/>
-              <a:t>22.06.2025</a:t>
+              <a:t>27.06.2025</a:t>
             </a:fld>
             <a:endParaRPr lang="de-DE"/>
           </a:p>
@@ -2800,7 +2800,7 @@
           <a:p>
             <a:fld id="{9A2764DB-E7DF-4EA7-A1AF-05A77C280FCA}" type="datetimeFigureOut">
               <a:rPr lang="de-DE" smtClean="0"/>
-              <a:t>22.06.2025</a:t>
+              <a:t>27.06.2025</a:t>
             </a:fld>
             <a:endParaRPr lang="de-DE"/>
           </a:p>
@@ -3013,7 +3013,7 @@
           <a:p>
             <a:fld id="{9A2764DB-E7DF-4EA7-A1AF-05A77C280FCA}" type="datetimeFigureOut">
               <a:rPr lang="de-DE" smtClean="0"/>
-              <a:t>22.06.2025</a:t>
+              <a:t>27.06.2025</a:t>
             </a:fld>
             <a:endParaRPr lang="de-DE"/>
           </a:p>
@@ -12089,7 +12089,7 @@
         <p:spPr>
           <a:xfrm>
             <a:off x="31971861" y="9080029"/>
-            <a:ext cx="461372" cy="127304"/>
+            <a:ext cx="461372" cy="136829"/>
           </a:xfrm>
           <a:prstGeom prst="straightConnector1">
             <a:avLst/>
@@ -12121,7 +12121,7 @@
         <p:spPr>
           <a:xfrm>
             <a:off x="32433233" y="8851566"/>
-            <a:ext cx="2142517" cy="711534"/>
+            <a:ext cx="2142517" cy="730584"/>
           </a:xfrm>
           <a:prstGeom prst="rect">
             <a:avLst/>
@@ -14121,6 +14121,15 @@
               <a:latin typeface="Calibri" panose="020F0502020204030204"/>
             </a:endParaRPr>
           </a:p>
+          <a:p>
+            <a:pPr defTabSz="914411"/>
+            <a:endParaRPr lang="en-US" sz="800" kern="0" noProof="0" dirty="0">
+              <a:solidFill>
+                <a:prstClr val="black"/>
+              </a:solidFill>
+              <a:latin typeface="Calibri" panose="020F0502020204030204"/>
+            </a:endParaRPr>
+          </a:p>
         </p:txBody>
       </p:sp>
       <p:cxnSp>
@@ -14195,6 +14204,173 @@
           <a:effectLst/>
         </p:spPr>
       </p:cxnSp>
+      <p:sp>
+        <p:nvSpPr>
+          <p:cNvPr id="6" name="Rechteck 5">
+            <a:extLst>
+              <a:ext uri="{FF2B5EF4-FFF2-40B4-BE49-F238E27FC236}">
+                <a16:creationId xmlns:a16="http://schemas.microsoft.com/office/drawing/2014/main" id="{3B38907F-0312-01DA-5864-D7DE075718B8}"/>
+              </a:ext>
+            </a:extLst>
+          </p:cNvPr>
+          <p:cNvSpPr/>
+          <p:nvPr/>
+        </p:nvSpPr>
+        <p:spPr>
+          <a:xfrm>
+            <a:off x="34072513" y="12945943"/>
+            <a:ext cx="1152525" cy="377333"/>
+          </a:xfrm>
+          <a:prstGeom prst="rect">
+            <a:avLst/>
+          </a:prstGeom>
+          <a:solidFill>
+            <a:sysClr val="window" lastClr="FFFFFF"/>
+          </a:solidFill>
+          <a:ln w="12700" cap="flat" cmpd="sng" algn="ctr">
+            <a:solidFill>
+              <a:srgbClr val="A5A5A5"/>
+            </a:solidFill>
+            <a:prstDash val="solid"/>
+            <a:miter lim="800000"/>
+          </a:ln>
+          <a:effectLst/>
+        </p:spPr>
+        <p:txBody>
+          <a:bodyPr lIns="36000" tIns="36000" rIns="36000" bIns="36000" rtlCol="0" anchor="t"/>
+          <a:lstStyle/>
+          <a:p>
+            <a:pPr defTabSz="914411"/>
+            <a:r>
+              <a:rPr lang="de-DE" sz="800" kern="0" dirty="0" err="1">
+                <a:solidFill>
+                  <a:prstClr val="black"/>
+                </a:solidFill>
+                <a:highlight>
+                  <a:srgbClr val="FFFF00"/>
+                </a:highlight>
+                <a:latin typeface="Calibri" panose="020F0502020204030204"/>
+              </a:rPr>
+              <a:t>netconf</a:t>
+            </a:r>
+            <a:r>
+              <a:rPr lang="de-DE" sz="800" kern="0" dirty="0">
+                <a:solidFill>
+                  <a:prstClr val="black"/>
+                </a:solidFill>
+                <a:highlight>
+                  <a:srgbClr val="FFFF00"/>
+                </a:highlight>
+                <a:latin typeface="Calibri" panose="020F0502020204030204"/>
+              </a:rPr>
+              <a:t>-user-name</a:t>
+            </a:r>
+          </a:p>
+          <a:p>
+            <a:pPr defTabSz="914411"/>
+            <a:r>
+              <a:rPr lang="de-DE" sz="800" kern="0" dirty="0" err="1">
+                <a:solidFill>
+                  <a:prstClr val="black"/>
+                </a:solidFill>
+                <a:highlight>
+                  <a:srgbClr val="FFFF00"/>
+                </a:highlight>
+                <a:latin typeface="Calibri" panose="020F0502020204030204"/>
+              </a:rPr>
+              <a:t>netconf</a:t>
+            </a:r>
+            <a:r>
+              <a:rPr lang="de-DE" sz="800" kern="0" dirty="0">
+                <a:solidFill>
+                  <a:prstClr val="black"/>
+                </a:solidFill>
+                <a:highlight>
+                  <a:srgbClr val="FFFF00"/>
+                </a:highlight>
+                <a:latin typeface="Calibri" panose="020F0502020204030204"/>
+              </a:rPr>
+              <a:t>-password</a:t>
+            </a:r>
+          </a:p>
+        </p:txBody>
+      </p:sp>
+      <p:sp>
+        <p:nvSpPr>
+          <p:cNvPr id="7" name="Rechteck 6">
+            <a:extLst>
+              <a:ext uri="{FF2B5EF4-FFF2-40B4-BE49-F238E27FC236}">
+                <a16:creationId xmlns:a16="http://schemas.microsoft.com/office/drawing/2014/main" id="{7989F072-8ED3-A4C9-75E2-79DA69C1E583}"/>
+              </a:ext>
+            </a:extLst>
+          </p:cNvPr>
+          <p:cNvSpPr/>
+          <p:nvPr/>
+        </p:nvSpPr>
+        <p:spPr>
+          <a:xfrm>
+            <a:off x="24197602" y="13830805"/>
+            <a:ext cx="1152525" cy="377333"/>
+          </a:xfrm>
+          <a:prstGeom prst="rect">
+            <a:avLst/>
+          </a:prstGeom>
+          <a:solidFill>
+            <a:sysClr val="window" lastClr="FFFFFF"/>
+          </a:solidFill>
+          <a:ln w="12700" cap="flat" cmpd="sng" algn="ctr">
+            <a:solidFill>
+              <a:srgbClr val="A5A5A5"/>
+            </a:solidFill>
+            <a:prstDash val="solid"/>
+            <a:miter lim="800000"/>
+          </a:ln>
+          <a:effectLst/>
+        </p:spPr>
+        <p:txBody>
+          <a:bodyPr lIns="36000" tIns="36000" rIns="36000" bIns="36000" rtlCol="0" anchor="t"/>
+          <a:lstStyle/>
+          <a:p>
+            <a:pPr defTabSz="914411"/>
+            <a:r>
+              <a:rPr lang="de-DE" sz="800" kern="0" dirty="0">
+                <a:solidFill>
+                  <a:prstClr val="black"/>
+                </a:solidFill>
+                <a:highlight>
+                  <a:srgbClr val="FF0000"/>
+                </a:highlight>
+                <a:latin typeface="Calibri" panose="020F0502020204030204"/>
+              </a:rPr>
+              <a:t>user-name</a:t>
+            </a:r>
+          </a:p>
+          <a:p>
+            <a:pPr defTabSz="914411"/>
+            <a:r>
+              <a:rPr lang="de-DE" sz="800" kern="0" dirty="0" err="1">
+                <a:solidFill>
+                  <a:prstClr val="black"/>
+                </a:solidFill>
+                <a:highlight>
+                  <a:srgbClr val="FF0000"/>
+                </a:highlight>
+                <a:latin typeface="Calibri" panose="020F0502020204030204"/>
+              </a:rPr>
+              <a:t>password</a:t>
+            </a:r>
+            <a:endParaRPr lang="de-DE" sz="800" kern="0" dirty="0">
+              <a:solidFill>
+                <a:prstClr val="black"/>
+              </a:solidFill>
+              <a:highlight>
+                <a:srgbClr val="FF0000"/>
+              </a:highlight>
+              <a:latin typeface="Calibri" panose="020F0502020204030204"/>
+            </a:endParaRPr>
+          </a:p>
+        </p:txBody>
+      </p:sp>
     </p:spTree>
     <p:extLst>
       <p:ext uri="{BB962C8B-B14F-4D97-AF65-F5344CB8AC3E}">

</xml_diff>

<commit_message>
Add UseCases, Add +-Controller services, add level between currentAlarms und affectedFc
</commit_message>
<xml_diff>
--- a/spec/InformationStructure/diagrams/InformationStructure.pptx
+++ b/spec/InformationStructure/diagrams/InformationStructure.pptx
@@ -201,7 +201,7 @@
           <a:p>
             <a:fld id="{37CCF725-7468-4D3D-9E24-A16745BBBA77}" type="datetimeFigureOut">
               <a:rPr lang="de-DE" smtClean="0"/>
-              <a:t>27.06.2025</a:t>
+              <a:t>30.06.2025</a:t>
             </a:fld>
             <a:endParaRPr lang="de-DE"/>
           </a:p>
@@ -688,7 +688,7 @@
           <a:p>
             <a:fld id="{9A2764DB-E7DF-4EA7-A1AF-05A77C280FCA}" type="datetimeFigureOut">
               <a:rPr lang="de-DE" smtClean="0"/>
-              <a:t>27.06.2025</a:t>
+              <a:t>30.06.2025</a:t>
             </a:fld>
             <a:endParaRPr lang="de-DE"/>
           </a:p>
@@ -858,7 +858,7 @@
           <a:p>
             <a:fld id="{9A2764DB-E7DF-4EA7-A1AF-05A77C280FCA}" type="datetimeFigureOut">
               <a:rPr lang="de-DE" smtClean="0"/>
-              <a:t>27.06.2025</a:t>
+              <a:t>30.06.2025</a:t>
             </a:fld>
             <a:endParaRPr lang="de-DE"/>
           </a:p>
@@ -1038,7 +1038,7 @@
           <a:p>
             <a:fld id="{9A2764DB-E7DF-4EA7-A1AF-05A77C280FCA}" type="datetimeFigureOut">
               <a:rPr lang="de-DE" smtClean="0"/>
-              <a:t>27.06.2025</a:t>
+              <a:t>30.06.2025</a:t>
             </a:fld>
             <a:endParaRPr lang="de-DE"/>
           </a:p>
@@ -1208,7 +1208,7 @@
           <a:p>
             <a:fld id="{9A2764DB-E7DF-4EA7-A1AF-05A77C280FCA}" type="datetimeFigureOut">
               <a:rPr lang="de-DE" smtClean="0"/>
-              <a:t>27.06.2025</a:t>
+              <a:t>30.06.2025</a:t>
             </a:fld>
             <a:endParaRPr lang="de-DE"/>
           </a:p>
@@ -1454,7 +1454,7 @@
           <a:p>
             <a:fld id="{9A2764DB-E7DF-4EA7-A1AF-05A77C280FCA}" type="datetimeFigureOut">
               <a:rPr lang="de-DE" smtClean="0"/>
-              <a:t>27.06.2025</a:t>
+              <a:t>30.06.2025</a:t>
             </a:fld>
             <a:endParaRPr lang="de-DE"/>
           </a:p>
@@ -1686,7 +1686,7 @@
           <a:p>
             <a:fld id="{9A2764DB-E7DF-4EA7-A1AF-05A77C280FCA}" type="datetimeFigureOut">
               <a:rPr lang="de-DE" smtClean="0"/>
-              <a:t>27.06.2025</a:t>
+              <a:t>30.06.2025</a:t>
             </a:fld>
             <a:endParaRPr lang="de-DE"/>
           </a:p>
@@ -2053,7 +2053,7 @@
           <a:p>
             <a:fld id="{9A2764DB-E7DF-4EA7-A1AF-05A77C280FCA}" type="datetimeFigureOut">
               <a:rPr lang="de-DE" smtClean="0"/>
-              <a:t>27.06.2025</a:t>
+              <a:t>30.06.2025</a:t>
             </a:fld>
             <a:endParaRPr lang="de-DE"/>
           </a:p>
@@ -2171,7 +2171,7 @@
           <a:p>
             <a:fld id="{9A2764DB-E7DF-4EA7-A1AF-05A77C280FCA}" type="datetimeFigureOut">
               <a:rPr lang="de-DE" smtClean="0"/>
-              <a:t>27.06.2025</a:t>
+              <a:t>30.06.2025</a:t>
             </a:fld>
             <a:endParaRPr lang="de-DE"/>
           </a:p>
@@ -2266,7 +2266,7 @@
           <a:p>
             <a:fld id="{9A2764DB-E7DF-4EA7-A1AF-05A77C280FCA}" type="datetimeFigureOut">
               <a:rPr lang="de-DE" smtClean="0"/>
-              <a:t>27.06.2025</a:t>
+              <a:t>30.06.2025</a:t>
             </a:fld>
             <a:endParaRPr lang="de-DE"/>
           </a:p>
@@ -2543,7 +2543,7 @@
           <a:p>
             <a:fld id="{9A2764DB-E7DF-4EA7-A1AF-05A77C280FCA}" type="datetimeFigureOut">
               <a:rPr lang="de-DE" smtClean="0"/>
-              <a:t>27.06.2025</a:t>
+              <a:t>30.06.2025</a:t>
             </a:fld>
             <a:endParaRPr lang="de-DE"/>
           </a:p>
@@ -2800,7 +2800,7 @@
           <a:p>
             <a:fld id="{9A2764DB-E7DF-4EA7-A1AF-05A77C280FCA}" type="datetimeFigureOut">
               <a:rPr lang="de-DE" smtClean="0"/>
-              <a:t>27.06.2025</a:t>
+              <a:t>30.06.2025</a:t>
             </a:fld>
             <a:endParaRPr lang="de-DE"/>
           </a:p>
@@ -3013,7 +3013,7 @@
           <a:p>
             <a:fld id="{9A2764DB-E7DF-4EA7-A1AF-05A77C280FCA}" type="datetimeFigureOut">
               <a:rPr lang="de-DE" smtClean="0"/>
-              <a:t>27.06.2025</a:t>
+              <a:t>30.06.2025</a:t>
             </a:fld>
             <a:endParaRPr lang="de-DE"/>
           </a:p>
@@ -3857,10 +3857,24 @@
               </a:rPr>
               <a:t>ManagementDomain</a:t>
             </a:r>
+            <a:r>
+              <a:rPr lang="en-US" sz="1400" noProof="0" dirty="0" err="1">
+                <a:solidFill>
+                  <a:schemeClr val="tx1"/>
+                </a:solidFill>
+                <a:highlight>
+                  <a:srgbClr val="FFFF00"/>
+                </a:highlight>
+              </a:rPr>
+              <a:t>Interface</a:t>
+            </a:r>
             <a:endParaRPr lang="en-US" sz="1400" noProof="0" dirty="0">
               <a:solidFill>
                 <a:schemeClr val="tx1"/>
               </a:solidFill>
+              <a:highlight>
+                <a:srgbClr val="FFFF00"/>
+              </a:highlight>
             </a:endParaRPr>
           </a:p>
         </p:txBody>
@@ -4905,7 +4919,7 @@
         </p:nvCxnSpPr>
         <p:spPr>
           <a:xfrm flipH="1">
-            <a:off x="9465590" y="6022705"/>
+            <a:off x="9465590" y="6022704"/>
             <a:ext cx="1363" cy="595289"/>
           </a:xfrm>
           <a:prstGeom prst="straightConnector1">
@@ -4976,7 +4990,58 @@
                 </a:solidFill>
                 <a:latin typeface="Calibri" panose="020F0502020204030204"/>
               </a:rPr>
-              <a:t>=management-plane-transport</a:t>
+              <a:t>=</a:t>
+            </a:r>
+            <a:r>
+              <a:rPr lang="en-US" sz="800" strike="sngStrike" kern="0" noProof="0" dirty="0">
+                <a:solidFill>
+                  <a:prstClr val="black"/>
+                </a:solidFill>
+                <a:highlight>
+                  <a:srgbClr val="FFFF00"/>
+                </a:highlight>
+                <a:latin typeface="Calibri" panose="020F0502020204030204"/>
+              </a:rPr>
+              <a:t>management-plane-transport</a:t>
+            </a:r>
+          </a:p>
+          <a:p>
+            <a:pPr defTabSz="914411"/>
+            <a:r>
+              <a:rPr lang="en-US" sz="800" kern="0" noProof="0" dirty="0">
+                <a:solidFill>
+                  <a:prstClr val="black"/>
+                </a:solidFill>
+                <a:highlight>
+                  <a:srgbClr val="FFFF00"/>
+                </a:highlight>
+                <a:latin typeface="Calibri" panose="020F0502020204030204"/>
+              </a:rPr>
+              <a:t>[</a:t>
+            </a:r>
+            <a:r>
+              <a:rPr lang="en-US" sz="800" kern="0" noProof="0" dirty="0" err="1">
+                <a:solidFill>
+                  <a:prstClr val="black"/>
+                </a:solidFill>
+                <a:highlight>
+                  <a:srgbClr val="FFFF00"/>
+                </a:highlight>
+                <a:latin typeface="Calibri" panose="020F0502020204030204"/>
+              </a:rPr>
+              <a:t>managementDomain</a:t>
+            </a:r>
+            <a:r>
+              <a:rPr lang="en-US" sz="800" kern="0" noProof="0" dirty="0">
+                <a:solidFill>
+                  <a:prstClr val="black"/>
+                </a:solidFill>
+                <a:highlight>
+                  <a:srgbClr val="FFFF00"/>
+                </a:highlight>
+                <a:latin typeface="Calibri" panose="020F0502020204030204"/>
+              </a:rPr>
+              <a:t>]</a:t>
             </a:r>
           </a:p>
         </p:txBody>
@@ -7466,8 +7531,8 @@
         </p:nvSpPr>
         <p:spPr>
           <a:xfrm>
-            <a:off x="13164512" y="1452498"/>
-            <a:ext cx="1003929" cy="822136"/>
+            <a:off x="13164512" y="1452497"/>
+            <a:ext cx="2316788" cy="879149"/>
           </a:xfrm>
           <a:prstGeom prst="rect">
             <a:avLst/>
@@ -7494,9 +7559,63 @@
                 <a:solidFill>
                   <a:prstClr val="black"/>
                 </a:solidFill>
+                <a:highlight>
+                  <a:srgbClr val="FFFF00"/>
+                </a:highlight>
+                <a:latin typeface="Calibri" panose="020F0502020204030204"/>
+              </a:rPr>
+              <a:t>affected-management-domain</a:t>
+            </a:r>
+          </a:p>
+          <a:p>
+            <a:pPr defTabSz="914411"/>
+            <a:r>
+              <a:rPr lang="en-US" sz="800" strike="sngStrike" kern="0" noProof="0" dirty="0">
+                <a:solidFill>
+                  <a:prstClr val="black"/>
+                </a:solidFill>
+                <a:highlight>
+                  <a:srgbClr val="FFFF00"/>
+                </a:highlight>
                 <a:latin typeface="Calibri" panose="020F0502020204030204"/>
               </a:rPr>
               <a:t>affected-fc</a:t>
+            </a:r>
+            <a:r>
+              <a:rPr lang="en-US" sz="800" kern="0" noProof="0" dirty="0">
+                <a:solidFill>
+                  <a:prstClr val="black"/>
+                </a:solidFill>
+                <a:highlight>
+                  <a:srgbClr val="FFFF00"/>
+                </a:highlight>
+                <a:latin typeface="Calibri" panose="020F0502020204030204"/>
+              </a:rPr>
+              <a:t>  affected-management-</a:t>
+            </a:r>
+            <a:r>
+              <a:rPr lang="en-US" sz="800" kern="0" dirty="0">
+                <a:solidFill>
+                  <a:prstClr val="black"/>
+                </a:solidFill>
+                <a:highlight>
+                  <a:srgbClr val="FFFF00"/>
+                </a:highlight>
+                <a:latin typeface="Calibri" panose="020F0502020204030204"/>
+              </a:rPr>
+              <a:t>p</a:t>
+            </a:r>
+            <a:r>
+              <a:rPr lang="en-US" sz="800" kern="0" noProof="0" dirty="0">
+                <a:solidFill>
+                  <a:prstClr val="black"/>
+                </a:solidFill>
+                <a:highlight>
+                  <a:srgbClr val="FFFF00"/>
+                </a:highlight>
+                <a:latin typeface="Calibri" panose="020F0502020204030204"/>
+              </a:rPr>
+              <a:t>lane-transport</a:t>
             </a:r>
           </a:p>
           <a:p>
@@ -7621,8 +7740,8 @@
         </p:nvCxnSpPr>
         <p:spPr>
           <a:xfrm>
-            <a:off x="12377664" y="1768372"/>
-            <a:ext cx="786849" cy="95190"/>
+            <a:off x="12377664" y="1768373"/>
+            <a:ext cx="786848" cy="123699"/>
           </a:xfrm>
           <a:prstGeom prst="straightConnector1">
             <a:avLst/>
@@ -14218,7 +14337,7 @@
         </p:nvSpPr>
         <p:spPr>
           <a:xfrm>
-            <a:off x="34072513" y="12945943"/>
+            <a:off x="34058226" y="12941180"/>
             <a:ext cx="1152525" cy="377333"/>
           </a:xfrm>
           <a:prstGeom prst="rect">
@@ -14247,7 +14366,7 @@
                   <a:prstClr val="black"/>
                 </a:solidFill>
                 <a:highlight>
-                  <a:srgbClr val="FFFF00"/>
+                  <a:srgbClr val="FF0000"/>
                 </a:highlight>
                 <a:latin typeface="Calibri" panose="020F0502020204030204"/>
               </a:rPr>
@@ -14259,7 +14378,7 @@
                   <a:prstClr val="black"/>
                 </a:solidFill>
                 <a:highlight>
-                  <a:srgbClr val="FFFF00"/>
+                  <a:srgbClr val="FF0000"/>
                 </a:highlight>
                 <a:latin typeface="Calibri" panose="020F0502020204030204"/>
               </a:rPr>
@@ -14274,7 +14393,7 @@
                   <a:prstClr val="black"/>
                 </a:solidFill>
                 <a:highlight>
-                  <a:srgbClr val="FFFF00"/>
+                  <a:srgbClr val="FF0000"/>
                 </a:highlight>
                 <a:latin typeface="Calibri" panose="020F0502020204030204"/>
               </a:rPr>
@@ -14286,7 +14405,7 @@
                   <a:prstClr val="black"/>
                 </a:solidFill>
                 <a:highlight>
-                  <a:srgbClr val="FFFF00"/>
+                  <a:srgbClr val="FF0000"/>
                 </a:highlight>
                 <a:latin typeface="Calibri" panose="020F0502020204030204"/>
               </a:rPr>
@@ -14297,10 +14416,10 @@
       </p:sp>
       <p:sp>
         <p:nvSpPr>
-          <p:cNvPr id="7" name="Rechteck 6">
-            <a:extLst>
-              <a:ext uri="{FF2B5EF4-FFF2-40B4-BE49-F238E27FC236}">
-                <a16:creationId xmlns:a16="http://schemas.microsoft.com/office/drawing/2014/main" id="{7989F072-8ED3-A4C9-75E2-79DA69C1E583}"/>
+          <p:cNvPr id="44" name="Rechteck 43">
+            <a:extLst>
+              <a:ext uri="{FF2B5EF4-FFF2-40B4-BE49-F238E27FC236}">
+                <a16:creationId xmlns:a16="http://schemas.microsoft.com/office/drawing/2014/main" id="{07802AC0-A710-B932-87CA-591EE43204B4}"/>
               </a:ext>
             </a:extLst>
           </p:cNvPr>
@@ -14309,7 +14428,7 @@
         </p:nvSpPr>
         <p:spPr>
           <a:xfrm>
-            <a:off x="24197602" y="13830805"/>
+            <a:off x="23766984" y="13810589"/>
             <a:ext cx="1152525" cy="377333"/>
           </a:xfrm>
           <a:prstGeom prst="rect">
@@ -14333,7 +14452,7 @@
           <a:p>
             <a:pPr defTabSz="914411"/>
             <a:r>
-              <a:rPr lang="de-DE" sz="800" kern="0" dirty="0">
+              <a:rPr lang="de-DE" sz="800" kern="0" dirty="0" err="1">
                 <a:solidFill>
                   <a:prstClr val="black"/>
                 </a:solidFill>
@@ -14342,13 +14461,10 @@
                 </a:highlight>
                 <a:latin typeface="Calibri" panose="020F0502020204030204"/>
               </a:rPr>
-              <a:t>user-name</a:t>
-            </a:r>
-          </a:p>
-          <a:p>
-            <a:pPr defTabSz="914411"/>
-            <a:r>
-              <a:rPr lang="de-DE" sz="800" kern="0" dirty="0" err="1">
+              <a:t>netconf</a:t>
+            </a:r>
+            <a:r>
+              <a:rPr lang="de-DE" sz="800" kern="0" dirty="0">
                 <a:solidFill>
                   <a:prstClr val="black"/>
                 </a:solidFill>
@@ -14357,17 +14473,35 @@
                 </a:highlight>
                 <a:latin typeface="Calibri" panose="020F0502020204030204"/>
               </a:rPr>
-              <a:t>password</a:t>
-            </a:r>
-            <a:endParaRPr lang="de-DE" sz="800" kern="0" dirty="0">
-              <a:solidFill>
-                <a:prstClr val="black"/>
-              </a:solidFill>
-              <a:highlight>
-                <a:srgbClr val="FF0000"/>
-              </a:highlight>
-              <a:latin typeface="Calibri" panose="020F0502020204030204"/>
-            </a:endParaRPr>
+              <a:t>-user-name</a:t>
+            </a:r>
+          </a:p>
+          <a:p>
+            <a:pPr defTabSz="914411"/>
+            <a:r>
+              <a:rPr lang="de-DE" sz="800" kern="0" dirty="0" err="1">
+                <a:solidFill>
+                  <a:prstClr val="black"/>
+                </a:solidFill>
+                <a:highlight>
+                  <a:srgbClr val="FF0000"/>
+                </a:highlight>
+                <a:latin typeface="Calibri" panose="020F0502020204030204"/>
+              </a:rPr>
+              <a:t>netconf</a:t>
+            </a:r>
+            <a:r>
+              <a:rPr lang="de-DE" sz="800" kern="0" dirty="0">
+                <a:solidFill>
+                  <a:prstClr val="black"/>
+                </a:solidFill>
+                <a:highlight>
+                  <a:srgbClr val="FF0000"/>
+                </a:highlight>
+                <a:latin typeface="Calibri" panose="020F0502020204030204"/>
+              </a:rPr>
+              <a:t>-password</a:t>
+            </a:r>
           </a:p>
         </p:txBody>
       </p:sp>

</xml_diff>

<commit_message>
Add measurement and implementation of MountPoint
</commit_message>
<xml_diff>
--- a/spec/InformationStructure/diagrams/InformationStructure.pptx
+++ b/spec/InformationStructure/diagrams/InformationStructure.pptx
@@ -201,7 +201,7 @@
           <a:p>
             <a:fld id="{37CCF725-7468-4D3D-9E24-A16745BBBA77}" type="datetimeFigureOut">
               <a:rPr lang="de-DE" smtClean="0"/>
-              <a:t>30.06.2025</a:t>
+              <a:t>07.07.2025</a:t>
             </a:fld>
             <a:endParaRPr lang="de-DE"/>
           </a:p>
@@ -688,7 +688,7 @@
           <a:p>
             <a:fld id="{9A2764DB-E7DF-4EA7-A1AF-05A77C280FCA}" type="datetimeFigureOut">
               <a:rPr lang="de-DE" smtClean="0"/>
-              <a:t>30.06.2025</a:t>
+              <a:t>07.07.2025</a:t>
             </a:fld>
             <a:endParaRPr lang="de-DE"/>
           </a:p>
@@ -858,7 +858,7 @@
           <a:p>
             <a:fld id="{9A2764DB-E7DF-4EA7-A1AF-05A77C280FCA}" type="datetimeFigureOut">
               <a:rPr lang="de-DE" smtClean="0"/>
-              <a:t>30.06.2025</a:t>
+              <a:t>07.07.2025</a:t>
             </a:fld>
             <a:endParaRPr lang="de-DE"/>
           </a:p>
@@ -1038,7 +1038,7 @@
           <a:p>
             <a:fld id="{9A2764DB-E7DF-4EA7-A1AF-05A77C280FCA}" type="datetimeFigureOut">
               <a:rPr lang="de-DE" smtClean="0"/>
-              <a:t>30.06.2025</a:t>
+              <a:t>07.07.2025</a:t>
             </a:fld>
             <a:endParaRPr lang="de-DE"/>
           </a:p>
@@ -1208,7 +1208,7 @@
           <a:p>
             <a:fld id="{9A2764DB-E7DF-4EA7-A1AF-05A77C280FCA}" type="datetimeFigureOut">
               <a:rPr lang="de-DE" smtClean="0"/>
-              <a:t>30.06.2025</a:t>
+              <a:t>07.07.2025</a:t>
             </a:fld>
             <a:endParaRPr lang="de-DE"/>
           </a:p>
@@ -1454,7 +1454,7 @@
           <a:p>
             <a:fld id="{9A2764DB-E7DF-4EA7-A1AF-05A77C280FCA}" type="datetimeFigureOut">
               <a:rPr lang="de-DE" smtClean="0"/>
-              <a:t>30.06.2025</a:t>
+              <a:t>07.07.2025</a:t>
             </a:fld>
             <a:endParaRPr lang="de-DE"/>
           </a:p>
@@ -1686,7 +1686,7 @@
           <a:p>
             <a:fld id="{9A2764DB-E7DF-4EA7-A1AF-05A77C280FCA}" type="datetimeFigureOut">
               <a:rPr lang="de-DE" smtClean="0"/>
-              <a:t>30.06.2025</a:t>
+              <a:t>07.07.2025</a:t>
             </a:fld>
             <a:endParaRPr lang="de-DE"/>
           </a:p>
@@ -2053,7 +2053,7 @@
           <a:p>
             <a:fld id="{9A2764DB-E7DF-4EA7-A1AF-05A77C280FCA}" type="datetimeFigureOut">
               <a:rPr lang="de-DE" smtClean="0"/>
-              <a:t>30.06.2025</a:t>
+              <a:t>07.07.2025</a:t>
             </a:fld>
             <a:endParaRPr lang="de-DE"/>
           </a:p>
@@ -2171,7 +2171,7 @@
           <a:p>
             <a:fld id="{9A2764DB-E7DF-4EA7-A1AF-05A77C280FCA}" type="datetimeFigureOut">
               <a:rPr lang="de-DE" smtClean="0"/>
-              <a:t>30.06.2025</a:t>
+              <a:t>07.07.2025</a:t>
             </a:fld>
             <a:endParaRPr lang="de-DE"/>
           </a:p>
@@ -2266,7 +2266,7 @@
           <a:p>
             <a:fld id="{9A2764DB-E7DF-4EA7-A1AF-05A77C280FCA}" type="datetimeFigureOut">
               <a:rPr lang="de-DE" smtClean="0"/>
-              <a:t>30.06.2025</a:t>
+              <a:t>07.07.2025</a:t>
             </a:fld>
             <a:endParaRPr lang="de-DE"/>
           </a:p>
@@ -2543,7 +2543,7 @@
           <a:p>
             <a:fld id="{9A2764DB-E7DF-4EA7-A1AF-05A77C280FCA}" type="datetimeFigureOut">
               <a:rPr lang="de-DE" smtClean="0"/>
-              <a:t>30.06.2025</a:t>
+              <a:t>07.07.2025</a:t>
             </a:fld>
             <a:endParaRPr lang="de-DE"/>
           </a:p>
@@ -2800,7 +2800,7 @@
           <a:p>
             <a:fld id="{9A2764DB-E7DF-4EA7-A1AF-05A77C280FCA}" type="datetimeFigureOut">
               <a:rPr lang="de-DE" smtClean="0"/>
-              <a:t>30.06.2025</a:t>
+              <a:t>07.07.2025</a:t>
             </a:fld>
             <a:endParaRPr lang="de-DE"/>
           </a:p>
@@ -3013,7 +3013,7 @@
           <a:p>
             <a:fld id="{9A2764DB-E7DF-4EA7-A1AF-05A77C280FCA}" type="datetimeFigureOut">
               <a:rPr lang="de-DE" smtClean="0"/>
-              <a:t>30.06.2025</a:t>
+              <a:t>07.07.2025</a:t>
             </a:fld>
             <a:endParaRPr lang="de-DE"/>
           </a:p>
@@ -4951,8 +4951,8 @@
         </p:nvSpPr>
         <p:spPr>
           <a:xfrm>
-            <a:off x="5905500" y="5577132"/>
-            <a:ext cx="2484823" cy="336074"/>
+            <a:off x="6484620" y="5577132"/>
+            <a:ext cx="1905703" cy="336074"/>
           </a:xfrm>
           <a:prstGeom prst="rect">
             <a:avLst/>
@@ -12348,14 +12348,20 @@
                 <a:solidFill>
                   <a:prstClr val="black"/>
                 </a:solidFill>
-                <a:latin typeface="Calibri" panose="020F0502020204030204"/>
-              </a:rPr>
-              <a:t>logicalControllerTemplateName</a:t>
+                <a:highlight>
+                  <a:srgbClr val="FFFF00"/>
+                </a:highlight>
+                <a:latin typeface="Calibri" panose="020F0502020204030204"/>
+              </a:rPr>
+              <a:t>controllerTemplateName</a:t>
             </a:r>
             <a:endParaRPr lang="en-US" sz="800" kern="0" noProof="0" dirty="0">
               <a:solidFill>
                 <a:prstClr val="black"/>
               </a:solidFill>
+              <a:highlight>
+                <a:srgbClr val="FFFF00"/>
+              </a:highlight>
               <a:latin typeface="Calibri" panose="020F0502020204030204"/>
             </a:endParaRPr>
           </a:p>
@@ -14123,9 +14129,12 @@
                 <a:solidFill>
                   <a:prstClr val="white"/>
                 </a:solidFill>
-                <a:latin typeface="Calibri" panose="020F0502020204030204"/>
-              </a:rPr>
-              <a:t>logicalController</a:t>
+                <a:highlight>
+                  <a:srgbClr val="FFFF00"/>
+                </a:highlight>
+                <a:latin typeface="Calibri" panose="020F0502020204030204"/>
+              </a:rPr>
+              <a:t>mountPoint</a:t>
             </a:r>
             <a:r>
               <a:rPr lang="en-US" sz="900" kern="0" noProof="0" dirty="0">
@@ -14190,9 +14199,12 @@
                 <a:solidFill>
                   <a:prstClr val="black"/>
                 </a:solidFill>
-                <a:latin typeface="Calibri" panose="020F0502020204030204"/>
-              </a:rPr>
-              <a:t>logicalControllerTemplateName</a:t>
+                <a:highlight>
+                  <a:srgbClr val="FFFF00"/>
+                </a:highlight>
+                <a:latin typeface="Calibri" panose="020F0502020204030204"/>
+              </a:rPr>
+              <a:t>mountPointTemplateName</a:t>
             </a:r>
             <a:r>
               <a:rPr lang="en-US" sz="800" kern="0" noProof="0" dirty="0">
@@ -14220,23 +14232,20 @@
                 <a:solidFill>
                   <a:prstClr val="black"/>
                 </a:solidFill>
-                <a:latin typeface="Calibri" panose="020F0502020204030204"/>
-              </a:rPr>
-              <a:t>logicalController</a:t>
+                <a:highlight>
+                  <a:srgbClr val="FFFF00"/>
+                </a:highlight>
+                <a:latin typeface="Calibri" panose="020F0502020204030204"/>
+              </a:rPr>
+              <a:t>mountPoint</a:t>
             </a:r>
             <a:endParaRPr lang="en-US" sz="800" kern="0" noProof="0" dirty="0">
               <a:solidFill>
                 <a:prstClr val="black"/>
               </a:solidFill>
-              <a:latin typeface="Calibri" panose="020F0502020204030204"/>
-            </a:endParaRPr>
-          </a:p>
-          <a:p>
-            <a:pPr defTabSz="914411"/>
-            <a:endParaRPr lang="en-US" sz="800" kern="0" noProof="0" dirty="0">
-              <a:solidFill>
-                <a:prstClr val="black"/>
-              </a:solidFill>
+              <a:highlight>
+                <a:srgbClr val="FFFF00"/>
+              </a:highlight>
               <a:latin typeface="Calibri" panose="020F0502020204030204"/>
             </a:endParaRPr>
           </a:p>

</xml_diff>

<commit_message>
Add measurement concepts and services
</commit_message>
<xml_diff>
--- a/spec/InformationStructure/diagrams/InformationStructure.pptx
+++ b/spec/InformationStructure/diagrams/InformationStructure.pptx
@@ -201,7 +201,7 @@
           <a:p>
             <a:fld id="{37CCF725-7468-4D3D-9E24-A16745BBBA77}" type="datetimeFigureOut">
               <a:rPr lang="de-DE" smtClean="0"/>
-              <a:t>07.07.2025</a:t>
+              <a:t>18.07.2025</a:t>
             </a:fld>
             <a:endParaRPr lang="de-DE"/>
           </a:p>
@@ -688,7 +688,7 @@
           <a:p>
             <a:fld id="{9A2764DB-E7DF-4EA7-A1AF-05A77C280FCA}" type="datetimeFigureOut">
               <a:rPr lang="de-DE" smtClean="0"/>
-              <a:t>07.07.2025</a:t>
+              <a:t>18.07.2025</a:t>
             </a:fld>
             <a:endParaRPr lang="de-DE"/>
           </a:p>
@@ -858,7 +858,7 @@
           <a:p>
             <a:fld id="{9A2764DB-E7DF-4EA7-A1AF-05A77C280FCA}" type="datetimeFigureOut">
               <a:rPr lang="de-DE" smtClean="0"/>
-              <a:t>07.07.2025</a:t>
+              <a:t>18.07.2025</a:t>
             </a:fld>
             <a:endParaRPr lang="de-DE"/>
           </a:p>
@@ -1038,7 +1038,7 @@
           <a:p>
             <a:fld id="{9A2764DB-E7DF-4EA7-A1AF-05A77C280FCA}" type="datetimeFigureOut">
               <a:rPr lang="de-DE" smtClean="0"/>
-              <a:t>07.07.2025</a:t>
+              <a:t>18.07.2025</a:t>
             </a:fld>
             <a:endParaRPr lang="de-DE"/>
           </a:p>
@@ -1208,7 +1208,7 @@
           <a:p>
             <a:fld id="{9A2764DB-E7DF-4EA7-A1AF-05A77C280FCA}" type="datetimeFigureOut">
               <a:rPr lang="de-DE" smtClean="0"/>
-              <a:t>07.07.2025</a:t>
+              <a:t>18.07.2025</a:t>
             </a:fld>
             <a:endParaRPr lang="de-DE"/>
           </a:p>
@@ -1454,7 +1454,7 @@
           <a:p>
             <a:fld id="{9A2764DB-E7DF-4EA7-A1AF-05A77C280FCA}" type="datetimeFigureOut">
               <a:rPr lang="de-DE" smtClean="0"/>
-              <a:t>07.07.2025</a:t>
+              <a:t>18.07.2025</a:t>
             </a:fld>
             <a:endParaRPr lang="de-DE"/>
           </a:p>
@@ -1686,7 +1686,7 @@
           <a:p>
             <a:fld id="{9A2764DB-E7DF-4EA7-A1AF-05A77C280FCA}" type="datetimeFigureOut">
               <a:rPr lang="de-DE" smtClean="0"/>
-              <a:t>07.07.2025</a:t>
+              <a:t>18.07.2025</a:t>
             </a:fld>
             <a:endParaRPr lang="de-DE"/>
           </a:p>
@@ -2053,7 +2053,7 @@
           <a:p>
             <a:fld id="{9A2764DB-E7DF-4EA7-A1AF-05A77C280FCA}" type="datetimeFigureOut">
               <a:rPr lang="de-DE" smtClean="0"/>
-              <a:t>07.07.2025</a:t>
+              <a:t>18.07.2025</a:t>
             </a:fld>
             <a:endParaRPr lang="de-DE"/>
           </a:p>
@@ -2171,7 +2171,7 @@
           <a:p>
             <a:fld id="{9A2764DB-E7DF-4EA7-A1AF-05A77C280FCA}" type="datetimeFigureOut">
               <a:rPr lang="de-DE" smtClean="0"/>
-              <a:t>07.07.2025</a:t>
+              <a:t>18.07.2025</a:t>
             </a:fld>
             <a:endParaRPr lang="de-DE"/>
           </a:p>
@@ -2266,7 +2266,7 @@
           <a:p>
             <a:fld id="{9A2764DB-E7DF-4EA7-A1AF-05A77C280FCA}" type="datetimeFigureOut">
               <a:rPr lang="de-DE" smtClean="0"/>
-              <a:t>07.07.2025</a:t>
+              <a:t>18.07.2025</a:t>
             </a:fld>
             <a:endParaRPr lang="de-DE"/>
           </a:p>
@@ -2543,7 +2543,7 @@
           <a:p>
             <a:fld id="{9A2764DB-E7DF-4EA7-A1AF-05A77C280FCA}" type="datetimeFigureOut">
               <a:rPr lang="de-DE" smtClean="0"/>
-              <a:t>07.07.2025</a:t>
+              <a:t>18.07.2025</a:t>
             </a:fld>
             <a:endParaRPr lang="de-DE"/>
           </a:p>
@@ -2800,7 +2800,7 @@
           <a:p>
             <a:fld id="{9A2764DB-E7DF-4EA7-A1AF-05A77C280FCA}" type="datetimeFigureOut">
               <a:rPr lang="de-DE" smtClean="0"/>
-              <a:t>07.07.2025</a:t>
+              <a:t>18.07.2025</a:t>
             </a:fld>
             <a:endParaRPr lang="de-DE"/>
           </a:p>
@@ -3013,7 +3013,7 @@
           <a:p>
             <a:fld id="{9A2764DB-E7DF-4EA7-A1AF-05A77C280FCA}" type="datetimeFigureOut">
               <a:rPr lang="de-DE" smtClean="0"/>
-              <a:t>07.07.2025</a:t>
+              <a:t>18.07.2025</a:t>
             </a:fld>
             <a:endParaRPr lang="de-DE"/>
           </a:p>
@@ -4064,9 +4064,9 @@
           <p:nvPr/>
         </p:nvCxnSpPr>
         <p:spPr>
-          <a:xfrm>
-            <a:off x="23684393" y="14340811"/>
-            <a:ext cx="470209" cy="9378"/>
+          <a:xfrm flipV="1">
+            <a:off x="23684398" y="14152128"/>
+            <a:ext cx="470209" cy="188684"/>
           </a:xfrm>
           <a:prstGeom prst="straightConnector1">
             <a:avLst/>
@@ -4097,8 +4097,8 @@
         </p:nvSpPr>
         <p:spPr>
           <a:xfrm>
-            <a:off x="24154607" y="14127404"/>
-            <a:ext cx="1682087" cy="445572"/>
+            <a:off x="24154607" y="13809904"/>
+            <a:ext cx="1682087" cy="684448"/>
           </a:xfrm>
           <a:prstGeom prst="rect">
             <a:avLst/>
@@ -4179,6 +4179,63 @@
               </a:rPr>
               <a:t>remotePort</a:t>
             </a:r>
+            <a:endParaRPr lang="en-US" sz="800" kern="0" dirty="0">
+              <a:solidFill>
+                <a:prstClr val="black"/>
+              </a:solidFill>
+              <a:latin typeface="Calibri" panose="020F0502020204030204"/>
+            </a:endParaRPr>
+          </a:p>
+          <a:p>
+            <a:pPr defTabSz="914411"/>
+            <a:r>
+              <a:rPr lang="en-US" sz="800" kern="0" noProof="0" dirty="0" err="1">
+                <a:solidFill>
+                  <a:prstClr val="black"/>
+                </a:solidFill>
+                <a:highlight>
+                  <a:srgbClr val="FFFF00"/>
+                </a:highlight>
+                <a:latin typeface="Calibri" panose="020F0502020204030204"/>
+              </a:rPr>
+              <a:t>notificationSubscribe</a:t>
+            </a:r>
+            <a:endParaRPr lang="en-US" sz="800" kern="0" noProof="0" dirty="0">
+              <a:solidFill>
+                <a:prstClr val="black"/>
+              </a:solidFill>
+              <a:highlight>
+                <a:srgbClr val="FFFF00"/>
+              </a:highlight>
+              <a:latin typeface="Calibri" panose="020F0502020204030204"/>
+            </a:endParaRPr>
+          </a:p>
+          <a:p>
+            <a:pPr defTabSz="914411"/>
+            <a:r>
+              <a:rPr lang="en-US" sz="800" kern="0" noProof="0" dirty="0" err="1">
+                <a:solidFill>
+                  <a:prstClr val="black"/>
+                </a:solidFill>
+                <a:highlight>
+                  <a:srgbClr val="FFFF00"/>
+                </a:highlight>
+                <a:latin typeface="Calibri" panose="020F0502020204030204"/>
+              </a:rPr>
+              <a:t>notificationStreamName</a:t>
+            </a:r>
+            <a:endParaRPr lang="en-US" sz="800" kern="0" noProof="0" dirty="0">
+              <a:solidFill>
+                <a:prstClr val="black"/>
+              </a:solidFill>
+              <a:highlight>
+                <a:srgbClr val="FFFF00"/>
+              </a:highlight>
+              <a:latin typeface="Calibri" panose="020F0502020204030204"/>
+            </a:endParaRPr>
+          </a:p>
+          <a:p>
+            <a:pPr defTabSz="914411"/>
             <a:endParaRPr lang="en-US" sz="800" kern="0" noProof="0" dirty="0">
               <a:solidFill>
                 <a:prstClr val="black"/>
@@ -11240,115 +11297,6 @@
       </p:sp>
       <p:sp>
         <p:nvSpPr>
-          <p:cNvPr id="139" name="Pfeil: nach rechts 138">
-            <a:extLst>
-              <a:ext uri="{FF2B5EF4-FFF2-40B4-BE49-F238E27FC236}">
-                <a16:creationId xmlns:a16="http://schemas.microsoft.com/office/drawing/2014/main" id="{5BC306EE-1A93-9FC3-E362-5CA24C54F4D2}"/>
-              </a:ext>
-            </a:extLst>
-          </p:cNvPr>
-          <p:cNvSpPr/>
-          <p:nvPr/>
-        </p:nvSpPr>
-        <p:spPr>
-          <a:xfrm flipH="1">
-            <a:off x="21224200" y="2073353"/>
-            <a:ext cx="7504867" cy="146494"/>
-          </a:xfrm>
-          <a:prstGeom prst="rightArrow">
-            <a:avLst/>
-          </a:prstGeom>
-        </p:spPr>
-        <p:style>
-          <a:lnRef idx="2">
-            <a:schemeClr val="accent1">
-              <a:shade val="15000"/>
-            </a:schemeClr>
-          </a:lnRef>
-          <a:fillRef idx="1">
-            <a:schemeClr val="accent1"/>
-          </a:fillRef>
-          <a:effectRef idx="0">
-            <a:schemeClr val="accent1"/>
-          </a:effectRef>
-          <a:fontRef idx="minor">
-            <a:schemeClr val="lt1"/>
-          </a:fontRef>
-        </p:style>
-        <p:txBody>
-          <a:bodyPr rtlCol="0" anchor="ctr"/>
-          <a:lstStyle/>
-          <a:p>
-            <a:pPr algn="ctr"/>
-            <a:endParaRPr lang="en-US" noProof="0" dirty="0"/>
-          </a:p>
-        </p:txBody>
-      </p:sp>
-      <p:sp>
-        <p:nvSpPr>
-          <p:cNvPr id="140" name="Textfeld 139">
-            <a:extLst>
-              <a:ext uri="{FF2B5EF4-FFF2-40B4-BE49-F238E27FC236}">
-                <a16:creationId xmlns:a16="http://schemas.microsoft.com/office/drawing/2014/main" id="{F7658145-0D33-5E69-50D7-63495D3F0959}"/>
-              </a:ext>
-            </a:extLst>
-          </p:cNvPr>
-          <p:cNvSpPr txBox="1"/>
-          <p:nvPr/>
-        </p:nvSpPr>
-        <p:spPr>
-          <a:xfrm>
-            <a:off x="20623410" y="1689925"/>
-            <a:ext cx="8430706" cy="369332"/>
-          </a:xfrm>
-          <a:prstGeom prst="rect">
-            <a:avLst/>
-          </a:prstGeom>
-          <a:noFill/>
-        </p:spPr>
-        <p:txBody>
-          <a:bodyPr wrap="none" rtlCol="0">
-            <a:spAutoFit/>
-          </a:bodyPr>
-          <a:lstStyle/>
-          <a:p>
-            <a:r>
-              <a:rPr lang="en-US" noProof="0" dirty="0" err="1"/>
-              <a:t>updateTcpClient</a:t>
-            </a:r>
-            <a:r>
-              <a:rPr lang="en-US" noProof="0" dirty="0"/>
-              <a:t>{</a:t>
-            </a:r>
-            <a:r>
-              <a:rPr lang="en-US" noProof="0" dirty="0" err="1"/>
-              <a:t>controllerName</a:t>
-            </a:r>
-            <a:r>
-              <a:rPr lang="en-US" noProof="0" dirty="0"/>
-              <a:t>=live, </a:t>
-            </a:r>
-            <a:r>
-              <a:rPr lang="en-US" noProof="0" dirty="0" err="1"/>
-              <a:t>deviceName</a:t>
-            </a:r>
-            <a:r>
-              <a:rPr lang="en-US" noProof="0" dirty="0"/>
-              <a:t>=305251111, </a:t>
-            </a:r>
-            <a:r>
-              <a:rPr lang="en-US" noProof="0" dirty="0" err="1"/>
-              <a:t>remotePort</a:t>
-            </a:r>
-            <a:r>
-              <a:rPr lang="en-US" noProof="0" dirty="0"/>
-              <a:t>=4001}</a:t>
-            </a:r>
-          </a:p>
-        </p:txBody>
-      </p:sp>
-      <p:sp>
-        <p:nvSpPr>
           <p:cNvPr id="194" name="Abgerundetes Rechteck 1">
             <a:extLst>
               <a:ext uri="{FF2B5EF4-FFF2-40B4-BE49-F238E27FC236}">
@@ -12651,8 +12599,8 @@
         </p:nvCxnSpPr>
         <p:spPr>
           <a:xfrm flipV="1">
-            <a:off x="31976069" y="12697473"/>
-            <a:ext cx="474801" cy="65793"/>
+            <a:off x="31976069" y="12697472"/>
+            <a:ext cx="474799" cy="65793"/>
           </a:xfrm>
           <a:prstGeom prst="straightConnector1">
             <a:avLst/>
@@ -12683,8 +12631,8 @@
         </p:nvSpPr>
         <p:spPr>
           <a:xfrm>
-            <a:off x="32450869" y="12539959"/>
-            <a:ext cx="1572246" cy="315026"/>
+            <a:off x="32450868" y="12539959"/>
+            <a:ext cx="1731181" cy="315026"/>
           </a:xfrm>
           <a:prstGeom prst="rect">
             <a:avLst/>
@@ -12733,6 +12681,42 @@
               </a:rPr>
               <a:t>]</a:t>
             </a:r>
+          </a:p>
+          <a:p>
+            <a:pPr defTabSz="914411"/>
+            <a:r>
+              <a:rPr lang="en-US" sz="800" kern="0" dirty="0">
+                <a:solidFill>
+                  <a:prstClr val="black"/>
+                </a:solidFill>
+                <a:highlight>
+                  <a:srgbClr val="FFFF00"/>
+                </a:highlight>
+                <a:latin typeface="Calibri" panose="020F0502020204030204"/>
+              </a:rPr>
+              <a:t>_template=</a:t>
+            </a:r>
+            <a:r>
+              <a:rPr lang="en-US" sz="800" kern="0" dirty="0" err="1">
+                <a:solidFill>
+                  <a:prstClr val="black"/>
+                </a:solidFill>
+                <a:highlight>
+                  <a:srgbClr val="FFFF00"/>
+                </a:highlight>
+                <a:latin typeface="Calibri" panose="020F0502020204030204"/>
+              </a:rPr>
+              <a:t>mountPointTemplateName</a:t>
+            </a:r>
+            <a:endParaRPr lang="en-US" sz="800" kern="0" noProof="0" dirty="0">
+              <a:solidFill>
+                <a:prstClr val="black"/>
+              </a:solidFill>
+              <a:highlight>
+                <a:srgbClr val="FFFF00"/>
+              </a:highlight>
+              <a:latin typeface="Calibri" panose="020F0502020204030204"/>
+            </a:endParaRPr>
           </a:p>
         </p:txBody>
       </p:sp>
@@ -12918,7 +12902,7 @@
         <p:spPr>
           <a:xfrm>
             <a:off x="33698615" y="13652196"/>
-            <a:ext cx="470210" cy="9378"/>
+            <a:ext cx="470210" cy="126211"/>
           </a:xfrm>
           <a:prstGeom prst="straightConnector1">
             <a:avLst/>
@@ -12949,8 +12933,8 @@
         </p:nvSpPr>
         <p:spPr>
           <a:xfrm>
-            <a:off x="34168825" y="13438788"/>
-            <a:ext cx="1150284" cy="445572"/>
+            <a:off x="34168825" y="13438787"/>
+            <a:ext cx="1150284" cy="679239"/>
           </a:xfrm>
           <a:prstGeom prst="rect">
             <a:avLst/>
@@ -13035,6 +13019,54 @@
               <a:solidFill>
                 <a:prstClr val="black"/>
               </a:solidFill>
+              <a:latin typeface="Calibri" panose="020F0502020204030204"/>
+            </a:endParaRPr>
+          </a:p>
+          <a:p>
+            <a:pPr defTabSz="914411"/>
+            <a:r>
+              <a:rPr lang="en-US" sz="800" kern="0" noProof="0" dirty="0" err="1">
+                <a:solidFill>
+                  <a:prstClr val="black"/>
+                </a:solidFill>
+                <a:highlight>
+                  <a:srgbClr val="FFFF00"/>
+                </a:highlight>
+                <a:latin typeface="Calibri" panose="020F0502020204030204"/>
+              </a:rPr>
+              <a:t>notificationSubscribe</a:t>
+            </a:r>
+            <a:endParaRPr lang="en-US" sz="800" kern="0" noProof="0" dirty="0">
+              <a:solidFill>
+                <a:prstClr val="black"/>
+              </a:solidFill>
+              <a:highlight>
+                <a:srgbClr val="FFFF00"/>
+              </a:highlight>
+              <a:latin typeface="Calibri" panose="020F0502020204030204"/>
+            </a:endParaRPr>
+          </a:p>
+          <a:p>
+            <a:pPr defTabSz="914411"/>
+            <a:r>
+              <a:rPr lang="en-US" sz="800" kern="0" noProof="0" dirty="0" err="1">
+                <a:solidFill>
+                  <a:prstClr val="black"/>
+                </a:solidFill>
+                <a:highlight>
+                  <a:srgbClr val="FFFF00"/>
+                </a:highlight>
+                <a:latin typeface="Calibri" panose="020F0502020204030204"/>
+              </a:rPr>
+              <a:t>notificationStreamName</a:t>
+            </a:r>
+            <a:endParaRPr lang="en-US" sz="800" kern="0" noProof="0" dirty="0">
+              <a:solidFill>
+                <a:prstClr val="black"/>
+              </a:solidFill>
+              <a:highlight>
+                <a:srgbClr val="FFFF00"/>
+              </a:highlight>
               <a:latin typeface="Calibri" panose="020F0502020204030204"/>
             </a:endParaRPr>
           </a:p>
@@ -13302,7 +13334,7 @@
         </p:nvSpPr>
         <p:spPr>
           <a:xfrm>
-            <a:off x="24154601" y="13479410"/>
+            <a:off x="24154601" y="13422260"/>
             <a:ext cx="1682087" cy="333280"/>
           </a:xfrm>
           <a:prstGeom prst="rect">
@@ -13393,9 +13425,9 @@
           <p:nvPr/>
         </p:nvCxnSpPr>
         <p:spPr>
-          <a:xfrm>
-            <a:off x="23687472" y="13643106"/>
-            <a:ext cx="467129" cy="2944"/>
+          <a:xfrm flipV="1">
+            <a:off x="23687472" y="13588900"/>
+            <a:ext cx="467129" cy="54206"/>
           </a:xfrm>
           <a:prstGeom prst="straightConnector1">
             <a:avLst/>
@@ -14129,9 +14161,6 @@
                 <a:solidFill>
                   <a:prstClr val="white"/>
                 </a:solidFill>
-                <a:highlight>
-                  <a:srgbClr val="FFFF00"/>
-                </a:highlight>
                 <a:latin typeface="Calibri" panose="020F0502020204030204"/>
               </a:rPr>
               <a:t>mountPoint</a:t>
@@ -14162,8 +14191,8 @@
         </p:nvSpPr>
         <p:spPr>
           <a:xfrm>
-            <a:off x="2356182" y="4935830"/>
-            <a:ext cx="2050399" cy="408894"/>
+            <a:off x="2356182" y="4935829"/>
+            <a:ext cx="2050399" cy="574031"/>
           </a:xfrm>
           <a:prstGeom prst="rect">
             <a:avLst/>
@@ -14228,7 +14257,7 @@
               <a:t>category=</a:t>
             </a:r>
             <a:r>
-              <a:rPr lang="en-US" sz="800" kern="0" noProof="0" dirty="0" err="1">
+              <a:rPr lang="en-US" sz="800" kern="0" noProof="0" dirty="0">
                 <a:solidFill>
                   <a:prstClr val="black"/>
                 </a:solidFill>
@@ -14237,7 +14266,22 @@
                 </a:highlight>
                 <a:latin typeface="Calibri" panose="020F0502020204030204"/>
               </a:rPr>
-              <a:t>mountPoint</a:t>
+              <a:t>mountpoint</a:t>
+            </a:r>
+          </a:p>
+          <a:p>
+            <a:pPr defTabSz="914411"/>
+            <a:r>
+              <a:rPr lang="en-US" sz="800" kern="0" noProof="0" dirty="0" err="1">
+                <a:solidFill>
+                  <a:prstClr val="black"/>
+                </a:solidFill>
+                <a:highlight>
+                  <a:srgbClr val="FFFF00"/>
+                </a:highlight>
+                <a:latin typeface="Calibri" panose="020F0502020204030204"/>
+              </a:rPr>
+              <a:t>netconfUserName</a:t>
             </a:r>
             <a:endParaRPr lang="en-US" sz="800" kern="0" noProof="0" dirty="0">
               <a:solidFill>
@@ -14251,6 +14295,42 @@
           </a:p>
           <a:p>
             <a:pPr defTabSz="914411"/>
+            <a:r>
+              <a:rPr lang="en-US" sz="800" kern="0" noProof="0" dirty="0" err="1">
+                <a:solidFill>
+                  <a:prstClr val="black"/>
+                </a:solidFill>
+                <a:highlight>
+                  <a:srgbClr val="FFFF00"/>
+                </a:highlight>
+                <a:latin typeface="Calibri" panose="020F0502020204030204"/>
+              </a:rPr>
+              <a:t>netconfPassword</a:t>
+            </a:r>
+            <a:endParaRPr lang="en-US" sz="800" kern="0" noProof="0" dirty="0">
+              <a:solidFill>
+                <a:prstClr val="black"/>
+              </a:solidFill>
+              <a:highlight>
+                <a:srgbClr val="FFFF00"/>
+              </a:highlight>
+              <a:latin typeface="Calibri" panose="020F0502020204030204"/>
+            </a:endParaRPr>
+          </a:p>
+          <a:p>
+            <a:pPr defTabSz="914411"/>
+            <a:endParaRPr lang="en-US" sz="800" kern="0" noProof="0" dirty="0">
+              <a:solidFill>
+                <a:prstClr val="black"/>
+              </a:solidFill>
+              <a:highlight>
+                <a:srgbClr val="FFFF00"/>
+              </a:highlight>
+              <a:latin typeface="Calibri" panose="020F0502020204030204"/>
+            </a:endParaRPr>
+          </a:p>
+          <a:p>
+            <a:pPr defTabSz="914411"/>
             <a:endParaRPr lang="en-US" sz="800" kern="0" noProof="0" dirty="0">
               <a:solidFill>
                 <a:prstClr val="black"/>
@@ -14279,7 +14359,7 @@
         <p:spPr>
           <a:xfrm flipH="1">
             <a:off x="4406581" y="5118269"/>
-            <a:ext cx="468395" cy="22008"/>
+            <a:ext cx="468395" cy="104576"/>
           </a:xfrm>
           <a:prstGeom prst="straightConnector1">
             <a:avLst/>
@@ -14332,188 +14412,6 @@
           <a:effectLst/>
         </p:spPr>
       </p:cxnSp>
-      <p:sp>
-        <p:nvSpPr>
-          <p:cNvPr id="6" name="Rechteck 5">
-            <a:extLst>
-              <a:ext uri="{FF2B5EF4-FFF2-40B4-BE49-F238E27FC236}">
-                <a16:creationId xmlns:a16="http://schemas.microsoft.com/office/drawing/2014/main" id="{3B38907F-0312-01DA-5864-D7DE075718B8}"/>
-              </a:ext>
-            </a:extLst>
-          </p:cNvPr>
-          <p:cNvSpPr/>
-          <p:nvPr/>
-        </p:nvSpPr>
-        <p:spPr>
-          <a:xfrm>
-            <a:off x="34058226" y="12941180"/>
-            <a:ext cx="1152525" cy="377333"/>
-          </a:xfrm>
-          <a:prstGeom prst="rect">
-            <a:avLst/>
-          </a:prstGeom>
-          <a:solidFill>
-            <a:sysClr val="window" lastClr="FFFFFF"/>
-          </a:solidFill>
-          <a:ln w="12700" cap="flat" cmpd="sng" algn="ctr">
-            <a:solidFill>
-              <a:srgbClr val="A5A5A5"/>
-            </a:solidFill>
-            <a:prstDash val="solid"/>
-            <a:miter lim="800000"/>
-          </a:ln>
-          <a:effectLst/>
-        </p:spPr>
-        <p:txBody>
-          <a:bodyPr lIns="36000" tIns="36000" rIns="36000" bIns="36000" rtlCol="0" anchor="t"/>
-          <a:lstStyle/>
-          <a:p>
-            <a:pPr defTabSz="914411"/>
-            <a:r>
-              <a:rPr lang="de-DE" sz="800" kern="0" dirty="0" err="1">
-                <a:solidFill>
-                  <a:prstClr val="black"/>
-                </a:solidFill>
-                <a:highlight>
-                  <a:srgbClr val="FF0000"/>
-                </a:highlight>
-                <a:latin typeface="Calibri" panose="020F0502020204030204"/>
-              </a:rPr>
-              <a:t>netconf</a:t>
-            </a:r>
-            <a:r>
-              <a:rPr lang="de-DE" sz="800" kern="0" dirty="0">
-                <a:solidFill>
-                  <a:prstClr val="black"/>
-                </a:solidFill>
-                <a:highlight>
-                  <a:srgbClr val="FF0000"/>
-                </a:highlight>
-                <a:latin typeface="Calibri" panose="020F0502020204030204"/>
-              </a:rPr>
-              <a:t>-user-name</a:t>
-            </a:r>
-          </a:p>
-          <a:p>
-            <a:pPr defTabSz="914411"/>
-            <a:r>
-              <a:rPr lang="de-DE" sz="800" kern="0" dirty="0" err="1">
-                <a:solidFill>
-                  <a:prstClr val="black"/>
-                </a:solidFill>
-                <a:highlight>
-                  <a:srgbClr val="FF0000"/>
-                </a:highlight>
-                <a:latin typeface="Calibri" panose="020F0502020204030204"/>
-              </a:rPr>
-              <a:t>netconf</a:t>
-            </a:r>
-            <a:r>
-              <a:rPr lang="de-DE" sz="800" kern="0" dirty="0">
-                <a:solidFill>
-                  <a:prstClr val="black"/>
-                </a:solidFill>
-                <a:highlight>
-                  <a:srgbClr val="FF0000"/>
-                </a:highlight>
-                <a:latin typeface="Calibri" panose="020F0502020204030204"/>
-              </a:rPr>
-              <a:t>-password</a:t>
-            </a:r>
-          </a:p>
-        </p:txBody>
-      </p:sp>
-      <p:sp>
-        <p:nvSpPr>
-          <p:cNvPr id="44" name="Rechteck 43">
-            <a:extLst>
-              <a:ext uri="{FF2B5EF4-FFF2-40B4-BE49-F238E27FC236}">
-                <a16:creationId xmlns:a16="http://schemas.microsoft.com/office/drawing/2014/main" id="{07802AC0-A710-B932-87CA-591EE43204B4}"/>
-              </a:ext>
-            </a:extLst>
-          </p:cNvPr>
-          <p:cNvSpPr/>
-          <p:nvPr/>
-        </p:nvSpPr>
-        <p:spPr>
-          <a:xfrm>
-            <a:off x="23766984" y="13810589"/>
-            <a:ext cx="1152525" cy="377333"/>
-          </a:xfrm>
-          <a:prstGeom prst="rect">
-            <a:avLst/>
-          </a:prstGeom>
-          <a:solidFill>
-            <a:sysClr val="window" lastClr="FFFFFF"/>
-          </a:solidFill>
-          <a:ln w="12700" cap="flat" cmpd="sng" algn="ctr">
-            <a:solidFill>
-              <a:srgbClr val="A5A5A5"/>
-            </a:solidFill>
-            <a:prstDash val="solid"/>
-            <a:miter lim="800000"/>
-          </a:ln>
-          <a:effectLst/>
-        </p:spPr>
-        <p:txBody>
-          <a:bodyPr lIns="36000" tIns="36000" rIns="36000" bIns="36000" rtlCol="0" anchor="t"/>
-          <a:lstStyle/>
-          <a:p>
-            <a:pPr defTabSz="914411"/>
-            <a:r>
-              <a:rPr lang="de-DE" sz="800" kern="0" dirty="0" err="1">
-                <a:solidFill>
-                  <a:prstClr val="black"/>
-                </a:solidFill>
-                <a:highlight>
-                  <a:srgbClr val="FF0000"/>
-                </a:highlight>
-                <a:latin typeface="Calibri" panose="020F0502020204030204"/>
-              </a:rPr>
-              <a:t>netconf</a:t>
-            </a:r>
-            <a:r>
-              <a:rPr lang="de-DE" sz="800" kern="0" dirty="0">
-                <a:solidFill>
-                  <a:prstClr val="black"/>
-                </a:solidFill>
-                <a:highlight>
-                  <a:srgbClr val="FF0000"/>
-                </a:highlight>
-                <a:latin typeface="Calibri" panose="020F0502020204030204"/>
-              </a:rPr>
-              <a:t>-user-name</a:t>
-            </a:r>
-          </a:p>
-          <a:p>
-            <a:pPr defTabSz="914411"/>
-            <a:r>
-              <a:rPr lang="de-DE" sz="800" kern="0" dirty="0" err="1">
-                <a:solidFill>
-                  <a:prstClr val="black"/>
-                </a:solidFill>
-                <a:highlight>
-                  <a:srgbClr val="FF0000"/>
-                </a:highlight>
-                <a:latin typeface="Calibri" panose="020F0502020204030204"/>
-              </a:rPr>
-              <a:t>netconf</a:t>
-            </a:r>
-            <a:r>
-              <a:rPr lang="de-DE" sz="800" kern="0" dirty="0">
-                <a:solidFill>
-                  <a:prstClr val="black"/>
-                </a:solidFill>
-                <a:highlight>
-                  <a:srgbClr val="FF0000"/>
-                </a:highlight>
-                <a:latin typeface="Calibri" panose="020F0502020204030204"/>
-              </a:rPr>
-              <a:t>-password</a:t>
-            </a:r>
-          </a:p>
-        </p:txBody>
-      </p:sp>
     </p:spTree>
     <p:extLst>
       <p:ext uri="{BB962C8B-B14F-4D97-AF65-F5344CB8AC3E}">

</xml_diff>

<commit_message>
Intermediate state of the hl definitions
</commit_message>
<xml_diff>
--- a/spec/InformationStructure/diagrams/InformationStructure.pptx
+++ b/spec/InformationStructure/diagrams/InformationStructure.pptx
@@ -4065,8 +4065,8 @@
         </p:nvCxnSpPr>
         <p:spPr>
           <a:xfrm flipV="1">
-            <a:off x="23684398" y="14152128"/>
-            <a:ext cx="470209" cy="188684"/>
+            <a:off x="23684398" y="14270952"/>
+            <a:ext cx="470209" cy="69860"/>
           </a:xfrm>
           <a:prstGeom prst="straightConnector1">
             <a:avLst/>
@@ -4098,7 +4098,7 @@
         <p:spPr>
           <a:xfrm>
             <a:off x="24154607" y="13809904"/>
-            <a:ext cx="1682087" cy="684448"/>
+            <a:ext cx="1682087" cy="922096"/>
           </a:xfrm>
           <a:prstGeom prst="rect">
             <a:avLst/>
@@ -4223,6 +4223,54 @@
                 <a:latin typeface="Calibri" panose="020F0502020204030204"/>
               </a:rPr>
               <a:t>notificationStreamName</a:t>
+            </a:r>
+            <a:endParaRPr lang="en-US" sz="800" kern="0" noProof="0" dirty="0">
+              <a:solidFill>
+                <a:prstClr val="black"/>
+              </a:solidFill>
+              <a:highlight>
+                <a:srgbClr val="FFFF00"/>
+              </a:highlight>
+              <a:latin typeface="Calibri" panose="020F0502020204030204"/>
+            </a:endParaRPr>
+          </a:p>
+          <a:p>
+            <a:pPr defTabSz="914411"/>
+            <a:r>
+              <a:rPr lang="en-US" sz="800" kern="0" dirty="0" err="1">
+                <a:solidFill>
+                  <a:prstClr val="black"/>
+                </a:solidFill>
+                <a:highlight>
+                  <a:srgbClr val="FFFF00"/>
+                </a:highlight>
+                <a:latin typeface="Calibri" panose="020F0502020204030204"/>
+              </a:rPr>
+              <a:t>connectionStatus</a:t>
+            </a:r>
+            <a:endParaRPr lang="en-US" sz="800" kern="0" dirty="0">
+              <a:solidFill>
+                <a:prstClr val="black"/>
+              </a:solidFill>
+              <a:highlight>
+                <a:srgbClr val="FFFF00"/>
+              </a:highlight>
+              <a:latin typeface="Calibri" panose="020F0502020204030204"/>
+            </a:endParaRPr>
+          </a:p>
+          <a:p>
+            <a:pPr defTabSz="914411"/>
+            <a:r>
+              <a:rPr lang="en-US" sz="800" kern="0" dirty="0" err="1">
+                <a:solidFill>
+                  <a:prstClr val="black"/>
+                </a:solidFill>
+                <a:highlight>
+                  <a:srgbClr val="FFFF00"/>
+                </a:highlight>
+                <a:latin typeface="Calibri" panose="020F0502020204030204"/>
+              </a:rPr>
+              <a:t>sessionId</a:t>
             </a:r>
             <a:endParaRPr lang="en-US" sz="800" kern="0" noProof="0" dirty="0">
               <a:solidFill>
@@ -5157,7 +5205,7 @@
         <p:spPr>
           <a:xfrm flipV="1">
             <a:off x="1171498" y="9074357"/>
-            <a:ext cx="461366" cy="5676"/>
+            <a:ext cx="461372" cy="5676"/>
           </a:xfrm>
           <a:prstGeom prst="straightConnector1">
             <a:avLst/>
@@ -5189,7 +5237,7 @@
         <p:spPr>
           <a:xfrm>
             <a:off x="1632870" y="8851571"/>
-            <a:ext cx="1672141" cy="445572"/>
+            <a:ext cx="2281584" cy="445572"/>
           </a:xfrm>
           <a:prstGeom prst="rect">
             <a:avLst/>
@@ -5278,13 +5326,28 @@
               <a:t>_template=</a:t>
             </a:r>
             <a:r>
-              <a:rPr lang="en-US" sz="800" kern="0" noProof="0" dirty="0" err="1">
+              <a:rPr lang="en-US" sz="800" kern="0" dirty="0">
                 <a:solidFill>
                   <a:prstClr val="black"/>
                 </a:solidFill>
-                <a:latin typeface="Calibri" panose="020F0502020204030204"/>
-              </a:rPr>
-              <a:t>applicationTemplateName</a:t>
+                <a:highlight>
+                  <a:srgbClr val="FFFF00"/>
+                </a:highlight>
+                <a:latin typeface="Calibri" panose="020F0502020204030204"/>
+              </a:rPr>
+              <a:t> </a:t>
+            </a:r>
+            <a:r>
+              <a:rPr lang="en-US" sz="800" kern="0" dirty="0" err="1">
+                <a:solidFill>
+                  <a:prstClr val="black"/>
+                </a:solidFill>
+                <a:highlight>
+                  <a:srgbClr val="FFFF00"/>
+                </a:highlight>
+                <a:latin typeface="Calibri" panose="020F0502020204030204"/>
+              </a:rPr>
+              <a:t>managementDomainInterfaceTemplate</a:t>
             </a:r>
             <a:endParaRPr lang="en-US" sz="800" kern="0" noProof="0" dirty="0">
               <a:solidFill>
@@ -5676,8 +5739,8 @@
         </p:nvCxnSpPr>
         <p:spPr>
           <a:xfrm flipV="1">
-            <a:off x="22989947" y="12712776"/>
-            <a:ext cx="474802" cy="52380"/>
+            <a:off x="22989953" y="12712771"/>
+            <a:ext cx="474798" cy="52380"/>
           </a:xfrm>
           <a:prstGeom prst="straightConnector1">
             <a:avLst/>
@@ -5708,8 +5771,8 @@
         </p:nvSpPr>
         <p:spPr>
           <a:xfrm>
-            <a:off x="23464752" y="12566951"/>
-            <a:ext cx="1083166" cy="291640"/>
+            <a:off x="23464751" y="12566951"/>
+            <a:ext cx="1682087" cy="291640"/>
           </a:xfrm>
           <a:prstGeom prst="rect">
             <a:avLst/>
@@ -5758,6 +5821,51 @@
               </a:rPr>
               <a:t>]</a:t>
             </a:r>
+          </a:p>
+          <a:p>
+            <a:pPr defTabSz="914411"/>
+            <a:r>
+              <a:rPr lang="en-US" sz="800" kern="0" dirty="0">
+                <a:solidFill>
+                  <a:prstClr val="black"/>
+                </a:solidFill>
+                <a:highlight>
+                  <a:srgbClr val="FFFF00"/>
+                </a:highlight>
+                <a:latin typeface="Calibri" panose="020F0502020204030204"/>
+              </a:rPr>
+              <a:t>_template=</a:t>
+            </a:r>
+            <a:r>
+              <a:rPr lang="en-US" sz="800" kern="0" dirty="0" err="1">
+                <a:solidFill>
+                  <a:prstClr val="black"/>
+                </a:solidFill>
+                <a:highlight>
+                  <a:srgbClr val="FFFF00"/>
+                </a:highlight>
+                <a:latin typeface="Calibri" panose="020F0502020204030204"/>
+              </a:rPr>
+              <a:t>mountPointTemplateName</a:t>
+            </a:r>
+            <a:endParaRPr lang="en-US" sz="800" kern="0" dirty="0">
+              <a:solidFill>
+                <a:prstClr val="black"/>
+              </a:solidFill>
+              <a:highlight>
+                <a:srgbClr val="FFFF00"/>
+              </a:highlight>
+              <a:latin typeface="Calibri" panose="020F0502020204030204"/>
+            </a:endParaRPr>
+          </a:p>
+          <a:p>
+            <a:pPr defTabSz="914411"/>
+            <a:endParaRPr lang="en-US" sz="800" kern="0" noProof="0" dirty="0">
+              <a:solidFill>
+                <a:prstClr val="black"/>
+              </a:solidFill>
+              <a:latin typeface="Calibri" panose="020F0502020204030204"/>
+            </a:endParaRPr>
           </a:p>
         </p:txBody>
       </p:sp>
@@ -7058,7 +7166,7 @@
         </p:nvSpPr>
         <p:spPr>
           <a:xfrm>
-            <a:off x="2347501" y="3751041"/>
+            <a:off x="2347501" y="4055849"/>
             <a:ext cx="2050399" cy="469483"/>
           </a:xfrm>
           <a:prstGeom prst="rect">
@@ -7161,7 +7269,7 @@
         </p:nvSpPr>
         <p:spPr>
           <a:xfrm>
-            <a:off x="2347500" y="4350744"/>
+            <a:off x="2347500" y="4655552"/>
             <a:ext cx="2050399" cy="408894"/>
           </a:xfrm>
           <a:prstGeom prst="rect">
@@ -7263,7 +7371,7 @@
         <p:spPr>
           <a:xfrm flipH="1">
             <a:off x="4397900" y="3945514"/>
-            <a:ext cx="468394" cy="40269"/>
+            <a:ext cx="468394" cy="345077"/>
           </a:xfrm>
           <a:prstGeom prst="straightConnector1">
             <a:avLst/>
@@ -7299,7 +7407,7 @@
         <p:spPr>
           <a:xfrm flipH="1">
             <a:off x="4397899" y="4533183"/>
-            <a:ext cx="468395" cy="22008"/>
+            <a:ext cx="468395" cy="326816"/>
           </a:xfrm>
           <a:prstGeom prst="straightConnector1">
             <a:avLst/>
@@ -10675,13 +10783,22 @@
               <a:defRPr/>
             </a:pPr>
             <a:r>
-              <a:rPr lang="en-US" sz="1050" kern="0" noProof="0" dirty="0">
+              <a:rPr lang="en-US" sz="800" kern="0" noProof="0" dirty="0" err="1">
                 <a:solidFill>
                   <a:prstClr val="white"/>
                 </a:solidFill>
                 <a:latin typeface="Calibri" panose="020F0502020204030204"/>
               </a:rPr>
-              <a:t>application [*]</a:t>
+              <a:t>managementDomain</a:t>
+            </a:r>
+            <a:r>
+              <a:rPr lang="en-US" sz="800" kern="0" noProof="0" dirty="0">
+                <a:solidFill>
+                  <a:prstClr val="white"/>
+                </a:solidFill>
+                <a:latin typeface="Calibri" panose="020F0502020204030204"/>
+              </a:rPr>
+              <a:t> Interface [*]</a:t>
             </a:r>
           </a:p>
         </p:txBody>
@@ -10700,8 +10817,8 @@
         </p:nvSpPr>
         <p:spPr>
           <a:xfrm>
-            <a:off x="2349500" y="3137714"/>
-            <a:ext cx="2050399" cy="469483"/>
+            <a:off x="1626488" y="3137714"/>
+            <a:ext cx="2773411" cy="814864"/>
           </a:xfrm>
           <a:prstGeom prst="rect">
             <a:avLst/>
@@ -10746,9 +10863,12 @@
                 <a:solidFill>
                   <a:prstClr val="black"/>
                 </a:solidFill>
-                <a:latin typeface="Calibri" panose="020F0502020204030204"/>
-              </a:rPr>
-              <a:t>applicationTemplateName</a:t>
+                <a:highlight>
+                  <a:srgbClr val="FFFF00"/>
+                </a:highlight>
+                <a:latin typeface="Calibri" panose="020F0502020204030204"/>
+              </a:rPr>
+              <a:t>managementDomainInterfaceTemplateName</a:t>
             </a:r>
             <a:r>
               <a:rPr lang="en-US" sz="800" kern="0" noProof="0" dirty="0">
@@ -10769,8 +10889,137 @@
                 </a:solidFill>
                 <a:latin typeface="Calibri" panose="020F0502020204030204"/>
               </a:rPr>
-              <a:t>category=application</a:t>
-            </a:r>
+              <a:t>category=</a:t>
+            </a:r>
+            <a:r>
+              <a:rPr lang="en-US" sz="800" kern="0" noProof="0" dirty="0" err="1">
+                <a:solidFill>
+                  <a:prstClr val="black"/>
+                </a:solidFill>
+                <a:highlight>
+                  <a:srgbClr val="FFFF00"/>
+                </a:highlight>
+                <a:latin typeface="Calibri" panose="020F0502020204030204"/>
+              </a:rPr>
+              <a:t>managementDomainInterfaceTemplate</a:t>
+            </a:r>
+            <a:endParaRPr lang="en-US" sz="800" kern="0" noProof="0" dirty="0">
+              <a:solidFill>
+                <a:prstClr val="black"/>
+              </a:solidFill>
+              <a:highlight>
+                <a:srgbClr val="FFFF00"/>
+              </a:highlight>
+              <a:latin typeface="Calibri" panose="020F0502020204030204"/>
+            </a:endParaRPr>
+          </a:p>
+          <a:p>
+            <a:pPr defTabSz="914411"/>
+            <a:r>
+              <a:rPr lang="de-DE" sz="800" kern="0" dirty="0" err="1">
+                <a:solidFill>
+                  <a:prstClr val="black"/>
+                </a:solidFill>
+                <a:highlight>
+                  <a:srgbClr val="FFFF00"/>
+                </a:highlight>
+                <a:latin typeface="Calibri" panose="020F0502020204030204"/>
+              </a:rPr>
+              <a:t>managerIpAddress</a:t>
+            </a:r>
+            <a:endParaRPr lang="de-DE" sz="800" kern="0" dirty="0">
+              <a:solidFill>
+                <a:prstClr val="black"/>
+              </a:solidFill>
+              <a:highlight>
+                <a:srgbClr val="FFFF00"/>
+              </a:highlight>
+              <a:latin typeface="Calibri" panose="020F0502020204030204"/>
+            </a:endParaRPr>
+          </a:p>
+          <a:p>
+            <a:pPr defTabSz="914411"/>
+            <a:r>
+              <a:rPr lang="de-DE" sz="800" kern="0" dirty="0" err="1">
+                <a:solidFill>
+                  <a:prstClr val="black"/>
+                </a:solidFill>
+                <a:highlight>
+                  <a:srgbClr val="FFFF00"/>
+                </a:highlight>
+                <a:latin typeface="Calibri" panose="020F0502020204030204"/>
+              </a:rPr>
+              <a:t>managerPort</a:t>
+            </a:r>
+            <a:endParaRPr lang="de-DE" sz="800" kern="0" dirty="0">
+              <a:solidFill>
+                <a:prstClr val="black"/>
+              </a:solidFill>
+              <a:highlight>
+                <a:srgbClr val="FFFF00"/>
+              </a:highlight>
+              <a:latin typeface="Calibri" panose="020F0502020204030204"/>
+            </a:endParaRPr>
+          </a:p>
+          <a:p>
+            <a:pPr defTabSz="914411"/>
+            <a:r>
+              <a:rPr lang="de-DE" sz="800" kern="0" dirty="0" err="1">
+                <a:solidFill>
+                  <a:prstClr val="black"/>
+                </a:solidFill>
+                <a:highlight>
+                  <a:srgbClr val="FFFF00"/>
+                </a:highlight>
+                <a:latin typeface="Calibri" panose="020F0502020204030204"/>
+              </a:rPr>
+              <a:t>measureManagementDomainInterfaceService</a:t>
+            </a:r>
+            <a:endParaRPr lang="de-DE" sz="800" kern="0" dirty="0">
+              <a:solidFill>
+                <a:prstClr val="black"/>
+              </a:solidFill>
+              <a:highlight>
+                <a:srgbClr val="FFFF00"/>
+              </a:highlight>
+              <a:latin typeface="Calibri" panose="020F0502020204030204"/>
+            </a:endParaRPr>
+          </a:p>
+          <a:p>
+            <a:pPr defTabSz="914411"/>
+            <a:r>
+              <a:rPr lang="de-DE" sz="800" kern="0" dirty="0" err="1">
+                <a:solidFill>
+                  <a:prstClr val="black"/>
+                </a:solidFill>
+                <a:highlight>
+                  <a:srgbClr val="FFFF00"/>
+                </a:highlight>
+                <a:latin typeface="Calibri" panose="020F0502020204030204"/>
+              </a:rPr>
+              <a:t>mediateManagementDomainInterfaceUpdateService</a:t>
+            </a:r>
+            <a:endParaRPr lang="de-DE" sz="800" kern="0" dirty="0">
+              <a:solidFill>
+                <a:prstClr val="black"/>
+              </a:solidFill>
+              <a:highlight>
+                <a:srgbClr val="FFFF00"/>
+              </a:highlight>
+              <a:latin typeface="Calibri" panose="020F0502020204030204"/>
+            </a:endParaRPr>
+          </a:p>
+          <a:p>
+            <a:pPr defTabSz="914411"/>
+            <a:endParaRPr lang="en-US" sz="800" kern="0" noProof="0" dirty="0">
+              <a:solidFill>
+                <a:prstClr val="black"/>
+              </a:solidFill>
+              <a:highlight>
+                <a:srgbClr val="FFFF00"/>
+              </a:highlight>
+              <a:latin typeface="Calibri" panose="020F0502020204030204"/>
+            </a:endParaRPr>
           </a:p>
         </p:txBody>
       </p:sp>
@@ -10793,7 +11042,7 @@
         <p:spPr>
           <a:xfrm flipH="1">
             <a:off x="4399899" y="3341711"/>
-            <a:ext cx="468394" cy="30745"/>
+            <a:ext cx="468394" cy="203435"/>
           </a:xfrm>
           <a:prstGeom prst="straightConnector1">
             <a:avLst/>
@@ -12902,7 +13151,7 @@
         <p:spPr>
           <a:xfrm>
             <a:off x="33698615" y="13652196"/>
-            <a:ext cx="470210" cy="126211"/>
+            <a:ext cx="470210" cy="237604"/>
           </a:xfrm>
           <a:prstGeom prst="straightConnector1">
             <a:avLst/>
@@ -12934,7 +13183,7 @@
         <p:spPr>
           <a:xfrm>
             <a:off x="34168825" y="13438787"/>
-            <a:ext cx="1150284" cy="679239"/>
+            <a:ext cx="1150284" cy="902025"/>
           </a:xfrm>
           <a:prstGeom prst="rect">
             <a:avLst/>
@@ -13059,6 +13308,54 @@
                 <a:latin typeface="Calibri" panose="020F0502020204030204"/>
               </a:rPr>
               <a:t>notificationStreamName</a:t>
+            </a:r>
+            <a:endParaRPr lang="en-US" sz="800" kern="0" noProof="0" dirty="0">
+              <a:solidFill>
+                <a:prstClr val="black"/>
+              </a:solidFill>
+              <a:highlight>
+                <a:srgbClr val="FFFF00"/>
+              </a:highlight>
+              <a:latin typeface="Calibri" panose="020F0502020204030204"/>
+            </a:endParaRPr>
+          </a:p>
+          <a:p>
+            <a:pPr defTabSz="914411"/>
+            <a:r>
+              <a:rPr lang="en-US" sz="800" kern="0" noProof="0" dirty="0" err="1">
+                <a:solidFill>
+                  <a:prstClr val="black"/>
+                </a:solidFill>
+                <a:highlight>
+                  <a:srgbClr val="FFFF00"/>
+                </a:highlight>
+                <a:latin typeface="Calibri" panose="020F0502020204030204"/>
+              </a:rPr>
+              <a:t>availableCapability</a:t>
+            </a:r>
+            <a:endParaRPr lang="en-US" sz="800" kern="0" noProof="0" dirty="0">
+              <a:solidFill>
+                <a:prstClr val="black"/>
+              </a:solidFill>
+              <a:highlight>
+                <a:srgbClr val="FFFF00"/>
+              </a:highlight>
+              <a:latin typeface="Calibri" panose="020F0502020204030204"/>
+            </a:endParaRPr>
+          </a:p>
+          <a:p>
+            <a:pPr defTabSz="914411"/>
+            <a:r>
+              <a:rPr lang="en-US" sz="800" kern="0" dirty="0" err="1">
+                <a:solidFill>
+                  <a:prstClr val="black"/>
+                </a:solidFill>
+                <a:highlight>
+                  <a:srgbClr val="FFFF00"/>
+                </a:highlight>
+                <a:latin typeface="Calibri" panose="020F0502020204030204"/>
+              </a:rPr>
+              <a:t>unavailableCapability</a:t>
             </a:r>
             <a:endParaRPr lang="en-US" sz="800" kern="0" noProof="0" dirty="0">
               <a:solidFill>
@@ -14157,7 +14454,7 @@
               <a:defRPr/>
             </a:pPr>
             <a:r>
-              <a:rPr lang="en-US" sz="900" kern="0" noProof="0" dirty="0" err="1">
+              <a:rPr lang="en-US" sz="1050" kern="0" noProof="0" dirty="0" err="1">
                 <a:solidFill>
                   <a:prstClr val="white"/>
                 </a:solidFill>
@@ -14166,7 +14463,7 @@
               <a:t>mountPoint</a:t>
             </a:r>
             <a:r>
-              <a:rPr lang="en-US" sz="900" kern="0" noProof="0" dirty="0">
+              <a:rPr lang="en-US" sz="1050" kern="0" noProof="0" dirty="0">
                 <a:solidFill>
                   <a:prstClr val="white"/>
                 </a:solidFill>
@@ -14191,8 +14488,8 @@
         </p:nvSpPr>
         <p:spPr>
           <a:xfrm>
-            <a:off x="2356182" y="4935829"/>
-            <a:ext cx="2050399" cy="574031"/>
+            <a:off x="2356182" y="5240637"/>
+            <a:ext cx="2050399" cy="672569"/>
           </a:xfrm>
           <a:prstGeom prst="rect">
             <a:avLst/>
@@ -14319,6 +14616,18 @@
           </a:p>
           <a:p>
             <a:pPr defTabSz="914411"/>
+            <a:r>
+              <a:rPr lang="en-US" sz="800" kern="0" dirty="0">
+                <a:solidFill>
+                  <a:prstClr val="black"/>
+                </a:solidFill>
+                <a:highlight>
+                  <a:srgbClr val="FFFF00"/>
+                </a:highlight>
+                <a:latin typeface="Calibri" panose="020F0502020204030204"/>
+              </a:rPr>
+              <a:t>… and many more</a:t>
+            </a:r>
             <a:endParaRPr lang="en-US" sz="800" kern="0" noProof="0" dirty="0">
               <a:solidFill>
                 <a:prstClr val="black"/>
@@ -14335,6 +14644,18 @@
               <a:solidFill>
                 <a:prstClr val="black"/>
               </a:solidFill>
+              <a:highlight>
+                <a:srgbClr val="FFFF00"/>
+              </a:highlight>
+              <a:latin typeface="Calibri" panose="020F0502020204030204"/>
+            </a:endParaRPr>
+          </a:p>
+          <a:p>
+            <a:pPr defTabSz="914411"/>
+            <a:endParaRPr lang="en-US" sz="800" kern="0" noProof="0" dirty="0">
+              <a:solidFill>
+                <a:prstClr val="black"/>
+              </a:solidFill>
               <a:latin typeface="Calibri" panose="020F0502020204030204"/>
             </a:endParaRPr>
           </a:p>
@@ -14359,7 +14680,7 @@
         <p:spPr>
           <a:xfrm flipH="1">
             <a:off x="4406581" y="5118269"/>
-            <a:ext cx="468395" cy="104576"/>
+            <a:ext cx="468395" cy="458653"/>
           </a:xfrm>
           <a:prstGeom prst="straightConnector1">
             <a:avLst/>
@@ -14412,6 +14733,610 @@
           <a:effectLst/>
         </p:spPr>
       </p:cxnSp>
+      <p:sp>
+        <p:nvSpPr>
+          <p:cNvPr id="45" name="Rechteck 44">
+            <a:extLst>
+              <a:ext uri="{FF2B5EF4-FFF2-40B4-BE49-F238E27FC236}">
+                <a16:creationId xmlns:a16="http://schemas.microsoft.com/office/drawing/2014/main" id="{09E486BB-D8D2-9E1C-578A-9ED3A1B46609}"/>
+              </a:ext>
+            </a:extLst>
+          </p:cNvPr>
+          <p:cNvSpPr/>
+          <p:nvPr/>
+        </p:nvSpPr>
+        <p:spPr>
+          <a:xfrm>
+            <a:off x="3361788" y="13028590"/>
+            <a:ext cx="8168685" cy="914400"/>
+          </a:xfrm>
+          <a:prstGeom prst="rect">
+            <a:avLst/>
+          </a:prstGeom>
+          <a:solidFill>
+            <a:srgbClr val="FFFF00"/>
+          </a:solidFill>
+          <a:ln w="6350"/>
+        </p:spPr>
+        <p:style>
+          <a:lnRef idx="2">
+            <a:schemeClr val="accent1">
+              <a:shade val="15000"/>
+            </a:schemeClr>
+          </a:lnRef>
+          <a:fillRef idx="1">
+            <a:schemeClr val="accent1"/>
+          </a:fillRef>
+          <a:effectRef idx="0">
+            <a:schemeClr val="accent1"/>
+          </a:effectRef>
+          <a:fontRef idx="minor">
+            <a:schemeClr val="lt1"/>
+          </a:fontRef>
+        </p:style>
+        <p:txBody>
+          <a:bodyPr rtlCol="0" anchor="t"/>
+          <a:lstStyle/>
+          <a:p>
+            <a:r>
+              <a:rPr lang="de-DE" sz="800" dirty="0">
+                <a:solidFill>
+                  <a:schemeClr val="tx1"/>
+                </a:solidFill>
+                <a:latin typeface="Calibri" panose="020F0502020204030204" pitchFamily="34" charset="0"/>
+                <a:ea typeface="Calibri" panose="020F0502020204030204" pitchFamily="34" charset="0"/>
+                <a:cs typeface="Calibri" panose="020F0502020204030204" pitchFamily="34" charset="0"/>
+              </a:rPr>
+              <a:t>Es könnte sein, dass der Controller </a:t>
+            </a:r>
+            <a:r>
+              <a:rPr lang="de-DE" sz="800" dirty="0" err="1">
+                <a:solidFill>
+                  <a:schemeClr val="tx1"/>
+                </a:solidFill>
+                <a:latin typeface="Calibri" panose="020F0502020204030204" pitchFamily="34" charset="0"/>
+                <a:ea typeface="Calibri" panose="020F0502020204030204" pitchFamily="34" charset="0"/>
+                <a:cs typeface="Calibri" panose="020F0502020204030204" pitchFamily="34" charset="0"/>
+              </a:rPr>
+              <a:t>username</a:t>
+            </a:r>
+            <a:r>
+              <a:rPr lang="de-DE" sz="800" dirty="0">
+                <a:solidFill>
+                  <a:schemeClr val="tx1"/>
+                </a:solidFill>
+                <a:latin typeface="Calibri" panose="020F0502020204030204" pitchFamily="34" charset="0"/>
+                <a:ea typeface="Calibri" panose="020F0502020204030204" pitchFamily="34" charset="0"/>
+                <a:cs typeface="Calibri" panose="020F0502020204030204" pitchFamily="34" charset="0"/>
+              </a:rPr>
+              <a:t>/</a:t>
+            </a:r>
+            <a:r>
+              <a:rPr lang="de-DE" sz="800" dirty="0" err="1">
+                <a:solidFill>
+                  <a:schemeClr val="tx1"/>
+                </a:solidFill>
+                <a:latin typeface="Calibri" panose="020F0502020204030204" pitchFamily="34" charset="0"/>
+                <a:ea typeface="Calibri" panose="020F0502020204030204" pitchFamily="34" charset="0"/>
+                <a:cs typeface="Calibri" panose="020F0502020204030204" pitchFamily="34" charset="0"/>
+              </a:rPr>
+              <a:t>passwort</a:t>
+            </a:r>
+            <a:r>
+              <a:rPr lang="de-DE" sz="800" dirty="0">
+                <a:solidFill>
+                  <a:schemeClr val="tx1"/>
+                </a:solidFill>
+                <a:latin typeface="Calibri" panose="020F0502020204030204" pitchFamily="34" charset="0"/>
+                <a:ea typeface="Calibri" panose="020F0502020204030204" pitchFamily="34" charset="0"/>
+                <a:cs typeface="Calibri" panose="020F0502020204030204" pitchFamily="34" charset="0"/>
+              </a:rPr>
+              <a:t> erwartet.</a:t>
+            </a:r>
+          </a:p>
+          <a:p>
+            <a:r>
+              <a:rPr lang="de-DE" sz="800" dirty="0">
+                <a:solidFill>
+                  <a:schemeClr val="tx1"/>
+                </a:solidFill>
+                <a:latin typeface="Calibri" panose="020F0502020204030204" pitchFamily="34" charset="0"/>
+                <a:ea typeface="Calibri" panose="020F0502020204030204" pitchFamily="34" charset="0"/>
+                <a:cs typeface="Calibri" panose="020F0502020204030204" pitchFamily="34" charset="0"/>
+              </a:rPr>
+              <a:t>Sollte dies der Fall sein:</a:t>
+            </a:r>
+          </a:p>
+          <a:p>
+            <a:pPr marL="171450" indent="-171450">
+              <a:buFontTx/>
+              <a:buChar char="-"/>
+            </a:pPr>
+            <a:r>
+              <a:rPr lang="de-DE" sz="800" dirty="0">
+                <a:solidFill>
+                  <a:schemeClr val="tx1"/>
+                </a:solidFill>
+                <a:latin typeface="Calibri" panose="020F0502020204030204" pitchFamily="34" charset="0"/>
+                <a:ea typeface="Calibri" panose="020F0502020204030204" pitchFamily="34" charset="0"/>
+                <a:cs typeface="Calibri" panose="020F0502020204030204" pitchFamily="34" charset="0"/>
+              </a:rPr>
+              <a:t>Einführung eines </a:t>
+            </a:r>
+            <a:r>
+              <a:rPr lang="de-DE" sz="800" dirty="0" err="1">
+                <a:solidFill>
+                  <a:schemeClr val="tx1"/>
+                </a:solidFill>
+                <a:latin typeface="Calibri" panose="020F0502020204030204" pitchFamily="34" charset="0"/>
+                <a:ea typeface="Calibri" panose="020F0502020204030204" pitchFamily="34" charset="0"/>
+                <a:cs typeface="Calibri" panose="020F0502020204030204" pitchFamily="34" charset="0"/>
+              </a:rPr>
+              <a:t>Application</a:t>
+            </a:r>
+            <a:r>
+              <a:rPr lang="de-DE" sz="800" dirty="0">
+                <a:solidFill>
+                  <a:schemeClr val="tx1"/>
+                </a:solidFill>
+                <a:latin typeface="Calibri" panose="020F0502020204030204" pitchFamily="34" charset="0"/>
+                <a:ea typeface="Calibri" panose="020F0502020204030204" pitchFamily="34" charset="0"/>
+                <a:cs typeface="Calibri" panose="020F0502020204030204" pitchFamily="34" charset="0"/>
+              </a:rPr>
+              <a:t>::</a:t>
+            </a:r>
+            <a:r>
+              <a:rPr lang="de-DE" sz="800" dirty="0" err="1">
+                <a:solidFill>
+                  <a:schemeClr val="tx1"/>
+                </a:solidFill>
+                <a:latin typeface="Calibri" panose="020F0502020204030204" pitchFamily="34" charset="0"/>
+                <a:ea typeface="Calibri" panose="020F0502020204030204" pitchFamily="34" charset="0"/>
+                <a:cs typeface="Calibri" panose="020F0502020204030204" pitchFamily="34" charset="0"/>
+              </a:rPr>
+              <a:t>RestClients</a:t>
+            </a:r>
+            <a:r>
+              <a:rPr lang="de-DE" sz="800" dirty="0">
+                <a:solidFill>
+                  <a:schemeClr val="tx1"/>
+                </a:solidFill>
+                <a:latin typeface="Calibri" panose="020F0502020204030204" pitchFamily="34" charset="0"/>
+                <a:ea typeface="Calibri" panose="020F0502020204030204" pitchFamily="34" charset="0"/>
+                <a:cs typeface="Calibri" panose="020F0502020204030204" pitchFamily="34" charset="0"/>
+              </a:rPr>
+              <a:t> und eines Controller::</a:t>
+            </a:r>
+            <a:r>
+              <a:rPr lang="de-DE" sz="800" dirty="0" err="1">
+                <a:solidFill>
+                  <a:schemeClr val="tx1"/>
+                </a:solidFill>
+                <a:latin typeface="Calibri" panose="020F0502020204030204" pitchFamily="34" charset="0"/>
+                <a:ea typeface="Calibri" panose="020F0502020204030204" pitchFamily="34" charset="0"/>
+                <a:cs typeface="Calibri" panose="020F0502020204030204" pitchFamily="34" charset="0"/>
+              </a:rPr>
+              <a:t>RestServers</a:t>
+            </a:r>
+            <a:endParaRPr lang="de-DE" sz="800" dirty="0">
+              <a:solidFill>
+                <a:schemeClr val="tx1"/>
+              </a:solidFill>
+              <a:latin typeface="Calibri" panose="020F0502020204030204" pitchFamily="34" charset="0"/>
+              <a:ea typeface="Calibri" panose="020F0502020204030204" pitchFamily="34" charset="0"/>
+              <a:cs typeface="Calibri" panose="020F0502020204030204" pitchFamily="34" charset="0"/>
+            </a:endParaRPr>
+          </a:p>
+          <a:p>
+            <a:pPr marL="171450" indent="-171450">
+              <a:buFontTx/>
+              <a:buChar char="-"/>
+            </a:pPr>
+            <a:r>
+              <a:rPr lang="de-DE" sz="800" dirty="0">
+                <a:solidFill>
+                  <a:schemeClr val="tx1"/>
+                </a:solidFill>
+                <a:latin typeface="Calibri" panose="020F0502020204030204" pitchFamily="34" charset="0"/>
+                <a:ea typeface="Calibri" panose="020F0502020204030204" pitchFamily="34" charset="0"/>
+                <a:cs typeface="Calibri" panose="020F0502020204030204" pitchFamily="34" charset="0"/>
+              </a:rPr>
+              <a:t>Einführung eines </a:t>
+            </a:r>
+            <a:r>
+              <a:rPr lang="de-DE" sz="800" dirty="0" err="1">
+                <a:solidFill>
+                  <a:schemeClr val="tx1"/>
+                </a:solidFill>
+                <a:latin typeface="Calibri" panose="020F0502020204030204" pitchFamily="34" charset="0"/>
+                <a:ea typeface="Calibri" panose="020F0502020204030204" pitchFamily="34" charset="0"/>
+                <a:cs typeface="Calibri" panose="020F0502020204030204" pitchFamily="34" charset="0"/>
+              </a:rPr>
+              <a:t>RestLinks</a:t>
+            </a:r>
+            <a:r>
+              <a:rPr lang="de-DE" sz="800" dirty="0">
+                <a:solidFill>
+                  <a:schemeClr val="tx1"/>
+                </a:solidFill>
+                <a:latin typeface="Calibri" panose="020F0502020204030204" pitchFamily="34" charset="0"/>
+                <a:ea typeface="Calibri" panose="020F0502020204030204" pitchFamily="34" charset="0"/>
+                <a:cs typeface="Calibri" panose="020F0502020204030204" pitchFamily="34" charset="0"/>
+              </a:rPr>
+              <a:t> von </a:t>
+            </a:r>
+            <a:r>
+              <a:rPr lang="de-DE" sz="800" dirty="0" err="1">
+                <a:solidFill>
+                  <a:schemeClr val="tx1"/>
+                </a:solidFill>
+                <a:latin typeface="Calibri" panose="020F0502020204030204" pitchFamily="34" charset="0"/>
+                <a:ea typeface="Calibri" panose="020F0502020204030204" pitchFamily="34" charset="0"/>
+                <a:cs typeface="Calibri" panose="020F0502020204030204" pitchFamily="34" charset="0"/>
+              </a:rPr>
+              <a:t>Application</a:t>
+            </a:r>
+            <a:r>
+              <a:rPr lang="de-DE" sz="800" dirty="0">
+                <a:solidFill>
+                  <a:schemeClr val="tx1"/>
+                </a:solidFill>
+                <a:latin typeface="Calibri" panose="020F0502020204030204" pitchFamily="34" charset="0"/>
+                <a:ea typeface="Calibri" panose="020F0502020204030204" pitchFamily="34" charset="0"/>
+                <a:cs typeface="Calibri" panose="020F0502020204030204" pitchFamily="34" charset="0"/>
+              </a:rPr>
+              <a:t> bis Controller</a:t>
+            </a:r>
+          </a:p>
+          <a:p>
+            <a:pPr marL="171450" indent="-171450">
+              <a:buFontTx/>
+              <a:buChar char="-"/>
+            </a:pPr>
+            <a:r>
+              <a:rPr lang="de-DE" sz="800" dirty="0" err="1">
+                <a:solidFill>
+                  <a:schemeClr val="tx1"/>
+                </a:solidFill>
+                <a:latin typeface="Calibri" panose="020F0502020204030204" pitchFamily="34" charset="0"/>
+                <a:ea typeface="Calibri" panose="020F0502020204030204" pitchFamily="34" charset="0"/>
+                <a:cs typeface="Calibri" panose="020F0502020204030204" pitchFamily="34" charset="0"/>
+              </a:rPr>
+              <a:t>complement</a:t>
+            </a:r>
+            <a:r>
+              <a:rPr lang="de-DE" sz="800" dirty="0">
+                <a:solidFill>
+                  <a:schemeClr val="tx1"/>
+                </a:solidFill>
+                <a:latin typeface="Calibri" panose="020F0502020204030204" pitchFamily="34" charset="0"/>
+                <a:ea typeface="Calibri" panose="020F0502020204030204" pitchFamily="34" charset="0"/>
+                <a:cs typeface="Calibri" panose="020F0502020204030204" pitchFamily="34" charset="0"/>
+              </a:rPr>
+              <a:t> /v1/</a:t>
+            </a:r>
+            <a:r>
+              <a:rPr lang="de-DE" sz="800" dirty="0" err="1">
+                <a:solidFill>
+                  <a:schemeClr val="tx1"/>
+                </a:solidFill>
+                <a:latin typeface="Calibri" panose="020F0502020204030204" pitchFamily="34" charset="0"/>
+                <a:ea typeface="Calibri" panose="020F0502020204030204" pitchFamily="34" charset="0"/>
+                <a:cs typeface="Calibri" panose="020F0502020204030204" pitchFamily="34" charset="0"/>
+              </a:rPr>
+              <a:t>establish</a:t>
+            </a:r>
+            <a:r>
+              <a:rPr lang="de-DE" sz="800" dirty="0">
+                <a:solidFill>
+                  <a:schemeClr val="tx1"/>
+                </a:solidFill>
+                <a:latin typeface="Calibri" panose="020F0502020204030204" pitchFamily="34" charset="0"/>
+                <a:ea typeface="Calibri" panose="020F0502020204030204" pitchFamily="34" charset="0"/>
+                <a:cs typeface="Calibri" panose="020F0502020204030204" pitchFamily="34" charset="0"/>
+              </a:rPr>
+              <a:t>-management-domain-connection </a:t>
+            </a:r>
+            <a:r>
+              <a:rPr lang="de-DE" sz="800" dirty="0" err="1">
+                <a:solidFill>
+                  <a:schemeClr val="tx1"/>
+                </a:solidFill>
+                <a:latin typeface="Calibri" panose="020F0502020204030204" pitchFamily="34" charset="0"/>
+                <a:ea typeface="Calibri" panose="020F0502020204030204" pitchFamily="34" charset="0"/>
+                <a:cs typeface="Calibri" panose="020F0502020204030204" pitchFamily="34" charset="0"/>
+              </a:rPr>
+              <a:t>by</a:t>
+            </a:r>
+            <a:r>
+              <a:rPr lang="de-DE" sz="800" dirty="0">
+                <a:solidFill>
+                  <a:schemeClr val="tx1"/>
+                </a:solidFill>
+                <a:latin typeface="Calibri" panose="020F0502020204030204" pitchFamily="34" charset="0"/>
+                <a:ea typeface="Calibri" panose="020F0502020204030204" pitchFamily="34" charset="0"/>
+                <a:cs typeface="Calibri" panose="020F0502020204030204" pitchFamily="34" charset="0"/>
+              </a:rPr>
+              <a:t> </a:t>
+            </a:r>
+            <a:r>
+              <a:rPr lang="de-DE" sz="800" dirty="0" err="1">
+                <a:solidFill>
+                  <a:schemeClr val="tx1"/>
+                </a:solidFill>
+                <a:latin typeface="Calibri" panose="020F0502020204030204" pitchFamily="34" charset="0"/>
+                <a:ea typeface="Calibri" panose="020F0502020204030204" pitchFamily="34" charset="0"/>
+                <a:cs typeface="Calibri" panose="020F0502020204030204" pitchFamily="34" charset="0"/>
+              </a:rPr>
+              <a:t>creation</a:t>
+            </a:r>
+            <a:r>
+              <a:rPr lang="de-DE" sz="800" dirty="0">
+                <a:solidFill>
+                  <a:schemeClr val="tx1"/>
+                </a:solidFill>
+                <a:latin typeface="Calibri" panose="020F0502020204030204" pitchFamily="34" charset="0"/>
+                <a:ea typeface="Calibri" panose="020F0502020204030204" pitchFamily="34" charset="0"/>
+                <a:cs typeface="Calibri" panose="020F0502020204030204" pitchFamily="34" charset="0"/>
+              </a:rPr>
+              <a:t> </a:t>
+            </a:r>
+            <a:r>
+              <a:rPr lang="de-DE" sz="800" dirty="0" err="1">
+                <a:solidFill>
+                  <a:schemeClr val="tx1"/>
+                </a:solidFill>
+                <a:latin typeface="Calibri" panose="020F0502020204030204" pitchFamily="34" charset="0"/>
+                <a:ea typeface="Calibri" panose="020F0502020204030204" pitchFamily="34" charset="0"/>
+                <a:cs typeface="Calibri" panose="020F0502020204030204" pitchFamily="34" charset="0"/>
+              </a:rPr>
+              <a:t>of</a:t>
+            </a:r>
+            <a:r>
+              <a:rPr lang="de-DE" sz="800" dirty="0">
+                <a:solidFill>
+                  <a:schemeClr val="tx1"/>
+                </a:solidFill>
+                <a:latin typeface="Calibri" panose="020F0502020204030204" pitchFamily="34" charset="0"/>
+                <a:ea typeface="Calibri" panose="020F0502020204030204" pitchFamily="34" charset="0"/>
+                <a:cs typeface="Calibri" panose="020F0502020204030204" pitchFamily="34" charset="0"/>
+              </a:rPr>
+              <a:t> </a:t>
+            </a:r>
+            <a:r>
+              <a:rPr lang="de-DE" sz="800" dirty="0" err="1">
+                <a:solidFill>
+                  <a:schemeClr val="tx1"/>
+                </a:solidFill>
+                <a:latin typeface="Calibri" panose="020F0502020204030204" pitchFamily="34" charset="0"/>
+                <a:ea typeface="Calibri" panose="020F0502020204030204" pitchFamily="34" charset="0"/>
+                <a:cs typeface="Calibri" panose="020F0502020204030204" pitchFamily="34" charset="0"/>
+              </a:rPr>
+              <a:t>RestLink</a:t>
+            </a:r>
+            <a:r>
+              <a:rPr lang="de-DE" sz="800" dirty="0">
+                <a:solidFill>
+                  <a:schemeClr val="tx1"/>
+                </a:solidFill>
+                <a:latin typeface="Calibri" panose="020F0502020204030204" pitchFamily="34" charset="0"/>
+                <a:ea typeface="Calibri" panose="020F0502020204030204" pitchFamily="34" charset="0"/>
+                <a:cs typeface="Calibri" panose="020F0502020204030204" pitchFamily="34" charset="0"/>
+              </a:rPr>
+              <a:t>(s) ; </a:t>
+            </a:r>
+            <a:r>
+              <a:rPr lang="de-DE" sz="800" dirty="0" err="1">
+                <a:solidFill>
+                  <a:schemeClr val="tx1"/>
+                </a:solidFill>
+                <a:latin typeface="Calibri" panose="020F0502020204030204" pitchFamily="34" charset="0"/>
+                <a:ea typeface="Calibri" panose="020F0502020204030204" pitchFamily="34" charset="0"/>
+                <a:cs typeface="Calibri" panose="020F0502020204030204" pitchFamily="34" charset="0"/>
+              </a:rPr>
+              <a:t>don‘t</a:t>
+            </a:r>
+            <a:r>
+              <a:rPr lang="de-DE" sz="800" dirty="0">
+                <a:solidFill>
+                  <a:schemeClr val="tx1"/>
+                </a:solidFill>
+                <a:latin typeface="Calibri" panose="020F0502020204030204" pitchFamily="34" charset="0"/>
+                <a:ea typeface="Calibri" panose="020F0502020204030204" pitchFamily="34" charset="0"/>
+                <a:cs typeface="Calibri" panose="020F0502020204030204" pitchFamily="34" charset="0"/>
+              </a:rPr>
+              <a:t> route </a:t>
+            </a:r>
+            <a:r>
+              <a:rPr lang="de-DE" sz="800" dirty="0" err="1">
+                <a:solidFill>
+                  <a:schemeClr val="tx1"/>
+                </a:solidFill>
+                <a:latin typeface="Calibri" panose="020F0502020204030204" pitchFamily="34" charset="0"/>
+                <a:ea typeface="Calibri" panose="020F0502020204030204" pitchFamily="34" charset="0"/>
+                <a:cs typeface="Calibri" panose="020F0502020204030204" pitchFamily="34" charset="0"/>
+              </a:rPr>
+              <a:t>them</a:t>
+            </a:r>
+            <a:r>
+              <a:rPr lang="de-DE" sz="800" dirty="0">
+                <a:solidFill>
+                  <a:schemeClr val="tx1"/>
+                </a:solidFill>
+                <a:latin typeface="Calibri" panose="020F0502020204030204" pitchFamily="34" charset="0"/>
+                <a:ea typeface="Calibri" panose="020F0502020204030204" pitchFamily="34" charset="0"/>
+                <a:cs typeface="Calibri" panose="020F0502020204030204" pitchFamily="34" charset="0"/>
+              </a:rPr>
+              <a:t> on </a:t>
+            </a:r>
+            <a:r>
+              <a:rPr lang="de-DE" sz="800" dirty="0" err="1">
+                <a:solidFill>
+                  <a:schemeClr val="tx1"/>
+                </a:solidFill>
+                <a:latin typeface="Calibri" panose="020F0502020204030204" pitchFamily="34" charset="0"/>
+                <a:ea typeface="Calibri" panose="020F0502020204030204" pitchFamily="34" charset="0"/>
+                <a:cs typeface="Calibri" panose="020F0502020204030204" pitchFamily="34" charset="0"/>
+              </a:rPr>
+              <a:t>TcpLinks</a:t>
+            </a:r>
+            <a:r>
+              <a:rPr lang="de-DE" sz="800" dirty="0">
+                <a:solidFill>
+                  <a:schemeClr val="tx1"/>
+                </a:solidFill>
+                <a:latin typeface="Calibri" panose="020F0502020204030204" pitchFamily="34" charset="0"/>
+                <a:ea typeface="Calibri" panose="020F0502020204030204" pitchFamily="34" charset="0"/>
+                <a:cs typeface="Calibri" panose="020F0502020204030204" pitchFamily="34" charset="0"/>
+              </a:rPr>
+              <a:t> ; </a:t>
+            </a:r>
+            <a:r>
+              <a:rPr lang="de-DE" sz="800" dirty="0" err="1">
+                <a:solidFill>
+                  <a:schemeClr val="tx1"/>
+                </a:solidFill>
+                <a:latin typeface="Calibri" panose="020F0502020204030204" pitchFamily="34" charset="0"/>
+                <a:ea typeface="Calibri" panose="020F0502020204030204" pitchFamily="34" charset="0"/>
+                <a:cs typeface="Calibri" panose="020F0502020204030204" pitchFamily="34" charset="0"/>
+              </a:rPr>
+              <a:t>don‘t</a:t>
+            </a:r>
+            <a:r>
+              <a:rPr lang="de-DE" sz="800" dirty="0">
+                <a:solidFill>
+                  <a:schemeClr val="tx1"/>
+                </a:solidFill>
+                <a:latin typeface="Calibri" panose="020F0502020204030204" pitchFamily="34" charset="0"/>
+                <a:ea typeface="Calibri" panose="020F0502020204030204" pitchFamily="34" charset="0"/>
+                <a:cs typeface="Calibri" panose="020F0502020204030204" pitchFamily="34" charset="0"/>
+              </a:rPr>
+              <a:t> </a:t>
+            </a:r>
+            <a:r>
+              <a:rPr lang="de-DE" sz="800" dirty="0" err="1">
+                <a:solidFill>
+                  <a:schemeClr val="tx1"/>
+                </a:solidFill>
+                <a:latin typeface="Calibri" panose="020F0502020204030204" pitchFamily="34" charset="0"/>
+                <a:ea typeface="Calibri" panose="020F0502020204030204" pitchFamily="34" charset="0"/>
+                <a:cs typeface="Calibri" panose="020F0502020204030204" pitchFamily="34" charset="0"/>
+              </a:rPr>
+              <a:t>integrate</a:t>
+            </a:r>
+            <a:r>
+              <a:rPr lang="de-DE" sz="800" dirty="0">
+                <a:solidFill>
+                  <a:schemeClr val="tx1"/>
+                </a:solidFill>
+                <a:latin typeface="Calibri" panose="020F0502020204030204" pitchFamily="34" charset="0"/>
+                <a:ea typeface="Calibri" panose="020F0502020204030204" pitchFamily="34" charset="0"/>
+                <a:cs typeface="Calibri" panose="020F0502020204030204" pitchFamily="34" charset="0"/>
+              </a:rPr>
+              <a:t> </a:t>
+            </a:r>
+            <a:r>
+              <a:rPr lang="de-DE" sz="800" dirty="0" err="1">
+                <a:solidFill>
+                  <a:schemeClr val="tx1"/>
+                </a:solidFill>
+                <a:latin typeface="Calibri" panose="020F0502020204030204" pitchFamily="34" charset="0"/>
+                <a:ea typeface="Calibri" panose="020F0502020204030204" pitchFamily="34" charset="0"/>
+                <a:cs typeface="Calibri" panose="020F0502020204030204" pitchFamily="34" charset="0"/>
+              </a:rPr>
+              <a:t>them</a:t>
+            </a:r>
+            <a:r>
+              <a:rPr lang="de-DE" sz="800" dirty="0">
+                <a:solidFill>
+                  <a:schemeClr val="tx1"/>
+                </a:solidFill>
+                <a:latin typeface="Calibri" panose="020F0502020204030204" pitchFamily="34" charset="0"/>
+                <a:ea typeface="Calibri" panose="020F0502020204030204" pitchFamily="34" charset="0"/>
+                <a:cs typeface="Calibri" panose="020F0502020204030204" pitchFamily="34" charset="0"/>
+              </a:rPr>
+              <a:t> </a:t>
+            </a:r>
+            <a:r>
+              <a:rPr lang="de-DE" sz="800" dirty="0" err="1">
+                <a:solidFill>
+                  <a:schemeClr val="tx1"/>
+                </a:solidFill>
+                <a:latin typeface="Calibri" panose="020F0502020204030204" pitchFamily="34" charset="0"/>
+                <a:ea typeface="Calibri" panose="020F0502020204030204" pitchFamily="34" charset="0"/>
+                <a:cs typeface="Calibri" panose="020F0502020204030204" pitchFamily="34" charset="0"/>
+              </a:rPr>
+              <a:t>into</a:t>
+            </a:r>
+            <a:r>
+              <a:rPr lang="de-DE" sz="800" dirty="0">
+                <a:solidFill>
+                  <a:schemeClr val="tx1"/>
+                </a:solidFill>
+                <a:latin typeface="Calibri" panose="020F0502020204030204" pitchFamily="34" charset="0"/>
+                <a:ea typeface="Calibri" panose="020F0502020204030204" pitchFamily="34" charset="0"/>
+                <a:cs typeface="Calibri" panose="020F0502020204030204" pitchFamily="34" charset="0"/>
+              </a:rPr>
+              <a:t> </a:t>
+            </a:r>
+            <a:r>
+              <a:rPr lang="de-DE" sz="800" dirty="0" err="1">
+                <a:solidFill>
+                  <a:schemeClr val="tx1"/>
+                </a:solidFill>
+                <a:latin typeface="Calibri" panose="020F0502020204030204" pitchFamily="34" charset="0"/>
+                <a:ea typeface="Calibri" panose="020F0502020204030204" pitchFamily="34" charset="0"/>
+                <a:cs typeface="Calibri" panose="020F0502020204030204" pitchFamily="34" charset="0"/>
+              </a:rPr>
+              <a:t>operationalState</a:t>
+            </a:r>
+            <a:r>
+              <a:rPr lang="de-DE" sz="800" dirty="0">
+                <a:solidFill>
+                  <a:schemeClr val="tx1"/>
+                </a:solidFill>
+                <a:latin typeface="Calibri" panose="020F0502020204030204" pitchFamily="34" charset="0"/>
+                <a:ea typeface="Calibri" panose="020F0502020204030204" pitchFamily="34" charset="0"/>
+                <a:cs typeface="Calibri" panose="020F0502020204030204" pitchFamily="34" charset="0"/>
+              </a:rPr>
+              <a:t> </a:t>
+            </a:r>
+            <a:r>
+              <a:rPr lang="de-DE" sz="800" dirty="0" err="1">
+                <a:solidFill>
+                  <a:schemeClr val="tx1"/>
+                </a:solidFill>
+                <a:latin typeface="Calibri" panose="020F0502020204030204" pitchFamily="34" charset="0"/>
+                <a:ea typeface="Calibri" panose="020F0502020204030204" pitchFamily="34" charset="0"/>
+                <a:cs typeface="Calibri" panose="020F0502020204030204" pitchFamily="34" charset="0"/>
+              </a:rPr>
+              <a:t>calculation</a:t>
+            </a:r>
+            <a:endParaRPr lang="de-DE" sz="800" dirty="0">
+              <a:solidFill>
+                <a:schemeClr val="tx1"/>
+              </a:solidFill>
+              <a:latin typeface="Calibri" panose="020F0502020204030204" pitchFamily="34" charset="0"/>
+              <a:ea typeface="Calibri" panose="020F0502020204030204" pitchFamily="34" charset="0"/>
+              <a:cs typeface="Calibri" panose="020F0502020204030204" pitchFamily="34" charset="0"/>
+            </a:endParaRPr>
+          </a:p>
+          <a:p>
+            <a:pPr marL="171450" indent="-171450">
+              <a:buFontTx/>
+              <a:buChar char="-"/>
+            </a:pPr>
+            <a:endParaRPr lang="de-DE" sz="800" dirty="0">
+              <a:solidFill>
+                <a:schemeClr val="tx1"/>
+              </a:solidFill>
+              <a:latin typeface="Calibri" panose="020F0502020204030204" pitchFamily="34" charset="0"/>
+              <a:ea typeface="Calibri" panose="020F0502020204030204" pitchFamily="34" charset="0"/>
+              <a:cs typeface="Calibri" panose="020F0502020204030204" pitchFamily="34" charset="0"/>
+            </a:endParaRPr>
+          </a:p>
+        </p:txBody>
+      </p:sp>
     </p:spTree>
     <p:extLst>
       <p:ext uri="{BB962C8B-B14F-4D97-AF65-F5344CB8AC3E}">
@@ -21014,36 +21939,6 @@
           </a:p>
         </p:txBody>
       </p:sp>
-      <p:pic>
-        <p:nvPicPr>
-          <p:cNvPr id="22" name="Grafik 21">
-            <a:extLst>
-              <a:ext uri="{FF2B5EF4-FFF2-40B4-BE49-F238E27FC236}">
-                <a16:creationId xmlns:a16="http://schemas.microsoft.com/office/drawing/2014/main" id="{886A27DD-C9F0-DC50-F102-4D63B907E29A}"/>
-              </a:ext>
-            </a:extLst>
-          </p:cNvPr>
-          <p:cNvPicPr>
-            <a:picLocks noChangeAspect="1"/>
-          </p:cNvPicPr>
-          <p:nvPr/>
-        </p:nvPicPr>
-        <p:blipFill>
-          <a:blip r:embed="rId2"/>
-          <a:stretch>
-            <a:fillRect/>
-          </a:stretch>
-        </p:blipFill>
-        <p:spPr>
-          <a:xfrm>
-            <a:off x="19608719" y="7997466"/>
-            <a:ext cx="166165" cy="174914"/>
-          </a:xfrm>
-          <a:prstGeom prst="rect">
-            <a:avLst/>
-          </a:prstGeom>
-        </p:spPr>
-      </p:pic>
       <p:sp>
         <p:nvSpPr>
           <p:cNvPr id="30" name="Textfeld 29">
@@ -21129,36 +22024,6 @@
           </a:p>
         </p:txBody>
       </p:sp>
-      <p:pic>
-        <p:nvPicPr>
-          <p:cNvPr id="32" name="Grafik 31">
-            <a:extLst>
-              <a:ext uri="{FF2B5EF4-FFF2-40B4-BE49-F238E27FC236}">
-                <a16:creationId xmlns:a16="http://schemas.microsoft.com/office/drawing/2014/main" id="{AB09B62C-A946-E9FF-4720-224648348961}"/>
-              </a:ext>
-            </a:extLst>
-          </p:cNvPr>
-          <p:cNvPicPr>
-            <a:picLocks noChangeAspect="1"/>
-          </p:cNvPicPr>
-          <p:nvPr/>
-        </p:nvPicPr>
-        <p:blipFill>
-          <a:blip r:embed="rId2"/>
-          <a:stretch>
-            <a:fillRect/>
-          </a:stretch>
-        </p:blipFill>
-        <p:spPr>
-          <a:xfrm>
-            <a:off x="19651391" y="7368815"/>
-            <a:ext cx="166165" cy="174914"/>
-          </a:xfrm>
-          <a:prstGeom prst="rect">
-            <a:avLst/>
-          </a:prstGeom>
-        </p:spPr>
-      </p:pic>
       <p:sp>
         <p:nvSpPr>
           <p:cNvPr id="33" name="Rechteck 32">
@@ -21209,36 +22074,6 @@
           </a:p>
         </p:txBody>
       </p:sp>
-      <p:pic>
-        <p:nvPicPr>
-          <p:cNvPr id="34" name="Grafik 33">
-            <a:extLst>
-              <a:ext uri="{FF2B5EF4-FFF2-40B4-BE49-F238E27FC236}">
-                <a16:creationId xmlns:a16="http://schemas.microsoft.com/office/drawing/2014/main" id="{820EF47B-6F6E-5327-FE6B-AB86187AB36F}"/>
-              </a:ext>
-            </a:extLst>
-          </p:cNvPr>
-          <p:cNvPicPr>
-            <a:picLocks noChangeAspect="1"/>
-          </p:cNvPicPr>
-          <p:nvPr/>
-        </p:nvPicPr>
-        <p:blipFill>
-          <a:blip r:embed="rId2"/>
-          <a:stretch>
-            <a:fillRect/>
-          </a:stretch>
-        </p:blipFill>
-        <p:spPr>
-          <a:xfrm>
-            <a:off x="19826973" y="7608153"/>
-            <a:ext cx="166165" cy="174914"/>
-          </a:xfrm>
-          <a:prstGeom prst="rect">
-            <a:avLst/>
-          </a:prstGeom>
-        </p:spPr>
-      </p:pic>
       <p:cxnSp>
         <p:nvCxnSpPr>
           <p:cNvPr id="35" name="Gerade Verbindung mit Pfeil 34">
@@ -22016,36 +22851,6 @@
           </a:p>
         </p:txBody>
       </p:sp>
-      <p:pic>
-        <p:nvPicPr>
-          <p:cNvPr id="40" name="Grafik 39">
-            <a:extLst>
-              <a:ext uri="{FF2B5EF4-FFF2-40B4-BE49-F238E27FC236}">
-                <a16:creationId xmlns:a16="http://schemas.microsoft.com/office/drawing/2014/main" id="{E09BDAA4-67BB-F896-6F09-0E1F9FBF8A45}"/>
-              </a:ext>
-            </a:extLst>
-          </p:cNvPr>
-          <p:cNvPicPr>
-            <a:picLocks noChangeAspect="1"/>
-          </p:cNvPicPr>
-          <p:nvPr/>
-        </p:nvPicPr>
-        <p:blipFill>
-          <a:blip r:embed="rId2"/>
-          <a:stretch>
-            <a:fillRect/>
-          </a:stretch>
-        </p:blipFill>
-        <p:spPr>
-          <a:xfrm>
-            <a:off x="15749484" y="7820702"/>
-            <a:ext cx="166165" cy="174914"/>
-          </a:xfrm>
-          <a:prstGeom prst="rect">
-            <a:avLst/>
-          </a:prstGeom>
-        </p:spPr>
-      </p:pic>
       <p:sp>
         <p:nvSpPr>
           <p:cNvPr id="41" name="Rechteck 40">
@@ -22096,36 +22901,6 @@
           </a:p>
         </p:txBody>
       </p:sp>
-      <p:pic>
-        <p:nvPicPr>
-          <p:cNvPr id="53" name="Grafik 52">
-            <a:extLst>
-              <a:ext uri="{FF2B5EF4-FFF2-40B4-BE49-F238E27FC236}">
-                <a16:creationId xmlns:a16="http://schemas.microsoft.com/office/drawing/2014/main" id="{121D0D37-DE66-DCCA-16C9-16066F081585}"/>
-              </a:ext>
-            </a:extLst>
-          </p:cNvPr>
-          <p:cNvPicPr>
-            <a:picLocks noChangeAspect="1"/>
-          </p:cNvPicPr>
-          <p:nvPr/>
-        </p:nvPicPr>
-        <p:blipFill>
-          <a:blip r:embed="rId2"/>
-          <a:stretch>
-            <a:fillRect/>
-          </a:stretch>
-        </p:blipFill>
-        <p:spPr>
-          <a:xfrm>
-            <a:off x="15925066" y="8060038"/>
-            <a:ext cx="166165" cy="174914"/>
-          </a:xfrm>
-          <a:prstGeom prst="rect">
-            <a:avLst/>
-          </a:prstGeom>
-        </p:spPr>
-      </p:pic>
       <p:sp>
         <p:nvSpPr>
           <p:cNvPr id="54" name="Rechteck 53">
@@ -22176,36 +22951,6 @@
           </a:p>
         </p:txBody>
       </p:sp>
-      <p:pic>
-        <p:nvPicPr>
-          <p:cNvPr id="60" name="Grafik 59">
-            <a:extLst>
-              <a:ext uri="{FF2B5EF4-FFF2-40B4-BE49-F238E27FC236}">
-                <a16:creationId xmlns:a16="http://schemas.microsoft.com/office/drawing/2014/main" id="{04A1A064-B679-3656-0949-02313E2D7C3A}"/>
-              </a:ext>
-            </a:extLst>
-          </p:cNvPr>
-          <p:cNvPicPr>
-            <a:picLocks noChangeAspect="1"/>
-          </p:cNvPicPr>
-          <p:nvPr/>
-        </p:nvPicPr>
-        <p:blipFill>
-          <a:blip r:embed="rId2"/>
-          <a:stretch>
-            <a:fillRect/>
-          </a:stretch>
-        </p:blipFill>
-        <p:spPr>
-          <a:xfrm>
-            <a:off x="16354805" y="7906088"/>
-            <a:ext cx="166165" cy="174914"/>
-          </a:xfrm>
-          <a:prstGeom prst="rect">
-            <a:avLst/>
-          </a:prstGeom>
-        </p:spPr>
-      </p:pic>
       <p:sp>
         <p:nvSpPr>
           <p:cNvPr id="61" name="Rechteck 60">
@@ -22256,36 +23001,6 @@
           </a:p>
         </p:txBody>
       </p:sp>
-      <p:pic>
-        <p:nvPicPr>
-          <p:cNvPr id="62" name="Grafik 61">
-            <a:extLst>
-              <a:ext uri="{FF2B5EF4-FFF2-40B4-BE49-F238E27FC236}">
-                <a16:creationId xmlns:a16="http://schemas.microsoft.com/office/drawing/2014/main" id="{F7C7F3DD-ECC4-4BD5-0946-1E129614D389}"/>
-              </a:ext>
-            </a:extLst>
-          </p:cNvPr>
-          <p:cNvPicPr>
-            <a:picLocks noChangeAspect="1"/>
-          </p:cNvPicPr>
-          <p:nvPr/>
-        </p:nvPicPr>
-        <p:blipFill>
-          <a:blip r:embed="rId2"/>
-          <a:stretch>
-            <a:fillRect/>
-          </a:stretch>
-        </p:blipFill>
-        <p:spPr>
-          <a:xfrm>
-            <a:off x="16530387" y="8145424"/>
-            <a:ext cx="166165" cy="174914"/>
-          </a:xfrm>
-          <a:prstGeom prst="rect">
-            <a:avLst/>
-          </a:prstGeom>
-        </p:spPr>
-      </p:pic>
       <p:cxnSp>
         <p:nvCxnSpPr>
           <p:cNvPr id="63" name="Gerade Verbindung mit Pfeil 62">
@@ -23045,6 +23760,166 @@
         <p:spPr>
           <a:xfrm>
             <a:off x="18021404" y="9262517"/>
+            <a:ext cx="166165" cy="174914"/>
+          </a:xfrm>
+          <a:prstGeom prst="rect">
+            <a:avLst/>
+          </a:prstGeom>
+        </p:spPr>
+      </p:pic>
+      <p:sp>
+        <p:nvSpPr>
+          <p:cNvPr id="27" name="Rechteck 26">
+            <a:extLst>
+              <a:ext uri="{FF2B5EF4-FFF2-40B4-BE49-F238E27FC236}">
+                <a16:creationId xmlns:a16="http://schemas.microsoft.com/office/drawing/2014/main" id="{9DDBED4B-8F3A-FDFF-5033-A5A7DD07D22D}"/>
+              </a:ext>
+            </a:extLst>
+          </p:cNvPr>
+          <p:cNvSpPr/>
+          <p:nvPr/>
+        </p:nvSpPr>
+        <p:spPr>
+          <a:xfrm>
+            <a:off x="18559792" y="7385159"/>
+            <a:ext cx="638710" cy="419100"/>
+          </a:xfrm>
+          <a:prstGeom prst="rect">
+            <a:avLst/>
+          </a:prstGeom>
+        </p:spPr>
+        <p:style>
+          <a:lnRef idx="2">
+            <a:schemeClr val="accent1">
+              <a:shade val="15000"/>
+            </a:schemeClr>
+          </a:lnRef>
+          <a:fillRef idx="1">
+            <a:schemeClr val="accent1"/>
+          </a:fillRef>
+          <a:effectRef idx="0">
+            <a:schemeClr val="accent1"/>
+          </a:effectRef>
+          <a:fontRef idx="minor">
+            <a:schemeClr val="lt1"/>
+          </a:fontRef>
+        </p:style>
+        <p:txBody>
+          <a:bodyPr rtlCol="0" anchor="t"/>
+          <a:lstStyle/>
+          <a:p>
+            <a:pPr algn="r">
+              <a:tabLst>
+                <a:tab pos="36000" algn="l"/>
+              </a:tabLst>
+            </a:pPr>
+            <a:endParaRPr lang="de-DE" sz="800"/>
+          </a:p>
+        </p:txBody>
+      </p:sp>
+      <p:pic>
+        <p:nvPicPr>
+          <p:cNvPr id="28" name="Grafik 27">
+            <a:extLst>
+              <a:ext uri="{FF2B5EF4-FFF2-40B4-BE49-F238E27FC236}">
+                <a16:creationId xmlns:a16="http://schemas.microsoft.com/office/drawing/2014/main" id="{1AD0C85D-0C6D-E475-9183-B85CF0455514}"/>
+              </a:ext>
+            </a:extLst>
+          </p:cNvPr>
+          <p:cNvPicPr>
+            <a:picLocks noChangeAspect="1"/>
+          </p:cNvPicPr>
+          <p:nvPr/>
+        </p:nvPicPr>
+        <p:blipFill>
+          <a:blip r:embed="rId2"/>
+          <a:stretch>
+            <a:fillRect/>
+          </a:stretch>
+        </p:blipFill>
+        <p:spPr>
+          <a:xfrm>
+            <a:off x="18620926" y="7449581"/>
+            <a:ext cx="166165" cy="174914"/>
+          </a:xfrm>
+          <a:prstGeom prst="rect">
+            <a:avLst/>
+          </a:prstGeom>
+        </p:spPr>
+      </p:pic>
+      <p:sp>
+        <p:nvSpPr>
+          <p:cNvPr id="39" name="Rechteck 38">
+            <a:extLst>
+              <a:ext uri="{FF2B5EF4-FFF2-40B4-BE49-F238E27FC236}">
+                <a16:creationId xmlns:a16="http://schemas.microsoft.com/office/drawing/2014/main" id="{980EBDD1-910E-BF08-7593-837B99C03C6E}"/>
+              </a:ext>
+            </a:extLst>
+          </p:cNvPr>
+          <p:cNvSpPr/>
+          <p:nvPr/>
+        </p:nvSpPr>
+        <p:spPr>
+          <a:xfrm>
+            <a:off x="16104478" y="7111012"/>
+            <a:ext cx="638710" cy="419100"/>
+          </a:xfrm>
+          <a:prstGeom prst="rect">
+            <a:avLst/>
+          </a:prstGeom>
+        </p:spPr>
+        <p:style>
+          <a:lnRef idx="2">
+            <a:schemeClr val="accent1">
+              <a:shade val="15000"/>
+            </a:schemeClr>
+          </a:lnRef>
+          <a:fillRef idx="1">
+            <a:schemeClr val="accent1"/>
+          </a:fillRef>
+          <a:effectRef idx="0">
+            <a:schemeClr val="accent1"/>
+          </a:effectRef>
+          <a:fontRef idx="minor">
+            <a:schemeClr val="lt1"/>
+          </a:fontRef>
+        </p:style>
+        <p:txBody>
+          <a:bodyPr rtlCol="0" anchor="t"/>
+          <a:lstStyle/>
+          <a:p>
+            <a:pPr algn="r">
+              <a:tabLst>
+                <a:tab pos="36000" algn="l"/>
+              </a:tabLst>
+            </a:pPr>
+            <a:endParaRPr lang="de-DE" sz="800"/>
+          </a:p>
+        </p:txBody>
+      </p:sp>
+      <p:pic>
+        <p:nvPicPr>
+          <p:cNvPr id="43" name="Grafik 42">
+            <a:extLst>
+              <a:ext uri="{FF2B5EF4-FFF2-40B4-BE49-F238E27FC236}">
+                <a16:creationId xmlns:a16="http://schemas.microsoft.com/office/drawing/2014/main" id="{46A3A029-53B2-7755-D074-A50A2B350F8A}"/>
+              </a:ext>
+            </a:extLst>
+          </p:cNvPr>
+          <p:cNvPicPr>
+            <a:picLocks noChangeAspect="1"/>
+          </p:cNvPicPr>
+          <p:nvPr/>
+        </p:nvPicPr>
+        <p:blipFill>
+          <a:blip r:embed="rId2"/>
+          <a:stretch>
+            <a:fillRect/>
+          </a:stretch>
+        </p:blipFill>
+        <p:spPr>
+          <a:xfrm>
+            <a:off x="16165612" y="7175434"/>
             <a:ext cx="166165" cy="174914"/>
           </a:xfrm>
           <a:prstGeom prst="rect">

</xml_diff>

<commit_message>
Connection between Application and Controller Fixes #4
</commit_message>
<xml_diff>
--- a/spec/InformationStructure/diagrams/InformationStructure.pptx
+++ b/spec/InformationStructure/diagrams/InformationStructure.pptx
@@ -518,7 +518,7 @@
           <a:bodyPr/>
           <a:lstStyle/>
           <a:p>
-            <a:endParaRPr lang="de-DE"/>
+            <a:endParaRPr lang="de-DE" dirty="0"/>
           </a:p>
         </p:txBody>
       </p:sp>
@@ -2973,6 +2973,72 @@
           <a:chExt cx="0" cy="0"/>
         </a:xfrm>
       </p:grpSpPr>
+      <p:graphicFrame>
+        <p:nvGraphicFramePr>
+          <p:cNvPr id="8" name="think-cell data - do not delete" hidden="1">
+            <a:extLst>
+              <a:ext uri="{FF2B5EF4-FFF2-40B4-BE49-F238E27FC236}">
+                <a16:creationId xmlns:a16="http://schemas.microsoft.com/office/drawing/2014/main" id="{BC1C57E0-6711-140E-811F-E514B2B6270D}"/>
+              </a:ext>
+            </a:extLst>
+          </p:cNvPr>
+          <p:cNvGraphicFramePr>
+            <a:graphicFrameLocks noChangeAspect="1"/>
+          </p:cNvGraphicFramePr>
+          <p:nvPr userDrawn="1">
+            <p:custDataLst>
+              <p:tags r:id="rId13"/>
+            </p:custDataLst>
+            <p:extLst>
+              <p:ext uri="{D42A27DB-BD31-4B8C-83A1-F6EECF244321}">
+                <p14:modId xmlns:p14="http://schemas.microsoft.com/office/powerpoint/2010/main" val="4139741910"/>
+              </p:ext>
+            </p:extLst>
+          </p:nvPr>
+        </p:nvGraphicFramePr>
+        <p:xfrm>
+          <a:off x="1588" y="1588"/>
+          <a:ext cx="1588" cy="1588"/>
+        </p:xfrm>
+        <a:graphic>
+          <a:graphicData uri="http://schemas.openxmlformats.org/presentationml/2006/ole">
+            <mc:AlternateContent xmlns:mc="http://schemas.openxmlformats.org/markup-compatibility/2006">
+              <mc:Choice xmlns:v="urn:schemas-microsoft-com:vml" Requires="v">
+                <p:oleObj name="think-cell Folie" r:id="rId14" imgW="523" imgH="514" progId="TCLayout.ActiveDocument.1">
+                  <p:embed/>
+                </p:oleObj>
+              </mc:Choice>
+              <mc:Fallback>
+                <p:oleObj name="think-cell Folie" r:id="rId14" imgW="523" imgH="514" progId="TCLayout.ActiveDocument.1">
+                  <p:embed/>
+                  <p:pic>
+                    <p:nvPicPr>
+                      <p:cNvPr id="0" name=""/>
+                      <p:cNvPicPr/>
+                      <p:nvPr/>
+                    </p:nvPicPr>
+                    <p:blipFill>
+                      <a:blip r:embed="rId15"/>
+                      <a:stretch>
+                        <a:fillRect/>
+                      </a:stretch>
+                    </p:blipFill>
+                    <p:spPr>
+                      <a:xfrm>
+                        <a:off x="1588" y="1588"/>
+                        <a:ext cx="1588" cy="1588"/>
+                      </a:xfrm>
+                      <a:prstGeom prst="rect">
+                        <a:avLst/>
+                      </a:prstGeom>
+                    </p:spPr>
+                  </p:pic>
+                </p:oleObj>
+              </mc:Fallback>
+            </mc:AlternateContent>
+          </a:graphicData>
+        </a:graphic>
+      </p:graphicFrame>
       <p:sp>
         <p:nvSpPr>
           <p:cNvPr id="2" name="Title Placeholder 1"/>
@@ -3524,6 +3590,11 @@
             <p:custDataLst>
               <p:tags r:id="rId1"/>
             </p:custDataLst>
+            <p:extLst>
+              <p:ext uri="{D42A27DB-BD31-4B8C-83A1-F6EECF244321}">
+                <p14:modId xmlns:p14="http://schemas.microsoft.com/office/powerpoint/2010/main" val="524973397"/>
+              </p:ext>
+            </p:extLst>
           </p:nvPr>
         </p:nvGraphicFramePr>
         <p:xfrm>
@@ -3784,7 +3855,7 @@
         </p:nvSpPr>
         <p:spPr>
           <a:xfrm>
-            <a:off x="17342507" y="8478513"/>
+            <a:off x="17352032" y="8478513"/>
             <a:ext cx="8738197" cy="6823167"/>
           </a:xfrm>
           <a:prstGeom prst="rect">
@@ -4012,26 +4083,12 @@
                   <a:schemeClr val="tx1"/>
                 </a:solidFill>
               </a:rPr>
-              <a:t>ManagementDomain</a:t>
-            </a:r>
-            <a:r>
-              <a:rPr lang="en-US" sz="1400" noProof="0" dirty="0" err="1">
-                <a:solidFill>
-                  <a:schemeClr val="tx1"/>
-                </a:solidFill>
-                <a:highlight>
-                  <a:srgbClr val="FFFF00"/>
-                </a:highlight>
-              </a:rPr>
-              <a:t>Interface</a:t>
+              <a:t>ManagementDomainInterface</a:t>
             </a:r>
             <a:endParaRPr lang="en-US" sz="1400" noProof="0" dirty="0">
               <a:solidFill>
                 <a:schemeClr val="tx1"/>
               </a:solidFill>
-              <a:highlight>
-                <a:srgbClr val="FFFF00"/>
-              </a:highlight>
             </a:endParaRPr>
           </a:p>
         </p:txBody>
@@ -4276,41 +4333,21 @@
           <a:bodyPr lIns="36000" tIns="36000" rIns="36000" bIns="36000" rtlCol="0" anchor="t"/>
           <a:lstStyle/>
           <a:p>
-            <a:pPr defTabSz="914411">
-              <a:defRPr/>
-            </a:pPr>
-            <a:r>
-              <a:rPr lang="en-US" sz="800" kern="0" noProof="0" dirty="0">
-                <a:solidFill>
-                  <a:prstClr val="black"/>
-                </a:solidFill>
-                <a:latin typeface="Calibri" panose="020F0502020204030204"/>
-              </a:rPr>
-              <a:t>local-id=</a:t>
-            </a:r>
-            <a:r>
-              <a:rPr lang="en-US" sz="800" kern="0" noProof="0" dirty="0" err="1">
-                <a:solidFill>
-                  <a:prstClr val="black"/>
-                </a:solidFill>
-                <a:latin typeface="Calibri" panose="020F0502020204030204"/>
-              </a:rPr>
-              <a:t>tcp</a:t>
-            </a:r>
-            <a:r>
-              <a:rPr lang="en-US" sz="800" kern="0" noProof="0" dirty="0">
-                <a:solidFill>
-                  <a:prstClr val="black"/>
-                </a:solidFill>
-                <a:latin typeface="Calibri" panose="020F0502020204030204"/>
-              </a:rPr>
-              <a:t>-client</a:t>
-            </a:r>
-          </a:p>
-          <a:p>
             <a:pPr defTabSz="914411"/>
             <a:r>
-              <a:rPr lang="en-US" sz="800" kern="0" noProof="0" dirty="0" err="1">
+              <a:rPr lang="en-US" sz="800" kern="0">
+                <a:solidFill>
+                  <a:prstClr val="black"/>
+                </a:solidFill>
+                <a:latin typeface="Calibri" panose="020F0502020204030204"/>
+              </a:rPr>
+              <a:t>local-id=tcp-client</a:t>
+            </a:r>
+          </a:p>
+          <a:p>
+            <a:pPr defTabSz="914411"/>
+            <a:r>
+              <a:rPr lang="en-US" sz="800" kern="0">
                 <a:solidFill>
                   <a:prstClr val="black"/>
                 </a:solidFill>
@@ -4318,124 +4355,70 @@
               </a:rPr>
               <a:t>remoteIpAddress</a:t>
             </a:r>
-            <a:endParaRPr lang="en-US" sz="800" kern="0" noProof="0" dirty="0">
-              <a:solidFill>
-                <a:prstClr val="black"/>
-              </a:solidFill>
-              <a:latin typeface="Calibri" panose="020F0502020204030204"/>
-            </a:endParaRPr>
           </a:p>
           <a:p>
             <a:pPr defTabSz="914411"/>
             <a:r>
-              <a:rPr lang="en-US" sz="800" kern="0" noProof="0" dirty="0" err="1">
+              <a:rPr lang="en-US" sz="800" kern="0">
                 <a:solidFill>
                   <a:prstClr val="black"/>
                 </a:solidFill>
                 <a:latin typeface="Calibri" panose="020F0502020204030204"/>
               </a:rPr>
               <a:t>remotePort</a:t>
+            </a:r>
+          </a:p>
+          <a:p>
+            <a:pPr defTabSz="914411"/>
+            <a:r>
+              <a:rPr lang="en-US" sz="800" kern="0">
+                <a:solidFill>
+                  <a:prstClr val="black"/>
+                </a:solidFill>
+                <a:latin typeface="Calibri" panose="020F0502020204030204"/>
+              </a:rPr>
+              <a:t>notificationSubscribe</a:t>
+            </a:r>
+          </a:p>
+          <a:p>
+            <a:pPr defTabSz="914411"/>
+            <a:r>
+              <a:rPr lang="en-US" sz="800" kern="0">
+                <a:solidFill>
+                  <a:prstClr val="black"/>
+                </a:solidFill>
+                <a:latin typeface="Calibri" panose="020F0502020204030204"/>
+              </a:rPr>
+              <a:t>notificationStreamName</a:t>
+            </a:r>
+          </a:p>
+          <a:p>
+            <a:pPr defTabSz="914411"/>
+            <a:r>
+              <a:rPr lang="en-US" sz="800" kern="0">
+                <a:solidFill>
+                  <a:prstClr val="black"/>
+                </a:solidFill>
+                <a:latin typeface="Calibri" panose="020F0502020204030204"/>
+              </a:rPr>
+              <a:t>connectionStatus</a:t>
+            </a:r>
+          </a:p>
+          <a:p>
+            <a:pPr defTabSz="914411"/>
+            <a:r>
+              <a:rPr lang="en-US" sz="800" kern="0">
+                <a:solidFill>
+                  <a:prstClr val="black"/>
+                </a:solidFill>
+                <a:latin typeface="Calibri" panose="020F0502020204030204"/>
+              </a:rPr>
+              <a:t>sessionId</a:t>
             </a:r>
             <a:endParaRPr lang="en-US" sz="800" kern="0" dirty="0">
               <a:solidFill>
                 <a:prstClr val="black"/>
               </a:solidFill>
-              <a:latin typeface="Calibri" panose="020F0502020204030204"/>
-            </a:endParaRPr>
-          </a:p>
-          <a:p>
-            <a:pPr defTabSz="914411"/>
-            <a:r>
-              <a:rPr lang="en-US" sz="800" kern="0" noProof="0" dirty="0" err="1">
-                <a:solidFill>
-                  <a:prstClr val="black"/>
-                </a:solidFill>
-                <a:highlight>
-                  <a:srgbClr val="FFFF00"/>
-                </a:highlight>
-                <a:latin typeface="Calibri" panose="020F0502020204030204"/>
-              </a:rPr>
-              <a:t>notificationSubscribe</a:t>
-            </a:r>
-            <a:endParaRPr lang="en-US" sz="800" kern="0" noProof="0" dirty="0">
-              <a:solidFill>
-                <a:prstClr val="black"/>
-              </a:solidFill>
-              <a:highlight>
-                <a:srgbClr val="FFFF00"/>
-              </a:highlight>
-              <a:latin typeface="Calibri" panose="020F0502020204030204"/>
-            </a:endParaRPr>
-          </a:p>
-          <a:p>
-            <a:pPr defTabSz="914411"/>
-            <a:r>
-              <a:rPr lang="en-US" sz="800" kern="0" noProof="0" dirty="0" err="1">
-                <a:solidFill>
-                  <a:prstClr val="black"/>
-                </a:solidFill>
-                <a:highlight>
-                  <a:srgbClr val="FFFF00"/>
-                </a:highlight>
-                <a:latin typeface="Calibri" panose="020F0502020204030204"/>
-              </a:rPr>
-              <a:t>notificationStreamName</a:t>
-            </a:r>
-            <a:endParaRPr lang="en-US" sz="800" kern="0" noProof="0" dirty="0">
-              <a:solidFill>
-                <a:prstClr val="black"/>
-              </a:solidFill>
-              <a:highlight>
-                <a:srgbClr val="FFFF00"/>
-              </a:highlight>
-              <a:latin typeface="Calibri" panose="020F0502020204030204"/>
-            </a:endParaRPr>
-          </a:p>
-          <a:p>
-            <a:pPr defTabSz="914411"/>
-            <a:r>
-              <a:rPr lang="en-US" sz="800" kern="0" dirty="0" err="1">
-                <a:solidFill>
-                  <a:prstClr val="black"/>
-                </a:solidFill>
-                <a:highlight>
-                  <a:srgbClr val="FFFF00"/>
-                </a:highlight>
-                <a:latin typeface="Calibri" panose="020F0502020204030204"/>
-              </a:rPr>
-              <a:t>connectionStatus</a:t>
-            </a:r>
-            <a:endParaRPr lang="en-US" sz="800" kern="0" dirty="0">
-              <a:solidFill>
-                <a:prstClr val="black"/>
-              </a:solidFill>
-              <a:highlight>
-                <a:srgbClr val="FFFF00"/>
-              </a:highlight>
-              <a:latin typeface="Calibri" panose="020F0502020204030204"/>
-            </a:endParaRPr>
-          </a:p>
-          <a:p>
-            <a:pPr defTabSz="914411"/>
-            <a:r>
-              <a:rPr lang="en-US" sz="800" kern="0" dirty="0" err="1">
-                <a:solidFill>
-                  <a:prstClr val="black"/>
-                </a:solidFill>
-                <a:highlight>
-                  <a:srgbClr val="FFFF00"/>
-                </a:highlight>
-                <a:latin typeface="Calibri" panose="020F0502020204030204"/>
-              </a:rPr>
-              <a:t>sessionId</a:t>
-            </a:r>
-            <a:endParaRPr lang="en-US" sz="800" kern="0" noProof="0" dirty="0">
-              <a:solidFill>
-                <a:prstClr val="black"/>
-              </a:solidFill>
-              <a:highlight>
-                <a:srgbClr val="FFFF00"/>
-              </a:highlight>
               <a:latin typeface="Calibri" panose="020F0502020204030204"/>
             </a:endParaRPr>
           </a:p>
@@ -5128,8 +5111,8 @@
         </p:nvSpPr>
         <p:spPr>
           <a:xfrm>
-            <a:off x="6484620" y="5577132"/>
-            <a:ext cx="1905703" cy="336074"/>
+            <a:off x="7134225" y="5577132"/>
+            <a:ext cx="1256098" cy="336074"/>
           </a:xfrm>
           <a:prstGeom prst="rect">
             <a:avLst/>
@@ -5152,74 +5135,38 @@
           <a:p>
             <a:pPr defTabSz="914411"/>
             <a:r>
-              <a:rPr lang="en-US" sz="800" kern="0" noProof="0" dirty="0" err="1">
-                <a:solidFill>
-                  <a:prstClr val="black"/>
-                </a:solidFill>
-                <a:latin typeface="Calibri" panose="020F0502020204030204"/>
-              </a:rPr>
-              <a:t>forwardingDomainName</a:t>
-            </a:r>
-            <a:r>
-              <a:rPr lang="en-US" sz="800" kern="0" noProof="0" dirty="0">
-                <a:solidFill>
-                  <a:prstClr val="black"/>
-                </a:solidFill>
-                <a:latin typeface="Calibri" panose="020F0502020204030204"/>
-              </a:rPr>
-              <a:t>=</a:t>
-            </a:r>
-            <a:r>
-              <a:rPr lang="en-US" sz="800" strike="sngStrike" kern="0" noProof="0" dirty="0">
-                <a:solidFill>
-                  <a:prstClr val="black"/>
-                </a:solidFill>
-                <a:highlight>
-                  <a:srgbClr val="FFFF00"/>
-                </a:highlight>
-                <a:latin typeface="Calibri" panose="020F0502020204030204"/>
-              </a:rPr>
-              <a:t>management-plane-transport</a:t>
-            </a:r>
+              <a:rPr lang="en-US" sz="800" kern="0">
+                <a:solidFill>
+                  <a:prstClr val="black"/>
+                </a:solidFill>
+                <a:latin typeface="Calibri" panose="020F0502020204030204"/>
+              </a:rPr>
+              <a:t>forwardingDomainName=</a:t>
+            </a:r>
+            <a:endParaRPr lang="en-US" sz="800" kern="0" dirty="0">
+              <a:solidFill>
+                <a:prstClr val="black"/>
+              </a:solidFill>
+              <a:latin typeface="Calibri" panose="020F0502020204030204"/>
+            </a:endParaRPr>
           </a:p>
           <a:p>
             <a:pPr defTabSz="914411"/>
             <a:r>
-              <a:rPr lang="en-US" sz="800" kern="0" noProof="0" dirty="0">
-                <a:solidFill>
-                  <a:prstClr val="black"/>
-                </a:solidFill>
-                <a:highlight>
-                  <a:srgbClr val="FFFF00"/>
-                </a:highlight>
-                <a:latin typeface="Calibri" panose="020F0502020204030204"/>
-              </a:rPr>
-              <a:t>[</a:t>
-            </a:r>
-            <a:r>
-              <a:rPr lang="en-US" sz="800" kern="0" noProof="0" dirty="0" err="1">
-                <a:solidFill>
-                  <a:prstClr val="black"/>
-                </a:solidFill>
-                <a:highlight>
-                  <a:srgbClr val="FFFF00"/>
-                </a:highlight>
-                <a:latin typeface="Calibri" panose="020F0502020204030204"/>
-              </a:rPr>
-              <a:t>managementDomain</a:t>
-            </a:r>
-            <a:r>
-              <a:rPr lang="en-US" sz="800" kern="0" noProof="0" dirty="0">
-                <a:solidFill>
-                  <a:prstClr val="black"/>
-                </a:solidFill>
-                <a:highlight>
-                  <a:srgbClr val="FFFF00"/>
-                </a:highlight>
-                <a:latin typeface="Calibri" panose="020F0502020204030204"/>
-              </a:rPr>
-              <a:t>]</a:t>
-            </a:r>
+              <a:rPr lang="en-US" sz="800" kern="0">
+                <a:solidFill>
+                  <a:prstClr val="black"/>
+                </a:solidFill>
+                <a:latin typeface="Calibri" panose="020F0502020204030204"/>
+              </a:rPr>
+              <a:t>[managementDomain]</a:t>
+            </a:r>
+            <a:endParaRPr lang="en-US" sz="800" kern="0" dirty="0">
+              <a:solidFill>
+                <a:prstClr val="black"/>
+              </a:solidFill>
+              <a:latin typeface="Calibri" panose="020F0502020204030204"/>
+            </a:endParaRPr>
           </a:p>
         </p:txBody>
       </p:sp>
@@ -5330,11 +5277,9 @@
           <a:bodyPr lIns="36000" tIns="36000" rIns="36000" bIns="36000" rtlCol="0" anchor="t"/>
           <a:lstStyle/>
           <a:p>
-            <a:pPr defTabSz="914411">
-              <a:defRPr/>
-            </a:pPr>
-            <a:r>
-              <a:rPr lang="en-US" sz="800" kern="0" noProof="0" dirty="0" err="1">
+            <a:pPr defTabSz="914411"/>
+            <a:r>
+              <a:rPr lang="en-US" sz="800" kern="0" dirty="0" err="1">
                 <a:solidFill>
                   <a:prstClr val="black"/>
                 </a:solidFill>
@@ -5343,7 +5288,7 @@
               <a:t>elementName</a:t>
             </a:r>
             <a:r>
-              <a:rPr lang="en-US" sz="800" kern="0" noProof="0" dirty="0">
+              <a:rPr lang="en-US" sz="800" kern="0" dirty="0">
                 <a:solidFill>
                   <a:prstClr val="black"/>
                 </a:solidFill>
@@ -5352,7 +5297,7 @@
               <a:t>=[</a:t>
             </a:r>
             <a:r>
-              <a:rPr lang="en-US" sz="800" kern="0" noProof="0" dirty="0" err="1">
+              <a:rPr lang="en-US" sz="800" kern="0" dirty="0" err="1">
                 <a:solidFill>
                   <a:prstClr val="black"/>
                 </a:solidFill>
@@ -5361,7 +5306,7 @@
               <a:t>applicationName</a:t>
             </a:r>
             <a:r>
-              <a:rPr lang="en-US" sz="800" kern="0" noProof="0" dirty="0">
+              <a:rPr lang="en-US" sz="800" kern="0" dirty="0">
                 <a:solidFill>
                   <a:prstClr val="black"/>
                 </a:solidFill>
@@ -5371,11 +5316,9 @@
             </a:r>
           </a:p>
           <a:p>
-            <a:pPr defTabSz="914411">
-              <a:defRPr/>
-            </a:pPr>
-            <a:r>
-              <a:rPr lang="en-US" sz="800" kern="0" noProof="0" dirty="0">
+            <a:pPr defTabSz="914411"/>
+            <a:r>
+              <a:rPr lang="en-US" sz="800" kern="0" dirty="0">
                 <a:solidFill>
                   <a:prstClr val="black"/>
                 </a:solidFill>
@@ -5385,43 +5328,26 @@
             </a:r>
           </a:p>
           <a:p>
-            <a:pPr defTabSz="914411">
-              <a:defRPr/>
-            </a:pPr>
-            <a:r>
-              <a:rPr lang="en-US" sz="800" kern="0" noProof="0" dirty="0">
-                <a:solidFill>
-                  <a:prstClr val="black"/>
-                </a:solidFill>
-                <a:latin typeface="Calibri" panose="020F0502020204030204"/>
-              </a:rPr>
-              <a:t>_template=</a:t>
-            </a:r>
+            <a:pPr defTabSz="914411"/>
             <a:r>
               <a:rPr lang="en-US" sz="800" kern="0" dirty="0">
                 <a:solidFill>
                   <a:prstClr val="black"/>
                 </a:solidFill>
-                <a:highlight>
-                  <a:srgbClr val="FFFF00"/>
-                </a:highlight>
-                <a:latin typeface="Calibri" panose="020F0502020204030204"/>
-              </a:rPr>
-              <a:t> </a:t>
+                <a:latin typeface="Calibri" panose="020F0502020204030204"/>
+              </a:rPr>
+              <a:t>_template= </a:t>
             </a:r>
             <a:r>
               <a:rPr lang="en-US" sz="800" kern="0" dirty="0" err="1">
                 <a:solidFill>
                   <a:prstClr val="black"/>
                 </a:solidFill>
-                <a:highlight>
-                  <a:srgbClr val="FFFF00"/>
-                </a:highlight>
                 <a:latin typeface="Calibri" panose="020F0502020204030204"/>
               </a:rPr>
               <a:t>managementDomainInterfaceTemplate</a:t>
             </a:r>
-            <a:endParaRPr lang="en-US" sz="800" kern="0" noProof="0" dirty="0">
+            <a:endParaRPr lang="en-US" sz="800" kern="0" dirty="0">
               <a:solidFill>
                 <a:prstClr val="black"/>
               </a:solidFill>
@@ -5867,7 +5793,7 @@
           <a:p>
             <a:pPr defTabSz="914411"/>
             <a:r>
-              <a:rPr lang="en-US" sz="800" kern="0" noProof="0" dirty="0">
+              <a:rPr lang="en-US" sz="800" kern="0" dirty="0">
                 <a:solidFill>
                   <a:prstClr val="black"/>
                 </a:solidFill>
@@ -5876,7 +5802,7 @@
               <a:t>local-id=[</a:t>
             </a:r>
             <a:r>
-              <a:rPr lang="en-US" sz="800" kern="0" noProof="0" dirty="0" err="1">
+              <a:rPr lang="en-US" sz="800" kern="0" dirty="0" err="1">
                 <a:solidFill>
                   <a:prstClr val="black"/>
                 </a:solidFill>
@@ -5885,7 +5811,7 @@
               <a:t>deviceName</a:t>
             </a:r>
             <a:r>
-              <a:rPr lang="en-US" sz="800" kern="0" noProof="0" dirty="0">
+              <a:rPr lang="en-US" sz="800" kern="0" dirty="0">
                 <a:solidFill>
                   <a:prstClr val="black"/>
                 </a:solidFill>
@@ -5901,9 +5827,6 @@
                 <a:solidFill>
                   <a:prstClr val="black"/>
                 </a:solidFill>
-                <a:highlight>
-                  <a:srgbClr val="FFFF00"/>
-                </a:highlight>
                 <a:latin typeface="Calibri" panose="020F0502020204030204"/>
               </a:rPr>
               <a:t>_template=</a:t>
@@ -5913,9 +5836,6 @@
                 <a:solidFill>
                   <a:prstClr val="black"/>
                 </a:solidFill>
-                <a:highlight>
-                  <a:srgbClr val="FFFF00"/>
-                </a:highlight>
                 <a:latin typeface="Calibri" panose="020F0502020204030204"/>
               </a:rPr>
               <a:t>mountPointTemplateName</a:t>
@@ -5924,15 +5844,12 @@
               <a:solidFill>
                 <a:prstClr val="black"/>
               </a:solidFill>
-              <a:highlight>
-                <a:srgbClr val="FFFF00"/>
-              </a:highlight>
               <a:latin typeface="Calibri" panose="020F0502020204030204"/>
             </a:endParaRPr>
           </a:p>
           <a:p>
             <a:pPr defTabSz="914411"/>
-            <a:endParaRPr lang="en-US" sz="800" kern="0" noProof="0" dirty="0">
+            <a:endParaRPr lang="en-US" sz="800" kern="0" dirty="0">
               <a:solidFill>
                 <a:prstClr val="black"/>
               </a:solidFill>
@@ -7755,13 +7672,10 @@
           <a:p>
             <a:pPr defTabSz="914411"/>
             <a:r>
-              <a:rPr lang="en-US" sz="800" kern="0" noProof="0" dirty="0">
-                <a:solidFill>
-                  <a:prstClr val="black"/>
-                </a:solidFill>
-                <a:highlight>
-                  <a:srgbClr val="FFFF00"/>
-                </a:highlight>
+              <a:rPr lang="en-US" sz="800" kern="0" dirty="0">
+                <a:solidFill>
+                  <a:prstClr val="black"/>
+                </a:solidFill>
                 <a:latin typeface="Calibri" panose="020F0502020204030204"/>
               </a:rPr>
               <a:t>affected-management-domain</a:t>
@@ -7770,58 +7684,19 @@
           <a:p>
             <a:pPr defTabSz="914411"/>
             <a:r>
-              <a:rPr lang="en-US" sz="800" strike="sngStrike" kern="0" noProof="0" dirty="0">
-                <a:solidFill>
-                  <a:prstClr val="black"/>
-                </a:solidFill>
-                <a:highlight>
-                  <a:srgbClr val="FFFF00"/>
-                </a:highlight>
-                <a:latin typeface="Calibri" panose="020F0502020204030204"/>
-              </a:rPr>
-              <a:t>affected-fc</a:t>
-            </a:r>
-            <a:r>
-              <a:rPr lang="en-US" sz="800" kern="0" noProof="0" dirty="0">
-                <a:solidFill>
-                  <a:prstClr val="black"/>
-                </a:solidFill>
-                <a:highlight>
-                  <a:srgbClr val="FFFF00"/>
-                </a:highlight>
-                <a:latin typeface="Calibri" panose="020F0502020204030204"/>
-              </a:rPr>
-              <a:t>  affected-management-</a:t>
-            </a:r>
-            <a:r>
               <a:rPr lang="en-US" sz="800" kern="0" dirty="0">
                 <a:solidFill>
                   <a:prstClr val="black"/>
                 </a:solidFill>
-                <a:highlight>
-                  <a:srgbClr val="FFFF00"/>
-                </a:highlight>
-                <a:latin typeface="Calibri" panose="020F0502020204030204"/>
-              </a:rPr>
-              <a:t>p</a:t>
-            </a:r>
-            <a:r>
-              <a:rPr lang="en-US" sz="800" kern="0" noProof="0" dirty="0">
-                <a:solidFill>
-                  <a:prstClr val="black"/>
-                </a:solidFill>
-                <a:highlight>
-                  <a:srgbClr val="FFFF00"/>
-                </a:highlight>
-                <a:latin typeface="Calibri" panose="020F0502020204030204"/>
-              </a:rPr>
-              <a:t>lane-transport</a:t>
+                <a:latin typeface="Calibri" panose="020F0502020204030204"/>
+              </a:rPr>
+              <a:t>affected-management-plane-transport</a:t>
             </a:r>
           </a:p>
           <a:p>
             <a:pPr defTabSz="914411"/>
             <a:r>
-              <a:rPr lang="en-US" sz="800" kern="0" noProof="0" dirty="0">
+              <a:rPr lang="en-US" sz="800" kern="0" dirty="0">
                 <a:solidFill>
                   <a:prstClr val="black"/>
                 </a:solidFill>
@@ -7833,7 +7708,7 @@
           <a:p>
             <a:pPr defTabSz="914411"/>
             <a:r>
-              <a:rPr lang="en-US" sz="800" kern="0" noProof="0" dirty="0">
+              <a:rPr lang="en-US" sz="800" kern="0" dirty="0">
                 <a:solidFill>
                   <a:prstClr val="black"/>
                 </a:solidFill>
@@ -7842,7 +7717,7 @@
               <a:t>affected-cc/</a:t>
             </a:r>
             <a:r>
-              <a:rPr lang="en-US" sz="800" kern="0" noProof="0" dirty="0" err="1">
+              <a:rPr lang="en-US" sz="800" kern="0" dirty="0" err="1">
                 <a:solidFill>
                   <a:prstClr val="black"/>
                 </a:solidFill>
@@ -7851,7 +7726,7 @@
               <a:t>ltp</a:t>
             </a:r>
             <a:r>
-              <a:rPr lang="en-US" sz="800" kern="0" noProof="0" dirty="0">
+              <a:rPr lang="en-US" sz="800" kern="0" dirty="0">
                 <a:solidFill>
                   <a:prstClr val="black"/>
                 </a:solidFill>
@@ -7860,7 +7735,7 @@
               <a:t>/</a:t>
             </a:r>
             <a:r>
-              <a:rPr lang="en-US" sz="800" kern="0" noProof="0" dirty="0" err="1">
+              <a:rPr lang="en-US" sz="800" kern="0" dirty="0" err="1">
                 <a:solidFill>
                   <a:prstClr val="black"/>
                 </a:solidFill>
@@ -7868,7 +7743,7 @@
               </a:rPr>
               <a:t>lp</a:t>
             </a:r>
-            <a:endParaRPr lang="en-US" sz="800" kern="0" noProof="0" dirty="0">
+            <a:endParaRPr lang="en-US" sz="800" kern="0" dirty="0">
               <a:solidFill>
                 <a:prstClr val="black"/>
               </a:solidFill>
@@ -7878,7 +7753,7 @@
           <a:p>
             <a:pPr defTabSz="914411"/>
             <a:r>
-              <a:rPr lang="en-US" sz="800" kern="0" noProof="0" dirty="0">
+              <a:rPr lang="en-US" sz="800" kern="0" dirty="0">
                 <a:solidFill>
                   <a:prstClr val="black"/>
                 </a:solidFill>
@@ -7890,7 +7765,7 @@
           <a:p>
             <a:pPr defTabSz="914411"/>
             <a:r>
-              <a:rPr lang="en-US" sz="800" kern="0" noProof="0" dirty="0">
+              <a:rPr lang="en-US" sz="800" kern="0" dirty="0">
                 <a:solidFill>
                   <a:prstClr val="black"/>
                 </a:solidFill>
@@ -7902,7 +7777,7 @@
           <a:p>
             <a:pPr defTabSz="914411"/>
             <a:r>
-              <a:rPr lang="en-US" sz="800" kern="0" noProof="0" dirty="0">
+              <a:rPr lang="en-US" sz="800" kern="0" dirty="0">
                 <a:solidFill>
                   <a:prstClr val="black"/>
                 </a:solidFill>
@@ -7913,7 +7788,7 @@
           </a:p>
           <a:p>
             <a:pPr defTabSz="914411"/>
-            <a:endParaRPr lang="en-US" sz="800" kern="0" noProof="0" dirty="0">
+            <a:endParaRPr lang="en-US" sz="800" kern="0" dirty="0">
               <a:solidFill>
                 <a:prstClr val="black"/>
               </a:solidFill>
@@ -10877,7 +10752,7 @@
           <a:p>
             <a:pPr defTabSz="914411"/>
             <a:r>
-              <a:rPr lang="en-US" sz="800" kern="0" noProof="0" dirty="0" err="1">
+              <a:rPr lang="en-US" sz="800" kern="0" dirty="0" err="1">
                 <a:solidFill>
                   <a:prstClr val="black"/>
                 </a:solidFill>
@@ -10886,7 +10761,7 @@
               <a:t>templateName</a:t>
             </a:r>
             <a:r>
-              <a:rPr lang="en-US" sz="800" kern="0" noProof="0" dirty="0">
+              <a:rPr lang="en-US" sz="800" kern="0" dirty="0">
                 <a:solidFill>
                   <a:prstClr val="black"/>
                 </a:solidFill>
@@ -10895,19 +10770,16 @@
               <a:t>=[</a:t>
             </a:r>
             <a:r>
-              <a:rPr lang="en-US" sz="800" kern="0" noProof="0" dirty="0" err="1">
-                <a:solidFill>
-                  <a:prstClr val="black"/>
-                </a:solidFill>
-                <a:highlight>
-                  <a:srgbClr val="FFFF00"/>
-                </a:highlight>
+              <a:rPr lang="en-US" sz="800" kern="0" dirty="0" err="1">
+                <a:solidFill>
+                  <a:prstClr val="black"/>
+                </a:solidFill>
                 <a:latin typeface="Calibri" panose="020F0502020204030204"/>
               </a:rPr>
               <a:t>managementDomainInterfaceTemplateName</a:t>
             </a:r>
             <a:r>
-              <a:rPr lang="en-US" sz="800" kern="0" noProof="0" dirty="0">
+              <a:rPr lang="en-US" sz="800" kern="0" dirty="0">
                 <a:solidFill>
                   <a:prstClr val="black"/>
                 </a:solidFill>
@@ -10919,7 +10791,7 @@
           <a:p>
             <a:pPr defTabSz="914411"/>
             <a:r>
-              <a:rPr lang="en-US" sz="800" kern="0" noProof="0" dirty="0">
+              <a:rPr lang="en-US" sz="800" kern="0" dirty="0">
                 <a:solidFill>
                   <a:prstClr val="black"/>
                 </a:solidFill>
@@ -10928,24 +10800,18 @@
               <a:t>category=</a:t>
             </a:r>
             <a:r>
-              <a:rPr lang="en-US" sz="800" kern="0" noProof="0" dirty="0" err="1">
-                <a:solidFill>
-                  <a:prstClr val="black"/>
-                </a:solidFill>
-                <a:highlight>
-                  <a:srgbClr val="FFFF00"/>
-                </a:highlight>
+              <a:rPr lang="en-US" sz="800" kern="0" dirty="0" err="1">
+                <a:solidFill>
+                  <a:prstClr val="black"/>
+                </a:solidFill>
                 <a:latin typeface="Calibri" panose="020F0502020204030204"/>
               </a:rPr>
               <a:t>managementDomainInterfaceTemplate</a:t>
             </a:r>
-            <a:endParaRPr lang="en-US" sz="800" kern="0" noProof="0" dirty="0">
+            <a:endParaRPr lang="en-US" sz="800" kern="0" dirty="0">
               <a:solidFill>
                 <a:prstClr val="black"/>
               </a:solidFill>
-              <a:highlight>
-                <a:srgbClr val="FFFF00"/>
-              </a:highlight>
               <a:latin typeface="Calibri" panose="020F0502020204030204"/>
             </a:endParaRPr>
           </a:p>
@@ -10956,9 +10822,6 @@
                 <a:solidFill>
                   <a:prstClr val="black"/>
                 </a:solidFill>
-                <a:highlight>
-                  <a:srgbClr val="FFFF00"/>
-                </a:highlight>
                 <a:latin typeface="Calibri" panose="020F0502020204030204"/>
               </a:rPr>
               <a:t>managerIpAddress</a:t>
@@ -10967,9 +10830,6 @@
               <a:solidFill>
                 <a:prstClr val="black"/>
               </a:solidFill>
-              <a:highlight>
-                <a:srgbClr val="FFFF00"/>
-              </a:highlight>
               <a:latin typeface="Calibri" panose="020F0502020204030204"/>
             </a:endParaRPr>
           </a:p>
@@ -10980,9 +10840,6 @@
                 <a:solidFill>
                   <a:prstClr val="black"/>
                 </a:solidFill>
-                <a:highlight>
-                  <a:srgbClr val="FFFF00"/>
-                </a:highlight>
                 <a:latin typeface="Calibri" panose="020F0502020204030204"/>
               </a:rPr>
               <a:t>managerPort</a:t>
@@ -10991,9 +10848,6 @@
               <a:solidFill>
                 <a:prstClr val="black"/>
               </a:solidFill>
-              <a:highlight>
-                <a:srgbClr val="FFFF00"/>
-              </a:highlight>
               <a:latin typeface="Calibri" panose="020F0502020204030204"/>
             </a:endParaRPr>
           </a:p>
@@ -11004,9 +10858,6 @@
                 <a:solidFill>
                   <a:prstClr val="black"/>
                 </a:solidFill>
-                <a:highlight>
-                  <a:srgbClr val="FFFF00"/>
-                </a:highlight>
                 <a:latin typeface="Calibri" panose="020F0502020204030204"/>
               </a:rPr>
               <a:t>measureManagementDomainInterfaceService</a:t>
@@ -11015,9 +10866,6 @@
               <a:solidFill>
                 <a:prstClr val="black"/>
               </a:solidFill>
-              <a:highlight>
-                <a:srgbClr val="FFFF00"/>
-              </a:highlight>
               <a:latin typeface="Calibri" panose="020F0502020204030204"/>
             </a:endParaRPr>
           </a:p>
@@ -11028,9 +10876,6 @@
                 <a:solidFill>
                   <a:prstClr val="black"/>
                 </a:solidFill>
-                <a:highlight>
-                  <a:srgbClr val="FFFF00"/>
-                </a:highlight>
                 <a:latin typeface="Calibri" panose="020F0502020204030204"/>
               </a:rPr>
               <a:t>mediateManagementDomainInterfaceUpdateService</a:t>
@@ -11039,21 +10884,15 @@
               <a:solidFill>
                 <a:prstClr val="black"/>
               </a:solidFill>
-              <a:highlight>
-                <a:srgbClr val="FFFF00"/>
-              </a:highlight>
               <a:latin typeface="Calibri" panose="020F0502020204030204"/>
             </a:endParaRPr>
           </a:p>
           <a:p>
             <a:pPr defTabSz="914411"/>
-            <a:endParaRPr lang="en-US" sz="800" kern="0" noProof="0" dirty="0">
+            <a:endParaRPr lang="en-US" sz="800" kern="0" dirty="0">
               <a:solidFill>
                 <a:prstClr val="black"/>
               </a:solidFill>
-              <a:highlight>
-                <a:srgbClr val="FFFF00"/>
-              </a:highlight>
               <a:latin typeface="Calibri" panose="020F0502020204030204"/>
             </a:endParaRPr>
           </a:p>
@@ -12268,7 +12107,7 @@
         </p:nvSpPr>
         <p:spPr>
           <a:xfrm>
-            <a:off x="31438770" y="8860809"/>
+            <a:off x="32034197" y="8860809"/>
             <a:ext cx="537299" cy="445572"/>
           </a:xfrm>
           <a:prstGeom prst="roundRect">
@@ -12317,24 +12156,23 @@
       </p:sp>
       <p:cxnSp>
         <p:nvCxnSpPr>
-          <p:cNvPr id="25" name="Gerade Verbindung mit Pfeil 24">
-            <a:extLst>
-              <a:ext uri="{FF2B5EF4-FFF2-40B4-BE49-F238E27FC236}">
-                <a16:creationId xmlns:a16="http://schemas.microsoft.com/office/drawing/2014/main" id="{AAF3458E-970B-9AEE-394E-51278840AA39}"/>
+          <p:cNvPr id="37" name="Gerade Verbindung mit Pfeil 36">
+            <a:extLst>
+              <a:ext uri="{FF2B5EF4-FFF2-40B4-BE49-F238E27FC236}">
+                <a16:creationId xmlns:a16="http://schemas.microsoft.com/office/drawing/2014/main" id="{3DF5C9E9-FE3B-9BE6-9DD1-4F423E5DCB2B}"/>
               </a:ext>
             </a:extLst>
           </p:cNvPr>
           <p:cNvCxnSpPr>
             <a:cxnSpLocks/>
-            <a:stCxn id="24" idx="2"/>
-            <a:endCxn id="65" idx="0"/>
+            <a:endCxn id="60" idx="1"/>
           </p:cNvCxnSpPr>
           <p:nvPr/>
         </p:nvCxnSpPr>
         <p:spPr>
           <a:xfrm>
-            <a:off x="31707420" y="9306381"/>
-            <a:ext cx="0" cy="2555918"/>
+            <a:off x="32567288" y="9080029"/>
+            <a:ext cx="461372" cy="136829"/>
           </a:xfrm>
           <a:prstGeom prst="straightConnector1">
             <a:avLst/>
@@ -12351,41 +12189,6 @@
           <a:effectLst/>
         </p:spPr>
       </p:cxnSp>
-      <p:cxnSp>
-        <p:nvCxnSpPr>
-          <p:cNvPr id="37" name="Gerade Verbindung mit Pfeil 36">
-            <a:extLst>
-              <a:ext uri="{FF2B5EF4-FFF2-40B4-BE49-F238E27FC236}">
-                <a16:creationId xmlns:a16="http://schemas.microsoft.com/office/drawing/2014/main" id="{3DF5C9E9-FE3B-9BE6-9DD1-4F423E5DCB2B}"/>
-              </a:ext>
-            </a:extLst>
-          </p:cNvPr>
-          <p:cNvCxnSpPr>
-            <a:cxnSpLocks/>
-            <a:endCxn id="60" idx="1"/>
-          </p:cNvCxnSpPr>
-          <p:nvPr/>
-        </p:nvCxnSpPr>
-        <p:spPr>
-          <a:xfrm>
-            <a:off x="31971861" y="9080029"/>
-            <a:ext cx="461372" cy="136829"/>
-          </a:xfrm>
-          <a:prstGeom prst="straightConnector1">
-            <a:avLst/>
-          </a:prstGeom>
-          <a:noFill/>
-          <a:ln w="6350" cap="flat" cmpd="sng" algn="ctr">
-            <a:solidFill>
-              <a:srgbClr val="5B9BD5"/>
-            </a:solidFill>
-            <a:prstDash val="solid"/>
-            <a:miter lim="800000"/>
-            <a:tailEnd type="triangle"/>
-          </a:ln>
-          <a:effectLst/>
-        </p:spPr>
-      </p:cxnSp>
       <p:sp>
         <p:nvSpPr>
           <p:cNvPr id="60" name="Rechteck 59">
@@ -12400,7 +12203,7 @@
         </p:nvSpPr>
         <p:spPr>
           <a:xfrm>
-            <a:off x="32433233" y="8851566"/>
+            <a:off x="33028660" y="8851566"/>
             <a:ext cx="2142517" cy="730584"/>
           </a:xfrm>
           <a:prstGeom prst="rect">
@@ -12422,11 +12225,9 @@
           <a:bodyPr lIns="36000" tIns="36000" rIns="36000" bIns="36000" rtlCol="0" anchor="t"/>
           <a:lstStyle/>
           <a:p>
-            <a:pPr defTabSz="914411">
-              <a:defRPr/>
-            </a:pPr>
-            <a:r>
-              <a:rPr lang="en-US" sz="800" kern="0" noProof="0" dirty="0" err="1">
+            <a:pPr defTabSz="914411"/>
+            <a:r>
+              <a:rPr lang="en-US" sz="800" kern="0" dirty="0" err="1">
                 <a:solidFill>
                   <a:prstClr val="black"/>
                 </a:solidFill>
@@ -12435,7 +12236,7 @@
               <a:t>elementName</a:t>
             </a:r>
             <a:r>
-              <a:rPr lang="en-US" sz="800" kern="0" noProof="0" dirty="0">
+              <a:rPr lang="en-US" sz="800" kern="0" dirty="0">
                 <a:solidFill>
                   <a:prstClr val="black"/>
                 </a:solidFill>
@@ -12444,7 +12245,7 @@
               <a:t>=[</a:t>
             </a:r>
             <a:r>
-              <a:rPr lang="en-US" sz="800" kern="0" noProof="0" dirty="0" err="1">
+              <a:rPr lang="en-US" sz="800" kern="0" dirty="0" err="1">
                 <a:solidFill>
                   <a:prstClr val="black"/>
                 </a:solidFill>
@@ -12453,7 +12254,7 @@
               <a:t>managementDomain</a:t>
             </a:r>
             <a:r>
-              <a:rPr lang="en-US" sz="800" kern="0" noProof="0" dirty="0">
+              <a:rPr lang="en-US" sz="800" kern="0" dirty="0">
                 <a:solidFill>
                   <a:prstClr val="black"/>
                 </a:solidFill>
@@ -12463,11 +12264,9 @@
             </a:r>
           </a:p>
           <a:p>
-            <a:pPr defTabSz="914411">
-              <a:defRPr/>
-            </a:pPr>
-            <a:r>
-              <a:rPr lang="en-US" sz="800" kern="0" noProof="0" dirty="0">
+            <a:pPr defTabSz="914411"/>
+            <a:r>
+              <a:rPr lang="en-US" sz="800" kern="0" dirty="0">
                 <a:solidFill>
                   <a:prstClr val="black"/>
                 </a:solidFill>
@@ -12476,7 +12275,7 @@
               <a:t>category=</a:t>
             </a:r>
             <a:r>
-              <a:rPr lang="en-US" sz="800" kern="0" noProof="0" dirty="0" err="1">
+              <a:rPr lang="en-US" sz="800" kern="0" dirty="0" err="1">
                 <a:solidFill>
                   <a:prstClr val="black"/>
                 </a:solidFill>
@@ -12484,7 +12283,7 @@
               </a:rPr>
               <a:t>logicalController</a:t>
             </a:r>
-            <a:endParaRPr lang="en-US" sz="800" kern="0" noProof="0" dirty="0">
+            <a:endParaRPr lang="en-US" sz="800" kern="0" dirty="0">
               <a:solidFill>
                 <a:prstClr val="black"/>
               </a:solidFill>
@@ -12492,11 +12291,9 @@
             </a:endParaRPr>
           </a:p>
           <a:p>
-            <a:pPr defTabSz="914411">
-              <a:defRPr/>
-            </a:pPr>
-            <a:r>
-              <a:rPr lang="en-US" sz="800" kern="0" noProof="0" dirty="0">
+            <a:pPr defTabSz="914411"/>
+            <a:r>
+              <a:rPr lang="en-US" sz="800" kern="0" dirty="0">
                 <a:solidFill>
                   <a:prstClr val="black"/>
                 </a:solidFill>
@@ -12505,33 +12302,25 @@
               <a:t>_template=</a:t>
             </a:r>
             <a:r>
-              <a:rPr lang="en-US" sz="800" kern="0" noProof="0" dirty="0" err="1">
-                <a:solidFill>
-                  <a:prstClr val="black"/>
-                </a:solidFill>
-                <a:highlight>
-                  <a:srgbClr val="FFFF00"/>
-                </a:highlight>
+              <a:rPr lang="en-US" sz="800" kern="0" dirty="0" err="1">
+                <a:solidFill>
+                  <a:prstClr val="black"/>
+                </a:solidFill>
                 <a:latin typeface="Calibri" panose="020F0502020204030204"/>
               </a:rPr>
               <a:t>controllerTemplateName</a:t>
             </a:r>
-            <a:endParaRPr lang="en-US" sz="800" kern="0" noProof="0" dirty="0">
+            <a:endParaRPr lang="en-US" sz="800" kern="0" dirty="0">
               <a:solidFill>
                 <a:prstClr val="black"/>
               </a:solidFill>
-              <a:highlight>
-                <a:srgbClr val="FFFF00"/>
-              </a:highlight>
               <a:latin typeface="Calibri" panose="020F0502020204030204"/>
             </a:endParaRPr>
           </a:p>
           <a:p>
-            <a:pPr defTabSz="914411">
-              <a:defRPr/>
-            </a:pPr>
-            <a:r>
-              <a:rPr lang="en-US" sz="800" kern="0" noProof="0" dirty="0">
+            <a:pPr defTabSz="914411"/>
+            <a:r>
+              <a:rPr lang="en-US" sz="800" kern="0" dirty="0">
                 <a:solidFill>
                   <a:prstClr val="black"/>
                 </a:solidFill>
@@ -12540,7 +12329,7 @@
               <a:t>_controllers[*]=[</a:t>
             </a:r>
             <a:r>
-              <a:rPr lang="en-US" sz="800" kern="0" noProof="0" dirty="0" err="1">
+              <a:rPr lang="en-US" sz="800" kern="0" dirty="0" err="1">
                 <a:solidFill>
                   <a:prstClr val="black"/>
                 </a:solidFill>
@@ -12549,7 +12338,7 @@
               <a:t>controllerName</a:t>
             </a:r>
             <a:r>
-              <a:rPr lang="en-US" sz="800" kern="0" noProof="0" dirty="0">
+              <a:rPr lang="en-US" sz="800" kern="0" dirty="0">
                 <a:solidFill>
                   <a:prstClr val="black"/>
                 </a:solidFill>
@@ -12559,9 +12348,7 @@
             </a:r>
           </a:p>
           <a:p>
-            <a:pPr defTabSz="914411">
-              <a:defRPr/>
-            </a:pPr>
+            <a:pPr defTabSz="914411"/>
             <a:r>
               <a:rPr lang="en-US" sz="800" kern="0" dirty="0">
                 <a:solidFill>
@@ -12587,19 +12374,10 @@
                 </a:solidFill>
                 <a:latin typeface="Calibri" panose="020F0502020204030204"/>
               </a:rPr>
-              <a:t>=</a:t>
-            </a:r>
-            <a:r>
-              <a:rPr lang="en-US" sz="800" kern="0" noProof="0" dirty="0">
-                <a:solidFill>
-                  <a:prstClr val="black"/>
-                </a:solidFill>
-                <a:latin typeface="Calibri" panose="020F0502020204030204"/>
-              </a:rPr>
-              <a:t>[</a:t>
-            </a:r>
-            <a:r>
-              <a:rPr lang="en-US" sz="800" kern="0" noProof="0" dirty="0" err="1">
+              <a:t>=[</a:t>
+            </a:r>
+            <a:r>
+              <a:rPr lang="en-US" sz="800" kern="0" dirty="0" err="1">
                 <a:solidFill>
                   <a:prstClr val="black"/>
                 </a:solidFill>
@@ -12608,7 +12386,7 @@
               <a:t>loadBalancerName</a:t>
             </a:r>
             <a:r>
-              <a:rPr lang="en-US" sz="800" kern="0" noProof="0" dirty="0">
+              <a:rPr lang="en-US" sz="800" kern="0" dirty="0">
                 <a:solidFill>
                   <a:prstClr val="black"/>
                 </a:solidFill>
@@ -12617,7 +12395,7 @@
               <a:t>/</a:t>
             </a:r>
             <a:r>
-              <a:rPr lang="en-US" sz="800" kern="0" noProof="0" dirty="0" err="1">
+              <a:rPr lang="en-US" sz="800" kern="0" dirty="0" err="1">
                 <a:solidFill>
                   <a:prstClr val="black"/>
                 </a:solidFill>
@@ -12626,7 +12404,7 @@
               <a:t>controllerName</a:t>
             </a:r>
             <a:r>
-              <a:rPr lang="en-US" sz="800" kern="0" noProof="0" dirty="0">
+              <a:rPr lang="en-US" sz="800" kern="0" dirty="0">
                 <a:solidFill>
                   <a:prstClr val="black"/>
                 </a:solidFill>
@@ -12651,7 +12429,7 @@
         </p:nvSpPr>
         <p:spPr>
           <a:xfrm>
-            <a:off x="31438770" y="11862299"/>
+            <a:off x="32534254" y="11862299"/>
             <a:ext cx="537299" cy="445572"/>
           </a:xfrm>
           <a:prstGeom prst="roundRect">
@@ -12712,7 +12490,7 @@
         </p:nvSpPr>
         <p:spPr>
           <a:xfrm>
-            <a:off x="31438770" y="12763497"/>
+            <a:off x="32534254" y="12763497"/>
             <a:ext cx="537299" cy="445572"/>
           </a:xfrm>
           <a:prstGeom prst="roundRect">
@@ -12776,7 +12554,7 @@
         </p:nvCxnSpPr>
         <p:spPr>
           <a:xfrm>
-            <a:off x="31707420" y="12307871"/>
+            <a:off x="32802904" y="12307871"/>
             <a:ext cx="0" cy="455626"/>
           </a:xfrm>
           <a:prstGeom prst="straightConnector1">
@@ -12812,8 +12590,8 @@
         </p:nvCxnSpPr>
         <p:spPr>
           <a:xfrm flipH="1">
-            <a:off x="30814130" y="12085085"/>
-            <a:ext cx="624640" cy="41525"/>
+            <a:off x="31990582" y="12085085"/>
+            <a:ext cx="543672" cy="6968"/>
           </a:xfrm>
           <a:prstGeom prst="straightConnector1">
             <a:avLst/>
@@ -12844,7 +12622,7 @@
         </p:nvSpPr>
         <p:spPr>
           <a:xfrm>
-            <a:off x="29082949" y="11969097"/>
+            <a:off x="30259401" y="11934540"/>
             <a:ext cx="1731181" cy="315026"/>
           </a:xfrm>
           <a:prstGeom prst="rect">
@@ -12868,7 +12646,7 @@
           <a:p>
             <a:pPr defTabSz="914411"/>
             <a:r>
-              <a:rPr lang="en-US" sz="800" kern="0" noProof="0" dirty="0">
+              <a:rPr lang="en-US" sz="800" kern="0" dirty="0">
                 <a:solidFill>
                   <a:prstClr val="black"/>
                 </a:solidFill>
@@ -12877,7 +12655,7 @@
               <a:t>local-id=[</a:t>
             </a:r>
             <a:r>
-              <a:rPr lang="en-US" sz="800" kern="0" noProof="0" dirty="0" err="1">
+              <a:rPr lang="en-US" sz="800" kern="0" dirty="0" err="1">
                 <a:solidFill>
                   <a:prstClr val="black"/>
                 </a:solidFill>
@@ -12886,7 +12664,7 @@
               <a:t>deviceName</a:t>
             </a:r>
             <a:r>
-              <a:rPr lang="en-US" sz="800" kern="0" noProof="0" dirty="0">
+              <a:rPr lang="en-US" sz="800" kern="0" dirty="0">
                 <a:solidFill>
                   <a:prstClr val="black"/>
                 </a:solidFill>
@@ -12902,9 +12680,6 @@
                 <a:solidFill>
                   <a:prstClr val="black"/>
                 </a:solidFill>
-                <a:highlight>
-                  <a:srgbClr val="FFFF00"/>
-                </a:highlight>
                 <a:latin typeface="Calibri" panose="020F0502020204030204"/>
               </a:rPr>
               <a:t>_template=</a:t>
@@ -12914,20 +12689,14 @@
                 <a:solidFill>
                   <a:prstClr val="black"/>
                 </a:solidFill>
-                <a:highlight>
-                  <a:srgbClr val="FFFF00"/>
-                </a:highlight>
                 <a:latin typeface="Calibri" panose="020F0502020204030204"/>
               </a:rPr>
               <a:t>mountPointTemplateName</a:t>
             </a:r>
-            <a:endParaRPr lang="en-US" sz="800" kern="0" noProof="0" dirty="0">
+            <a:endParaRPr lang="en-US" sz="800" kern="0" dirty="0">
               <a:solidFill>
                 <a:prstClr val="black"/>
               </a:solidFill>
-              <a:highlight>
-                <a:srgbClr val="FFFF00"/>
-              </a:highlight>
               <a:latin typeface="Calibri" panose="020F0502020204030204"/>
             </a:endParaRPr>
           </a:p>
@@ -12947,7 +12716,7 @@
         </p:nvSpPr>
         <p:spPr>
           <a:xfrm>
-            <a:off x="31844655" y="8867499"/>
+            <a:off x="32482608" y="8892955"/>
             <a:ext cx="45719" cy="45719"/>
           </a:xfrm>
           <a:prstGeom prst="ellipse">
@@ -12993,7 +12762,7 @@
         </p:nvSpPr>
         <p:spPr>
           <a:xfrm>
-            <a:off x="31519622" y="8867498"/>
+            <a:off x="32157575" y="8892954"/>
             <a:ext cx="45719" cy="45719"/>
           </a:xfrm>
           <a:prstGeom prst="ellipse">
@@ -13168,11 +12937,9 @@
           <a:bodyPr lIns="36000" tIns="36000" rIns="36000" bIns="36000" rtlCol="0" anchor="t"/>
           <a:lstStyle/>
           <a:p>
-            <a:pPr defTabSz="914411">
-              <a:defRPr/>
-            </a:pPr>
-            <a:r>
-              <a:rPr lang="en-US" sz="800" kern="0" noProof="0" dirty="0">
+            <a:pPr defTabSz="914411"/>
+            <a:r>
+              <a:rPr lang="en-US" sz="800" kern="0" dirty="0">
                 <a:solidFill>
                   <a:prstClr val="black"/>
                 </a:solidFill>
@@ -13181,7 +12948,7 @@
               <a:t>local-id=</a:t>
             </a:r>
             <a:r>
-              <a:rPr lang="en-US" sz="800" kern="0" noProof="0" dirty="0" err="1">
+              <a:rPr lang="en-US" sz="800" kern="0" dirty="0" err="1">
                 <a:solidFill>
                   <a:prstClr val="black"/>
                 </a:solidFill>
@@ -13190,7 +12957,7 @@
               <a:t>tcp</a:t>
             </a:r>
             <a:r>
-              <a:rPr lang="en-US" sz="800" kern="0" noProof="0" dirty="0">
+              <a:rPr lang="en-US" sz="800" kern="0" dirty="0">
                 <a:solidFill>
                   <a:prstClr val="black"/>
                 </a:solidFill>
@@ -13202,7 +12969,7 @@
           <a:p>
             <a:pPr defTabSz="914411"/>
             <a:r>
-              <a:rPr lang="en-US" sz="800" kern="0" noProof="0" dirty="0" err="1">
+              <a:rPr lang="en-US" sz="800" kern="0" dirty="0" err="1">
                 <a:solidFill>
                   <a:prstClr val="black"/>
                 </a:solidFill>
@@ -13210,7 +12977,7 @@
               </a:rPr>
               <a:t>remoteIpAddress</a:t>
             </a:r>
-            <a:endParaRPr lang="en-US" sz="800" kern="0" noProof="0" dirty="0">
+            <a:endParaRPr lang="en-US" sz="800" kern="0" dirty="0">
               <a:solidFill>
                 <a:prstClr val="black"/>
               </a:solidFill>
@@ -13220,7 +12987,7 @@
           <a:p>
             <a:pPr defTabSz="914411"/>
             <a:r>
-              <a:rPr lang="en-US" sz="800" kern="0" noProof="0" dirty="0" err="1">
+              <a:rPr lang="en-US" sz="800" kern="0" dirty="0" err="1">
                 <a:solidFill>
                   <a:prstClr val="black"/>
                 </a:solidFill>
@@ -13228,7 +12995,7 @@
               </a:rPr>
               <a:t>remotePort</a:t>
             </a:r>
-            <a:endParaRPr lang="en-US" sz="800" kern="0" noProof="0" dirty="0">
+            <a:endParaRPr lang="en-US" sz="800" kern="0" dirty="0">
               <a:solidFill>
                 <a:prstClr val="black"/>
               </a:solidFill>
@@ -13238,72 +13005,54 @@
           <a:p>
             <a:pPr defTabSz="914411"/>
             <a:r>
-              <a:rPr lang="en-US" sz="800" kern="0" noProof="0" dirty="0" err="1">
-                <a:solidFill>
-                  <a:prstClr val="black"/>
-                </a:solidFill>
-                <a:highlight>
-                  <a:srgbClr val="FFFF00"/>
-                </a:highlight>
+              <a:rPr lang="en-US" sz="800" kern="0" dirty="0" err="1">
+                <a:solidFill>
+                  <a:prstClr val="black"/>
+                </a:solidFill>
                 <a:latin typeface="Calibri" panose="020F0502020204030204"/>
               </a:rPr>
               <a:t>notificationSubscribe</a:t>
             </a:r>
-            <a:endParaRPr lang="en-US" sz="800" kern="0" noProof="0" dirty="0">
+            <a:endParaRPr lang="en-US" sz="800" kern="0" dirty="0">
               <a:solidFill>
                 <a:prstClr val="black"/>
               </a:solidFill>
-              <a:highlight>
-                <a:srgbClr val="FFFF00"/>
-              </a:highlight>
               <a:latin typeface="Calibri" panose="020F0502020204030204"/>
             </a:endParaRPr>
           </a:p>
           <a:p>
             <a:pPr defTabSz="914411"/>
             <a:r>
-              <a:rPr lang="en-US" sz="800" kern="0" noProof="0" dirty="0" err="1">
-                <a:solidFill>
-                  <a:prstClr val="black"/>
-                </a:solidFill>
-                <a:highlight>
-                  <a:srgbClr val="FFFF00"/>
-                </a:highlight>
+              <a:rPr lang="en-US" sz="800" kern="0" dirty="0" err="1">
+                <a:solidFill>
+                  <a:prstClr val="black"/>
+                </a:solidFill>
                 <a:latin typeface="Calibri" panose="020F0502020204030204"/>
               </a:rPr>
               <a:t>notificationStreamName</a:t>
             </a:r>
-            <a:endParaRPr lang="en-US" sz="800" kern="0" noProof="0" dirty="0">
+            <a:endParaRPr lang="en-US" sz="800" kern="0" dirty="0">
               <a:solidFill>
                 <a:prstClr val="black"/>
               </a:solidFill>
-              <a:highlight>
-                <a:srgbClr val="FFFF00"/>
-              </a:highlight>
               <a:latin typeface="Calibri" panose="020F0502020204030204"/>
             </a:endParaRPr>
           </a:p>
           <a:p>
             <a:pPr defTabSz="914411"/>
             <a:r>
-              <a:rPr lang="en-US" sz="800" kern="0" noProof="0" dirty="0" err="1">
-                <a:solidFill>
-                  <a:prstClr val="black"/>
-                </a:solidFill>
-                <a:highlight>
-                  <a:srgbClr val="FFFF00"/>
-                </a:highlight>
+              <a:rPr lang="en-US" sz="800" kern="0" dirty="0" err="1">
+                <a:solidFill>
+                  <a:prstClr val="black"/>
+                </a:solidFill>
                 <a:latin typeface="Calibri" panose="020F0502020204030204"/>
               </a:rPr>
               <a:t>availableCapability</a:t>
             </a:r>
-            <a:endParaRPr lang="en-US" sz="800" kern="0" noProof="0" dirty="0">
+            <a:endParaRPr lang="en-US" sz="800" kern="0" dirty="0">
               <a:solidFill>
                 <a:prstClr val="black"/>
               </a:solidFill>
-              <a:highlight>
-                <a:srgbClr val="FFFF00"/>
-              </a:highlight>
               <a:latin typeface="Calibri" panose="020F0502020204030204"/>
             </a:endParaRPr>
           </a:p>
@@ -13314,20 +13063,14 @@
                 <a:solidFill>
                   <a:prstClr val="black"/>
                 </a:solidFill>
-                <a:highlight>
-                  <a:srgbClr val="FFFF00"/>
-                </a:highlight>
                 <a:latin typeface="Calibri" panose="020F0502020204030204"/>
               </a:rPr>
               <a:t>unavailableCapability</a:t>
             </a:r>
-            <a:endParaRPr lang="en-US" sz="800" kern="0" noProof="0" dirty="0">
+            <a:endParaRPr lang="en-US" sz="800" kern="0" dirty="0">
               <a:solidFill>
                 <a:prstClr val="black"/>
               </a:solidFill>
-              <a:highlight>
-                <a:srgbClr val="FFFF00"/>
-              </a:highlight>
               <a:latin typeface="Calibri" panose="020F0502020204030204"/>
             </a:endParaRPr>
           </a:p>
@@ -13344,15 +13087,15 @@
           </p:cNvPr>
           <p:cNvCxnSpPr>
             <a:cxnSpLocks/>
-            <a:stCxn id="102" idx="1"/>
-            <a:endCxn id="67" idx="3"/>
+            <a:stCxn id="102" idx="0"/>
+            <a:endCxn id="67" idx="2"/>
           </p:cNvCxnSpPr>
           <p:nvPr/>
         </p:nvCxnSpPr>
         <p:spPr>
           <a:xfrm flipH="1" flipV="1">
-            <a:off x="31976069" y="12986283"/>
-            <a:ext cx="561093" cy="1808913"/>
+            <a:off x="32802904" y="13209069"/>
+            <a:ext cx="314985" cy="1363341"/>
           </a:xfrm>
           <a:prstGeom prst="straightConnector1">
             <a:avLst/>
@@ -13383,7 +13126,7 @@
         </p:nvSpPr>
         <p:spPr>
           <a:xfrm>
-            <a:off x="29751087" y="12769661"/>
+            <a:off x="30408312" y="12769661"/>
             <a:ext cx="1161453" cy="445572"/>
           </a:xfrm>
           <a:prstGeom prst="roundRect">
@@ -13456,8 +13199,8 @@
         </p:nvCxnSpPr>
         <p:spPr>
           <a:xfrm flipV="1">
-            <a:off x="30912540" y="12986283"/>
-            <a:ext cx="526230" cy="6164"/>
+            <a:off x="31569765" y="12986283"/>
+            <a:ext cx="964489" cy="6164"/>
           </a:xfrm>
           <a:prstGeom prst="straightConnector1">
             <a:avLst/>
@@ -13719,7 +13462,7 @@
         </p:nvSpPr>
         <p:spPr>
           <a:xfrm>
-            <a:off x="28216649" y="13332551"/>
+            <a:off x="28357546" y="12878630"/>
             <a:ext cx="1514051" cy="329235"/>
           </a:xfrm>
           <a:prstGeom prst="rect">
@@ -14103,13 +13846,14 @@
           <p:cNvCxnSpPr>
             <a:cxnSpLocks/>
             <a:stCxn id="248" idx="3"/>
+            <a:endCxn id="243" idx="0"/>
           </p:cNvCxnSpPr>
           <p:nvPr/>
         </p:nvCxnSpPr>
         <p:spPr>
           <a:xfrm>
             <a:off x="26827798" y="12185737"/>
-            <a:ext cx="2937827" cy="628517"/>
+            <a:ext cx="3640065" cy="592532"/>
           </a:xfrm>
           <a:prstGeom prst="straightConnector1">
             <a:avLst/>
@@ -14138,14 +13882,14 @@
           <p:cNvCxnSpPr>
             <a:cxnSpLocks/>
             <a:stCxn id="208" idx="1"/>
-            <a:endCxn id="241" idx="0"/>
+            <a:endCxn id="241" idx="3"/>
           </p:cNvCxnSpPr>
           <p:nvPr/>
         </p:nvCxnSpPr>
         <p:spPr>
           <a:xfrm flipH="1">
-            <a:off x="28973675" y="12992447"/>
-            <a:ext cx="777412" cy="340104"/>
+            <a:off x="29871597" y="12992447"/>
+            <a:ext cx="536715" cy="50801"/>
           </a:xfrm>
           <a:prstGeom prst="straightConnector1">
             <a:avLst/>
@@ -14181,7 +13925,7 @@
         <p:spPr>
           <a:xfrm>
             <a:off x="9734239" y="6840779"/>
-            <a:ext cx="21973181" cy="2020030"/>
+            <a:ext cx="22568608" cy="2020030"/>
           </a:xfrm>
           <a:prstGeom prst="bentConnector2">
             <a:avLst/>
@@ -14249,53 +13993,6 @@
         <p:spPr>
           <a:xfrm>
             <a:off x="23607052" y="12790370"/>
-            <a:ext cx="45719" cy="45719"/>
-          </a:xfrm>
-          <a:prstGeom prst="ellipse">
-            <a:avLst/>
-          </a:prstGeom>
-          <a:solidFill>
-            <a:srgbClr val="4472C4">
-              <a:lumMod val="60000"/>
-              <a:lumOff val="40000"/>
-            </a:srgbClr>
-          </a:solidFill>
-          <a:ln w="12700" cap="flat" cmpd="sng" algn="ctr">
-            <a:noFill/>
-            <a:prstDash val="solid"/>
-            <a:miter lim="800000"/>
-          </a:ln>
-          <a:effectLst/>
-        </p:spPr>
-        <p:txBody>
-          <a:bodyPr rtlCol="0" anchor="ctr"/>
-          <a:lstStyle/>
-          <a:p>
-            <a:pPr algn="ctr" defTabSz="914411"/>
-            <a:endParaRPr lang="en-US" sz="1050" kern="0" noProof="0" dirty="0">
-              <a:solidFill>
-                <a:prstClr val="white"/>
-              </a:solidFill>
-              <a:latin typeface="Calibri" panose="020F0502020204030204"/>
-            </a:endParaRPr>
-          </a:p>
-        </p:txBody>
-      </p:sp>
-      <p:sp>
-        <p:nvSpPr>
-          <p:cNvPr id="243" name="Ellipse 242">
-            <a:extLst>
-              <a:ext uri="{FF2B5EF4-FFF2-40B4-BE49-F238E27FC236}">
-                <a16:creationId xmlns:a16="http://schemas.microsoft.com/office/drawing/2014/main" id="{8A62DB68-E572-F9C6-FA24-54502C6CE2FF}"/>
-              </a:ext>
-            </a:extLst>
-          </p:cNvPr>
-          <p:cNvSpPr/>
-          <p:nvPr/>
-        </p:nvSpPr>
-        <p:spPr>
-          <a:xfrm>
-            <a:off x="29771903" y="12814254"/>
             <a:ext cx="45719" cy="45719"/>
           </a:xfrm>
           <a:prstGeom prst="ellipse">
@@ -14437,7 +14134,7 @@
           <a:p>
             <a:pPr defTabSz="914411"/>
             <a:r>
-              <a:rPr lang="en-US" sz="800" kern="0" noProof="0" dirty="0">
+              <a:rPr lang="en-US" sz="800" kern="0" dirty="0">
                 <a:solidFill>
                   <a:prstClr val="black"/>
                 </a:solidFill>
@@ -14446,19 +14143,16 @@
               <a:t>local-id=[</a:t>
             </a:r>
             <a:r>
-              <a:rPr lang="en-US" sz="800" kern="0" noProof="0" dirty="0" err="1">
-                <a:solidFill>
-                  <a:prstClr val="black"/>
-                </a:solidFill>
-                <a:highlight>
-                  <a:srgbClr val="FFFF00"/>
-                </a:highlight>
+              <a:rPr lang="en-US" sz="800" kern="0" dirty="0" err="1">
+                <a:solidFill>
+                  <a:prstClr val="black"/>
+                </a:solidFill>
                 <a:latin typeface="Calibri" panose="020F0502020204030204"/>
               </a:rPr>
               <a:t>mountPointTemplateName</a:t>
             </a:r>
             <a:r>
-              <a:rPr lang="en-US" sz="800" kern="0" noProof="0" dirty="0">
+              <a:rPr lang="en-US" sz="800" kern="0" dirty="0">
                 <a:solidFill>
                   <a:prstClr val="black"/>
                 </a:solidFill>
@@ -14470,72 +14164,48 @@
           <a:p>
             <a:pPr defTabSz="914411"/>
             <a:r>
-              <a:rPr lang="en-US" sz="800" kern="0" noProof="0" dirty="0">
-                <a:solidFill>
-                  <a:prstClr val="black"/>
-                </a:solidFill>
-                <a:latin typeface="Calibri" panose="020F0502020204030204"/>
-              </a:rPr>
-              <a:t>category=</a:t>
-            </a:r>
-            <a:r>
-              <a:rPr lang="en-US" sz="800" kern="0" noProof="0" dirty="0">
-                <a:solidFill>
-                  <a:prstClr val="black"/>
-                </a:solidFill>
-                <a:highlight>
-                  <a:srgbClr val="FFFF00"/>
-                </a:highlight>
-                <a:latin typeface="Calibri" panose="020F0502020204030204"/>
-              </a:rPr>
-              <a:t>mountpoint</a:t>
+              <a:rPr lang="en-US" sz="800" kern="0" dirty="0">
+                <a:solidFill>
+                  <a:prstClr val="black"/>
+                </a:solidFill>
+                <a:latin typeface="Calibri" panose="020F0502020204030204"/>
+              </a:rPr>
+              <a:t>category=mountpoint</a:t>
             </a:r>
           </a:p>
           <a:p>
             <a:pPr defTabSz="914411"/>
             <a:r>
-              <a:rPr lang="en-US" sz="800" kern="0" noProof="0" dirty="0" err="1">
-                <a:solidFill>
-                  <a:prstClr val="black"/>
-                </a:solidFill>
-                <a:highlight>
-                  <a:srgbClr val="FFFF00"/>
-                </a:highlight>
+              <a:rPr lang="en-US" sz="800" kern="0" dirty="0" err="1">
+                <a:solidFill>
+                  <a:prstClr val="black"/>
+                </a:solidFill>
                 <a:latin typeface="Calibri" panose="020F0502020204030204"/>
               </a:rPr>
               <a:t>netconfUserName</a:t>
             </a:r>
-            <a:endParaRPr lang="en-US" sz="800" kern="0" noProof="0" dirty="0">
+            <a:endParaRPr lang="en-US" sz="800" kern="0" dirty="0">
               <a:solidFill>
                 <a:prstClr val="black"/>
               </a:solidFill>
-              <a:highlight>
-                <a:srgbClr val="FFFF00"/>
-              </a:highlight>
               <a:latin typeface="Calibri" panose="020F0502020204030204"/>
             </a:endParaRPr>
           </a:p>
           <a:p>
             <a:pPr defTabSz="914411"/>
             <a:r>
-              <a:rPr lang="en-US" sz="800" kern="0" noProof="0" dirty="0" err="1">
-                <a:solidFill>
-                  <a:prstClr val="black"/>
-                </a:solidFill>
-                <a:highlight>
-                  <a:srgbClr val="FFFF00"/>
-                </a:highlight>
+              <a:rPr lang="en-US" sz="800" kern="0" dirty="0" err="1">
+                <a:solidFill>
+                  <a:prstClr val="black"/>
+                </a:solidFill>
                 <a:latin typeface="Calibri" panose="020F0502020204030204"/>
               </a:rPr>
               <a:t>netconfPassword</a:t>
             </a:r>
-            <a:endParaRPr lang="en-US" sz="800" kern="0" noProof="0" dirty="0">
+            <a:endParaRPr lang="en-US" sz="800" kern="0" dirty="0">
               <a:solidFill>
                 <a:prstClr val="black"/>
               </a:solidFill>
-              <a:highlight>
-                <a:srgbClr val="FFFF00"/>
-              </a:highlight>
               <a:latin typeface="Calibri" panose="020F0502020204030204"/>
             </a:endParaRPr>
           </a:p>
@@ -14546,38 +14216,23 @@
                 <a:solidFill>
                   <a:prstClr val="black"/>
                 </a:solidFill>
-                <a:highlight>
-                  <a:srgbClr val="FFFF00"/>
-                </a:highlight>
                 <a:latin typeface="Calibri" panose="020F0502020204030204"/>
               </a:rPr>
               <a:t>… and many more</a:t>
             </a:r>
-            <a:endParaRPr lang="en-US" sz="800" kern="0" noProof="0" dirty="0">
+          </a:p>
+          <a:p>
+            <a:pPr defTabSz="914411"/>
+            <a:endParaRPr lang="en-US" sz="800" kern="0" dirty="0">
               <a:solidFill>
                 <a:prstClr val="black"/>
               </a:solidFill>
-              <a:highlight>
-                <a:srgbClr val="FFFF00"/>
-              </a:highlight>
               <a:latin typeface="Calibri" panose="020F0502020204030204"/>
             </a:endParaRPr>
           </a:p>
           <a:p>
             <a:pPr defTabSz="914411"/>
-            <a:endParaRPr lang="en-US" sz="800" kern="0" noProof="0" dirty="0">
-              <a:solidFill>
-                <a:prstClr val="black"/>
-              </a:solidFill>
-              <a:highlight>
-                <a:srgbClr val="FFFF00"/>
-              </a:highlight>
-              <a:latin typeface="Calibri" panose="020F0502020204030204"/>
-            </a:endParaRPr>
-          </a:p>
-          <a:p>
-            <a:pPr defTabSz="914411"/>
-            <a:endParaRPr lang="en-US" sz="800" kern="0" noProof="0" dirty="0">
+            <a:endParaRPr lang="en-US" sz="800" kern="0" dirty="0">
               <a:solidFill>
                 <a:prstClr val="black"/>
               </a:solidFill>
@@ -14679,7 +14334,9 @@
             <a:avLst/>
           </a:prstGeom>
           <a:solidFill>
-            <a:srgbClr val="FFFF00"/>
+            <a:sysClr val="window" lastClr="FFFFFF">
+              <a:lumMod val="65000"/>
+            </a:sysClr>
           </a:solidFill>
           <a:ln w="12700" cap="flat" cmpd="sng" algn="ctr">
             <a:solidFill>
@@ -14702,11 +14359,12 @@
           <a:bodyPr rtlCol="0" anchor="ctr"/>
           <a:lstStyle/>
           <a:p>
-            <a:pPr algn="ctr" defTabSz="914411">
-              <a:defRPr/>
-            </a:pPr>
-            <a:r>
-              <a:rPr lang="en-US" sz="1050" kern="0" noProof="0" dirty="0">
+            <a:pPr algn="ctr" defTabSz="914411"/>
+            <a:r>
+              <a:rPr lang="en-US" sz="1050" kern="0" dirty="0">
+                <a:solidFill>
+                  <a:prstClr val="white"/>
+                </a:solidFill>
                 <a:latin typeface="Calibri" panose="020F0502020204030204"/>
               </a:rPr>
               <a:t>P</a:t>
@@ -14752,13 +14410,10 @@
           <a:p>
             <a:pPr defTabSz="914411"/>
             <a:r>
-              <a:rPr lang="en-US" sz="800" kern="0" noProof="0" dirty="0">
-                <a:solidFill>
-                  <a:prstClr val="black"/>
-                </a:solidFill>
-                <a:highlight>
-                  <a:srgbClr val="FFFF00"/>
-                </a:highlight>
+              <a:rPr lang="en-US" sz="800" kern="0" dirty="0">
+                <a:solidFill>
+                  <a:prstClr val="black"/>
+                </a:solidFill>
                 <a:latin typeface="Calibri" panose="020F0502020204030204"/>
               </a:rPr>
               <a:t>_target-function</a:t>
@@ -14767,13 +14422,10 @@
           <a:p>
             <a:pPr defTabSz="914411"/>
             <a:r>
-              <a:rPr lang="en-US" sz="800" kern="0" noProof="0" dirty="0">
-                <a:solidFill>
-                  <a:prstClr val="black"/>
-                </a:solidFill>
-                <a:highlight>
-                  <a:srgbClr val="FFFF00"/>
-                </a:highlight>
+              <a:rPr lang="en-US" sz="800" kern="0" dirty="0">
+                <a:solidFill>
+                  <a:prstClr val="black"/>
+                </a:solidFill>
                 <a:latin typeface="Calibri" panose="020F0502020204030204"/>
               </a:rPr>
               <a:t>period-length</a:t>
@@ -14786,22 +14438,10 @@
                 <a:solidFill>
                   <a:prstClr val="black"/>
                 </a:solidFill>
-                <a:highlight>
-                  <a:srgbClr val="FFFF00"/>
-                </a:highlight>
                 <a:latin typeface="Calibri" panose="020F0502020204030204"/>
               </a:rPr>
               <a:t>…</a:t>
             </a:r>
-            <a:endParaRPr lang="en-US" sz="800" kern="0" noProof="0" dirty="0">
-              <a:solidFill>
-                <a:prstClr val="black"/>
-              </a:solidFill>
-              <a:highlight>
-                <a:srgbClr val="FFFF00"/>
-              </a:highlight>
-              <a:latin typeface="Calibri" panose="020F0502020204030204"/>
-            </a:endParaRPr>
           </a:p>
         </p:txBody>
       </p:sp>
@@ -14926,7 +14566,7 @@
           <a:p>
             <a:pPr algn="ctr" defTabSz="914411"/>
             <a:r>
-              <a:rPr lang="en-US" sz="1050" kern="0" dirty="0" err="1">
+              <a:rPr lang="en-US" sz="1050" kern="0">
                 <a:solidFill>
                   <a:prstClr val="white"/>
                 </a:solidFill>
@@ -14990,9 +14630,6 @@
                 <a:solidFill>
                   <a:prstClr val="black"/>
                 </a:solidFill>
-                <a:highlight>
-                  <a:srgbClr val="FFFF00"/>
-                </a:highlight>
                 <a:latin typeface="Calibri" panose="020F0502020204030204"/>
               </a:rPr>
               <a:t>local-id=http-server / [</a:t>
@@ -15002,9 +14639,6 @@
                 <a:solidFill>
                   <a:prstClr val="black"/>
                 </a:solidFill>
-                <a:highlight>
-                  <a:srgbClr val="FFFF00"/>
-                </a:highlight>
                 <a:latin typeface="Calibri" panose="020F0502020204030204"/>
               </a:rPr>
               <a:t>applicationName</a:t>
@@ -15014,9 +14648,6 @@
                 <a:solidFill>
                   <a:prstClr val="black"/>
                 </a:solidFill>
-                <a:highlight>
-                  <a:srgbClr val="FFFF00"/>
-                </a:highlight>
                 <a:latin typeface="Calibri" panose="020F0502020204030204"/>
               </a:rPr>
               <a:t>]</a:t>
@@ -15029,22 +14660,37 @@
                 <a:solidFill>
                   <a:prstClr val="black"/>
                 </a:solidFill>
-                <a:highlight>
-                  <a:srgbClr val="FFFF00"/>
-                </a:highlight>
                 <a:latin typeface="Calibri" panose="020F0502020204030204"/>
               </a:rPr>
               <a:t>httpUserName</a:t>
             </a:r>
-            <a:endParaRPr lang="en-US" sz="800" kern="0" dirty="0">
-              <a:solidFill>
-                <a:prstClr val="black"/>
-              </a:solidFill>
-              <a:highlight>
-                <a:srgbClr val="FFFF00"/>
-              </a:highlight>
-              <a:latin typeface="Calibri" panose="020F0502020204030204"/>
-            </a:endParaRPr>
+            <a:r>
+              <a:rPr lang="en-US" sz="800" kern="0" dirty="0">
+                <a:solidFill>
+                  <a:prstClr val="black"/>
+                </a:solidFill>
+                <a:latin typeface="Calibri" panose="020F0502020204030204"/>
+              </a:rPr>
+              <a:t>=  ~    / [</a:t>
+            </a:r>
+            <a:r>
+              <a:rPr lang="en-US" sz="800" kern="0" dirty="0" err="1">
+                <a:solidFill>
+                  <a:prstClr val="black"/>
+                </a:solidFill>
+                <a:latin typeface="Calibri" panose="020F0502020204030204"/>
+              </a:rPr>
+              <a:t>applicationName</a:t>
+            </a:r>
+            <a:r>
+              <a:rPr lang="en-US" sz="800" kern="0" dirty="0">
+                <a:solidFill>
+                  <a:prstClr val="black"/>
+                </a:solidFill>
+                <a:latin typeface="Calibri" panose="020F0502020204030204"/>
+              </a:rPr>
+              <a:t>]</a:t>
+            </a:r>
           </a:p>
           <a:p>
             <a:pPr defTabSz="914411"/>
@@ -15053,9 +14699,6 @@
                 <a:solidFill>
                   <a:prstClr val="black"/>
                 </a:solidFill>
-                <a:highlight>
-                  <a:srgbClr val="FFFF00"/>
-                </a:highlight>
                 <a:latin typeface="Calibri" panose="020F0502020204030204"/>
               </a:rPr>
               <a:t>httpPassword</a:t>
@@ -15259,11 +14902,9 @@
           <a:bodyPr rtlCol="0" anchor="ctr"/>
           <a:lstStyle/>
           <a:p>
-            <a:pPr algn="ctr" defTabSz="914411">
-              <a:defRPr/>
-            </a:pPr>
-            <a:r>
-              <a:rPr lang="en-US" sz="1050" kern="0" noProof="0" dirty="0">
+            <a:pPr algn="ctr" defTabSz="914411"/>
+            <a:r>
+              <a:rPr lang="en-US" sz="1050" kern="0">
                 <a:solidFill>
                   <a:prstClr val="white"/>
                 </a:solidFill>
@@ -15271,6 +14912,12 @@
               </a:rPr>
               <a:t>L</a:t>
             </a:r>
+            <a:endParaRPr lang="en-US" sz="1050" kern="0" dirty="0">
+              <a:solidFill>
+                <a:prstClr val="white"/>
+              </a:solidFill>
+              <a:latin typeface="Calibri" panose="020F0502020204030204"/>
+            </a:endParaRPr>
           </a:p>
         </p:txBody>
       </p:sp>
@@ -15288,7 +14935,7 @@
         </p:nvSpPr>
         <p:spPr>
           <a:xfrm>
-            <a:off x="7809222" y="11860574"/>
+            <a:off x="7799697" y="11860574"/>
             <a:ext cx="1629369" cy="361419"/>
           </a:xfrm>
           <a:prstGeom prst="rect">
@@ -15312,7 +14959,7 @@
           <a:p>
             <a:pPr defTabSz="914411"/>
             <a:r>
-              <a:rPr lang="en-US" sz="800" kern="0" noProof="0" dirty="0">
+              <a:rPr lang="en-US" sz="800" kern="0" dirty="0">
                 <a:solidFill>
                   <a:prstClr val="black"/>
                 </a:solidFill>
@@ -15324,7 +14971,7 @@
           <a:p>
             <a:pPr defTabSz="914411"/>
             <a:r>
-              <a:rPr lang="en-US" sz="800" kern="0" noProof="0" dirty="0" err="1">
+              <a:rPr lang="en-US" sz="800" kern="0" dirty="0" err="1">
                 <a:solidFill>
                   <a:prstClr val="black"/>
                 </a:solidFill>
@@ -15333,7 +14980,7 @@
               <a:t>linktp</a:t>
             </a:r>
             <a:r>
-              <a:rPr lang="en-US" sz="800" kern="0" noProof="0" dirty="0">
+              <a:rPr lang="en-US" sz="800" kern="0" dirty="0">
                 <a:solidFill>
                   <a:prstClr val="black"/>
                 </a:solidFill>
@@ -15342,7 +14989,7 @@
               <a:t>*[{local-id,_cc,_</a:t>
             </a:r>
             <a:r>
-              <a:rPr lang="en-US" sz="800" kern="0" noProof="0" dirty="0" err="1">
+              <a:rPr lang="en-US" sz="800" kern="0" dirty="0" err="1">
                 <a:solidFill>
                   <a:prstClr val="black"/>
                 </a:solidFill>
@@ -15351,7 +14998,7 @@
               <a:t>ltp</a:t>
             </a:r>
             <a:r>
-              <a:rPr lang="en-US" sz="800" kern="0" noProof="0" dirty="0">
+              <a:rPr lang="en-US" sz="800" kern="0" dirty="0">
                 <a:solidFill>
                   <a:prstClr val="black"/>
                 </a:solidFill>
@@ -15360,7 +15007,7 @@
               <a:t>,_</a:t>
             </a:r>
             <a:r>
-              <a:rPr lang="en-US" sz="800" kern="0" noProof="0" dirty="0" err="1">
+              <a:rPr lang="en-US" sz="800" kern="0" dirty="0" err="1">
                 <a:solidFill>
                   <a:prstClr val="black"/>
                 </a:solidFill>
@@ -15369,7 +15016,7 @@
               <a:t>lp</a:t>
             </a:r>
             <a:r>
-              <a:rPr lang="en-US" sz="800" kern="0" noProof="0" dirty="0">
+              <a:rPr lang="en-US" sz="800" kern="0" dirty="0">
                 <a:solidFill>
                   <a:prstClr val="black"/>
                 </a:solidFill>
@@ -15399,7 +15046,7 @@
         <p:spPr>
           <a:xfrm flipV="1">
             <a:off x="5436231" y="12041284"/>
-            <a:ext cx="2372991" cy="142232"/>
+            <a:ext cx="2363466" cy="142232"/>
           </a:xfrm>
           <a:prstGeom prst="straightConnector1">
             <a:avLst/>
@@ -15537,7 +15184,7 @@
           <a:p>
             <a:pPr algn="ctr" defTabSz="914411"/>
             <a:r>
-              <a:rPr lang="en-US" sz="1050" kern="0" dirty="0" err="1">
+              <a:rPr lang="en-US" sz="1050" kern="0">
                 <a:solidFill>
                   <a:prstClr val="white"/>
                 </a:solidFill>
@@ -15572,7 +15219,7 @@
         <p:spPr>
           <a:xfrm>
             <a:off x="3320992" y="12780162"/>
-            <a:ext cx="1212405" cy="445573"/>
+            <a:ext cx="1212405" cy="587072"/>
           </a:xfrm>
           <a:prstGeom prst="rect">
             <a:avLst/>
@@ -15593,17 +15240,12 @@
           <a:bodyPr lIns="36000" tIns="36000" rIns="36000" bIns="36000" rtlCol="0" anchor="t"/>
           <a:lstStyle/>
           <a:p>
-            <a:pPr defTabSz="914411">
-              <a:defRPr/>
-            </a:pPr>
+            <a:pPr defTabSz="914411"/>
             <a:r>
               <a:rPr lang="en-US" sz="800" kern="0" dirty="0">
                 <a:solidFill>
                   <a:prstClr val="black"/>
                 </a:solidFill>
-                <a:highlight>
-                  <a:srgbClr val="FFFF00"/>
-                </a:highlight>
                 <a:latin typeface="Calibri" panose="020F0502020204030204"/>
               </a:rPr>
               <a:t>local-id=http-client</a:t>
@@ -15616,36 +15258,9 @@
                 <a:solidFill>
                   <a:prstClr val="black"/>
                 </a:solidFill>
-                <a:highlight>
-                  <a:srgbClr val="FFFF00"/>
-                </a:highlight>
                 <a:latin typeface="Calibri" panose="020F0502020204030204"/>
               </a:rPr>
               <a:t>httpUserName</a:t>
-            </a:r>
-            <a:endParaRPr lang="en-US" sz="800" kern="0" dirty="0">
-              <a:solidFill>
-                <a:prstClr val="black"/>
-              </a:solidFill>
-              <a:highlight>
-                <a:srgbClr val="FFFF00"/>
-              </a:highlight>
-              <a:latin typeface="Calibri" panose="020F0502020204030204"/>
-            </a:endParaRPr>
-          </a:p>
-          <a:p>
-            <a:pPr defTabSz="914411"/>
-            <a:r>
-              <a:rPr lang="en-US" sz="800" kern="0" dirty="0" err="1">
-                <a:solidFill>
-                  <a:prstClr val="black"/>
-                </a:solidFill>
-                <a:highlight>
-                  <a:srgbClr val="FFFF00"/>
-                </a:highlight>
-                <a:latin typeface="Calibri" panose="020F0502020204030204"/>
-              </a:rPr>
-              <a:t>httpPassword</a:t>
             </a:r>
             <a:endParaRPr lang="en-US" sz="800" kern="0" dirty="0">
               <a:solidFill>
@@ -15654,6 +15269,54 @@
               <a:latin typeface="Calibri" panose="020F0502020204030204"/>
             </a:endParaRPr>
           </a:p>
+          <a:p>
+            <a:pPr defTabSz="914411"/>
+            <a:r>
+              <a:rPr lang="en-US" sz="800" kern="0" dirty="0">
+                <a:solidFill>
+                  <a:prstClr val="black"/>
+                </a:solidFill>
+                <a:latin typeface="Calibri" panose="020F0502020204030204"/>
+              </a:rPr>
+              <a:t>              =[</a:t>
+            </a:r>
+            <a:r>
+              <a:rPr lang="en-US" sz="800" kern="0" dirty="0" err="1">
+                <a:solidFill>
+                  <a:prstClr val="black"/>
+                </a:solidFill>
+                <a:latin typeface="Calibri" panose="020F0502020204030204"/>
+              </a:rPr>
+              <a:t>applicationName</a:t>
+            </a:r>
+            <a:r>
+              <a:rPr lang="en-US" sz="800" kern="0" dirty="0">
+                <a:solidFill>
+                  <a:prstClr val="black"/>
+                </a:solidFill>
+                <a:latin typeface="Calibri" panose="020F0502020204030204"/>
+              </a:rPr>
+              <a:t>]</a:t>
+            </a:r>
+          </a:p>
+          <a:p>
+            <a:pPr defTabSz="914411"/>
+            <a:r>
+              <a:rPr lang="en-US" sz="800" kern="0" dirty="0" err="1">
+                <a:solidFill>
+                  <a:prstClr val="black"/>
+                </a:solidFill>
+                <a:latin typeface="Calibri" panose="020F0502020204030204"/>
+              </a:rPr>
+              <a:t>httpPassword</a:t>
+            </a:r>
+            <a:endParaRPr lang="en-US" sz="800" kern="0" dirty="0">
+              <a:solidFill>
+                <a:prstClr val="black"/>
+              </a:solidFill>
+              <a:latin typeface="Calibri" panose="020F0502020204030204"/>
+            </a:endParaRPr>
+          </a:p>
         </p:txBody>
       </p:sp>
       <p:cxnSp>
@@ -15711,7 +15374,7 @@
         <p:spPr>
           <a:xfrm>
             <a:off x="2889326" y="13000046"/>
-            <a:ext cx="431666" cy="2903"/>
+            <a:ext cx="431666" cy="73652"/>
           </a:xfrm>
           <a:prstGeom prst="straightConnector1">
             <a:avLst/>
@@ -15728,52 +15391,6 @@
           <a:effectLst/>
         </p:spPr>
       </p:cxnSp>
-      <p:sp>
-        <p:nvSpPr>
-          <p:cNvPr id="6" name="Rechteck 5">
-            <a:extLst>
-              <a:ext uri="{FF2B5EF4-FFF2-40B4-BE49-F238E27FC236}">
-                <a16:creationId xmlns:a16="http://schemas.microsoft.com/office/drawing/2014/main" id="{88D2DCF3-F025-EF6D-C00E-4FD4CBB3DDE1}"/>
-              </a:ext>
-            </a:extLst>
-          </p:cNvPr>
-          <p:cNvSpPr/>
-          <p:nvPr/>
-        </p:nvSpPr>
-        <p:spPr>
-          <a:xfrm>
-            <a:off x="753236" y="16554616"/>
-            <a:ext cx="34490539" cy="425263"/>
-          </a:xfrm>
-          <a:prstGeom prst="rect">
-            <a:avLst/>
-          </a:prstGeom>
-        </p:spPr>
-        <p:style>
-          <a:lnRef idx="2">
-            <a:schemeClr val="accent1">
-              <a:shade val="15000"/>
-            </a:schemeClr>
-          </a:lnRef>
-          <a:fillRef idx="1">
-            <a:schemeClr val="accent1"/>
-          </a:fillRef>
-          <a:effectRef idx="0">
-            <a:schemeClr val="accent1"/>
-          </a:effectRef>
-          <a:fontRef idx="minor">
-            <a:schemeClr val="lt1"/>
-          </a:fontRef>
-        </p:style>
-        <p:txBody>
-          <a:bodyPr rtlCol="0" anchor="ctr"/>
-          <a:lstStyle/>
-          <a:p>
-            <a:pPr algn="ctr"/>
-            <a:endParaRPr lang="de-DE" dirty="0"/>
-          </a:p>
-        </p:txBody>
-      </p:sp>
       <p:cxnSp>
         <p:nvCxnSpPr>
           <p:cNvPr id="181" name="Gerade Verbindung mit Pfeil 180">
@@ -15986,11 +15603,9 @@
           <a:bodyPr rtlCol="0" anchor="ctr"/>
           <a:lstStyle/>
           <a:p>
-            <a:pPr algn="ctr" defTabSz="914411">
-              <a:defRPr/>
-            </a:pPr>
-            <a:r>
-              <a:rPr lang="en-US" sz="1050" kern="0" noProof="0" dirty="0">
+            <a:pPr algn="ctr" defTabSz="914411"/>
+            <a:r>
+              <a:rPr lang="en-US" sz="1050" kern="0">
                 <a:solidFill>
                   <a:prstClr val="white"/>
                 </a:solidFill>
@@ -15998,6 +15613,12 @@
               </a:rPr>
               <a:t>R</a:t>
             </a:r>
+            <a:endParaRPr lang="en-US" sz="1050" kern="0" dirty="0">
+              <a:solidFill>
+                <a:prstClr val="white"/>
+              </a:solidFill>
+              <a:latin typeface="Calibri" panose="020F0502020204030204"/>
+            </a:endParaRPr>
           </a:p>
         </p:txBody>
       </p:sp>
@@ -16039,14 +15660,20 @@
           <a:p>
             <a:pPr defTabSz="914411"/>
             <a:r>
-              <a:rPr lang="en-US" sz="800" kern="0" noProof="0" dirty="0">
-                <a:solidFill>
-                  <a:prstClr val="black"/>
-                </a:solidFill>
-                <a:latin typeface="Calibri" panose="020F0502020204030204"/>
-              </a:rPr>
-              <a:t>local-id</a:t>
-            </a:r>
+              <a:rPr lang="en-US" sz="800" kern="0">
+                <a:solidFill>
+                  <a:prstClr val="black"/>
+                </a:solidFill>
+                <a:latin typeface="Calibri" panose="020F0502020204030204"/>
+              </a:rPr>
+              <a:t>local-id=tcp-link-chain</a:t>
+            </a:r>
+            <a:endParaRPr lang="en-US" sz="800" kern="0" dirty="0">
+              <a:solidFill>
+                <a:prstClr val="black"/>
+              </a:solidFill>
+              <a:latin typeface="Calibri" panose="020F0502020204030204"/>
+            </a:endParaRPr>
           </a:p>
         </p:txBody>
       </p:sp>
@@ -16249,7 +15876,7 @@
         <p:spPr>
           <a:xfrm>
             <a:off x="9802648" y="4017270"/>
-            <a:ext cx="21904772" cy="4843539"/>
+            <a:ext cx="22500199" cy="4843539"/>
           </a:xfrm>
           <a:prstGeom prst="straightConnector1">
             <a:avLst/>
@@ -16302,6 +15929,644 @@
           <a:effectLst/>
         </p:spPr>
       </p:cxnSp>
+      <p:sp>
+        <p:nvSpPr>
+          <p:cNvPr id="7" name="Abgerundetes Rechteck 88">
+            <a:extLst>
+              <a:ext uri="{FF2B5EF4-FFF2-40B4-BE49-F238E27FC236}">
+                <a16:creationId xmlns:a16="http://schemas.microsoft.com/office/drawing/2014/main" id="{055E24D7-663D-4B93-8A5D-665472C9861F}"/>
+              </a:ext>
+            </a:extLst>
+          </p:cNvPr>
+          <p:cNvSpPr/>
+          <p:nvPr/>
+        </p:nvSpPr>
+        <p:spPr>
+          <a:xfrm>
+            <a:off x="30383577" y="10824294"/>
+            <a:ext cx="1161453" cy="445572"/>
+          </a:xfrm>
+          <a:prstGeom prst="roundRect">
+            <a:avLst/>
+          </a:prstGeom>
+          <a:solidFill>
+            <a:srgbClr val="4472C4">
+              <a:lumMod val="60000"/>
+              <a:lumOff val="40000"/>
+            </a:srgbClr>
+          </a:solidFill>
+          <a:ln w="12700" cap="flat" cmpd="sng" algn="ctr">
+            <a:solidFill>
+              <a:srgbClr val="4472C4">
+                <a:lumMod val="75000"/>
+              </a:srgbClr>
+            </a:solidFill>
+            <a:prstDash val="solid"/>
+            <a:miter lim="800000"/>
+          </a:ln>
+          <a:effectLst>
+            <a:outerShdw blurRad="50800" dist="38100" dir="2700000" algn="tl" rotWithShape="0">
+              <a:prstClr val="black">
+                <a:alpha val="40000"/>
+              </a:prstClr>
+            </a:outerShdw>
+          </a:effectLst>
+        </p:spPr>
+        <p:txBody>
+          <a:bodyPr rtlCol="0" anchor="ctr"/>
+          <a:lstStyle/>
+          <a:p>
+            <a:pPr algn="ctr" defTabSz="914411"/>
+            <a:r>
+              <a:rPr lang="en-US" sz="1050" kern="0">
+                <a:solidFill>
+                  <a:prstClr val="white"/>
+                </a:solidFill>
+                <a:latin typeface="Calibri" panose="020F0502020204030204"/>
+              </a:rPr>
+              <a:t>HttpServer</a:t>
+            </a:r>
+            <a:r>
+              <a:rPr lang="en-US" sz="1050" kern="0" dirty="0">
+                <a:solidFill>
+                  <a:prstClr val="white"/>
+                </a:solidFill>
+                <a:latin typeface="Calibri" panose="020F0502020204030204"/>
+              </a:rPr>
+              <a:t> [*]</a:t>
+            </a:r>
+          </a:p>
+        </p:txBody>
+      </p:sp>
+      <p:sp>
+        <p:nvSpPr>
+          <p:cNvPr id="16" name="Rechteck 15">
+            <a:extLst>
+              <a:ext uri="{FF2B5EF4-FFF2-40B4-BE49-F238E27FC236}">
+                <a16:creationId xmlns:a16="http://schemas.microsoft.com/office/drawing/2014/main" id="{87D52961-7EE1-DE23-18E0-77D5DEBA9B7F}"/>
+              </a:ext>
+            </a:extLst>
+          </p:cNvPr>
+          <p:cNvSpPr/>
+          <p:nvPr/>
+        </p:nvSpPr>
+        <p:spPr>
+          <a:xfrm>
+            <a:off x="28132118" y="10824293"/>
+            <a:ext cx="1815783" cy="445572"/>
+          </a:xfrm>
+          <a:prstGeom prst="rect">
+            <a:avLst/>
+          </a:prstGeom>
+          <a:solidFill>
+            <a:sysClr val="window" lastClr="FFFFFF"/>
+          </a:solidFill>
+          <a:ln w="12700" cap="flat" cmpd="sng" algn="ctr">
+            <a:solidFill>
+              <a:srgbClr val="A5A5A5"/>
+            </a:solidFill>
+            <a:prstDash val="solid"/>
+            <a:miter lim="800000"/>
+          </a:ln>
+          <a:effectLst/>
+        </p:spPr>
+        <p:txBody>
+          <a:bodyPr lIns="36000" tIns="36000" rIns="36000" bIns="36000" rtlCol="0" anchor="t"/>
+          <a:lstStyle/>
+          <a:p>
+            <a:pPr defTabSz="914411"/>
+            <a:r>
+              <a:rPr lang="en-US" sz="800" kern="0" dirty="0">
+                <a:solidFill>
+                  <a:prstClr val="black"/>
+                </a:solidFill>
+                <a:latin typeface="Calibri" panose="020F0502020204030204"/>
+              </a:rPr>
+              <a:t>local-id=[</a:t>
+            </a:r>
+            <a:r>
+              <a:rPr lang="en-US" sz="800" kern="0" dirty="0" err="1">
+                <a:solidFill>
+                  <a:prstClr val="black"/>
+                </a:solidFill>
+                <a:latin typeface="Calibri" panose="020F0502020204030204"/>
+              </a:rPr>
+              <a:t>applicationName</a:t>
+            </a:r>
+            <a:r>
+              <a:rPr lang="en-US" sz="800" kern="0" dirty="0">
+                <a:solidFill>
+                  <a:prstClr val="black"/>
+                </a:solidFill>
+                <a:latin typeface="Calibri" panose="020F0502020204030204"/>
+              </a:rPr>
+              <a:t>]</a:t>
+            </a:r>
+          </a:p>
+          <a:p>
+            <a:pPr defTabSz="914411"/>
+            <a:r>
+              <a:rPr lang="en-US" sz="800" kern="0" dirty="0" err="1">
+                <a:solidFill>
+                  <a:prstClr val="black"/>
+                </a:solidFill>
+                <a:latin typeface="Calibri" panose="020F0502020204030204"/>
+              </a:rPr>
+              <a:t>httpUserName</a:t>
+            </a:r>
+            <a:r>
+              <a:rPr lang="en-US" sz="800" kern="0" dirty="0">
+                <a:solidFill>
+                  <a:prstClr val="black"/>
+                </a:solidFill>
+                <a:latin typeface="Calibri" panose="020F0502020204030204"/>
+              </a:rPr>
+              <a:t>=[</a:t>
+            </a:r>
+            <a:r>
+              <a:rPr lang="en-US" sz="800" kern="0" dirty="0" err="1">
+                <a:solidFill>
+                  <a:prstClr val="black"/>
+                </a:solidFill>
+                <a:latin typeface="Calibri" panose="020F0502020204030204"/>
+              </a:rPr>
+              <a:t>applicationName</a:t>
+            </a:r>
+            <a:r>
+              <a:rPr lang="en-US" sz="800" kern="0" dirty="0">
+                <a:solidFill>
+                  <a:prstClr val="black"/>
+                </a:solidFill>
+                <a:latin typeface="Calibri" panose="020F0502020204030204"/>
+              </a:rPr>
+              <a:t>]</a:t>
+            </a:r>
+          </a:p>
+          <a:p>
+            <a:pPr defTabSz="914411"/>
+            <a:r>
+              <a:rPr lang="en-US" sz="800" kern="0" dirty="0" err="1">
+                <a:solidFill>
+                  <a:prstClr val="black"/>
+                </a:solidFill>
+                <a:latin typeface="Calibri" panose="020F0502020204030204"/>
+              </a:rPr>
+              <a:t>httpPassword</a:t>
+            </a:r>
+            <a:endParaRPr lang="en-US" sz="800" kern="0" dirty="0">
+              <a:solidFill>
+                <a:prstClr val="black"/>
+              </a:solidFill>
+              <a:latin typeface="Calibri" panose="020F0502020204030204"/>
+            </a:endParaRPr>
+          </a:p>
+          <a:p>
+            <a:pPr defTabSz="914411"/>
+            <a:endParaRPr lang="en-US" sz="800" kern="0" dirty="0">
+              <a:solidFill>
+                <a:prstClr val="black"/>
+              </a:solidFill>
+              <a:latin typeface="Calibri" panose="020F0502020204030204"/>
+            </a:endParaRPr>
+          </a:p>
+        </p:txBody>
+      </p:sp>
+      <p:sp>
+        <p:nvSpPr>
+          <p:cNvPr id="104" name="Abgerundetes Rechteck 2">
+            <a:extLst>
+              <a:ext uri="{FF2B5EF4-FFF2-40B4-BE49-F238E27FC236}">
+                <a16:creationId xmlns:a16="http://schemas.microsoft.com/office/drawing/2014/main" id="{6217AA5C-B11D-EE21-8D8A-F03AF335DB59}"/>
+              </a:ext>
+            </a:extLst>
+          </p:cNvPr>
+          <p:cNvSpPr/>
+          <p:nvPr/>
+        </p:nvSpPr>
+        <p:spPr>
+          <a:xfrm>
+            <a:off x="32035629" y="9698572"/>
+            <a:ext cx="537299" cy="445572"/>
+          </a:xfrm>
+          <a:prstGeom prst="roundRect">
+            <a:avLst/>
+          </a:prstGeom>
+          <a:solidFill>
+            <a:sysClr val="window" lastClr="FFFFFF">
+              <a:lumMod val="65000"/>
+            </a:sysClr>
+          </a:solidFill>
+          <a:ln w="12700" cap="flat" cmpd="sng" algn="ctr">
+            <a:solidFill>
+              <a:sysClr val="window" lastClr="FFFFFF">
+                <a:lumMod val="50000"/>
+              </a:sysClr>
+            </a:solidFill>
+            <a:prstDash val="solid"/>
+            <a:miter lim="800000"/>
+          </a:ln>
+          <a:effectLst>
+            <a:outerShdw blurRad="50800" dist="38100" dir="2700000" algn="tl" rotWithShape="0">
+              <a:prstClr val="black">
+                <a:alpha val="40000"/>
+              </a:prstClr>
+            </a:outerShdw>
+          </a:effectLst>
+        </p:spPr>
+        <p:txBody>
+          <a:bodyPr rtlCol="0" anchor="ctr"/>
+          <a:lstStyle/>
+          <a:p>
+            <a:pPr algn="ctr" defTabSz="914411">
+              <a:defRPr/>
+            </a:pPr>
+            <a:r>
+              <a:rPr lang="en-US" sz="1050" kern="0" noProof="0" dirty="0">
+                <a:solidFill>
+                  <a:prstClr val="white"/>
+                </a:solidFill>
+                <a:latin typeface="Calibri" panose="020F0502020204030204"/>
+              </a:rPr>
+              <a:t>LTP</a:t>
+            </a:r>
+          </a:p>
+        </p:txBody>
+      </p:sp>
+      <p:sp>
+        <p:nvSpPr>
+          <p:cNvPr id="107" name="Abgerundetes Rechteck 3">
+            <a:extLst>
+              <a:ext uri="{FF2B5EF4-FFF2-40B4-BE49-F238E27FC236}">
+                <a16:creationId xmlns:a16="http://schemas.microsoft.com/office/drawing/2014/main" id="{7AD29EB0-0652-854A-42EF-EA0FC3F6F31A}"/>
+              </a:ext>
+            </a:extLst>
+          </p:cNvPr>
+          <p:cNvSpPr/>
+          <p:nvPr/>
+        </p:nvSpPr>
+        <p:spPr>
+          <a:xfrm>
+            <a:off x="32035629" y="10601508"/>
+            <a:ext cx="537299" cy="445572"/>
+          </a:xfrm>
+          <a:prstGeom prst="roundRect">
+            <a:avLst/>
+          </a:prstGeom>
+          <a:solidFill>
+            <a:sysClr val="window" lastClr="FFFFFF">
+              <a:lumMod val="65000"/>
+            </a:sysClr>
+          </a:solidFill>
+          <a:ln w="12700" cap="flat" cmpd="sng" algn="ctr">
+            <a:solidFill>
+              <a:sysClr val="window" lastClr="FFFFFF">
+                <a:lumMod val="50000"/>
+              </a:sysClr>
+            </a:solidFill>
+            <a:prstDash val="solid"/>
+            <a:miter lim="800000"/>
+          </a:ln>
+          <a:effectLst>
+            <a:outerShdw blurRad="50800" dist="38100" dir="2700000" algn="tl" rotWithShape="0">
+              <a:prstClr val="black">
+                <a:alpha val="40000"/>
+              </a:prstClr>
+            </a:outerShdw>
+          </a:effectLst>
+        </p:spPr>
+        <p:txBody>
+          <a:bodyPr rtlCol="0" anchor="ctr"/>
+          <a:lstStyle/>
+          <a:p>
+            <a:pPr algn="ctr" defTabSz="914411">
+              <a:defRPr/>
+            </a:pPr>
+            <a:r>
+              <a:rPr lang="en-US" sz="1050" kern="0" noProof="0" dirty="0">
+                <a:solidFill>
+                  <a:prstClr val="white"/>
+                </a:solidFill>
+                <a:latin typeface="Calibri" panose="020F0502020204030204"/>
+              </a:rPr>
+              <a:t>LP</a:t>
+            </a:r>
+          </a:p>
+        </p:txBody>
+      </p:sp>
+      <p:cxnSp>
+        <p:nvCxnSpPr>
+          <p:cNvPr id="114" name="Gerade Verbindung mit Pfeil 113">
+            <a:extLst>
+              <a:ext uri="{FF2B5EF4-FFF2-40B4-BE49-F238E27FC236}">
+                <a16:creationId xmlns:a16="http://schemas.microsoft.com/office/drawing/2014/main" id="{4E464824-8BB1-584B-1EE9-75927F098C9A}"/>
+              </a:ext>
+            </a:extLst>
+          </p:cNvPr>
+          <p:cNvCxnSpPr>
+            <a:cxnSpLocks/>
+            <a:stCxn id="24" idx="2"/>
+            <a:endCxn id="104" idx="0"/>
+          </p:cNvCxnSpPr>
+          <p:nvPr/>
+        </p:nvCxnSpPr>
+        <p:spPr>
+          <a:xfrm>
+            <a:off x="32302847" y="9306381"/>
+            <a:ext cx="1432" cy="392191"/>
+          </a:xfrm>
+          <a:prstGeom prst="straightConnector1">
+            <a:avLst/>
+          </a:prstGeom>
+          <a:noFill/>
+          <a:ln w="6350" cap="flat" cmpd="sng" algn="ctr">
+            <a:solidFill>
+              <a:srgbClr val="5B9BD5"/>
+            </a:solidFill>
+            <a:prstDash val="solid"/>
+            <a:miter lim="800000"/>
+            <a:tailEnd type="triangle"/>
+          </a:ln>
+          <a:effectLst/>
+        </p:spPr>
+      </p:cxnSp>
+      <p:cxnSp>
+        <p:nvCxnSpPr>
+          <p:cNvPr id="122" name="Gerade Verbindung mit Pfeil 121">
+            <a:extLst>
+              <a:ext uri="{FF2B5EF4-FFF2-40B4-BE49-F238E27FC236}">
+                <a16:creationId xmlns:a16="http://schemas.microsoft.com/office/drawing/2014/main" id="{90AB2440-14D8-D7AA-360C-E7625975A8DE}"/>
+              </a:ext>
+            </a:extLst>
+          </p:cNvPr>
+          <p:cNvCxnSpPr>
+            <a:cxnSpLocks/>
+            <a:stCxn id="104" idx="2"/>
+            <a:endCxn id="107" idx="0"/>
+          </p:cNvCxnSpPr>
+          <p:nvPr/>
+        </p:nvCxnSpPr>
+        <p:spPr>
+          <a:xfrm>
+            <a:off x="32304279" y="10144144"/>
+            <a:ext cx="0" cy="457364"/>
+          </a:xfrm>
+          <a:prstGeom prst="straightConnector1">
+            <a:avLst/>
+          </a:prstGeom>
+          <a:noFill/>
+          <a:ln w="6350" cap="flat" cmpd="sng" algn="ctr">
+            <a:solidFill>
+              <a:srgbClr val="5B9BD5"/>
+            </a:solidFill>
+            <a:prstDash val="solid"/>
+            <a:miter lim="800000"/>
+            <a:tailEnd type="triangle"/>
+          </a:ln>
+          <a:effectLst/>
+        </p:spPr>
+      </p:cxnSp>
+      <p:cxnSp>
+        <p:nvCxnSpPr>
+          <p:cNvPr id="132" name="Gerade Verbindung mit Pfeil 131">
+            <a:extLst>
+              <a:ext uri="{FF2B5EF4-FFF2-40B4-BE49-F238E27FC236}">
+                <a16:creationId xmlns:a16="http://schemas.microsoft.com/office/drawing/2014/main" id="{7585A1CA-9285-57B4-AC83-883A70A8ADCE}"/>
+              </a:ext>
+            </a:extLst>
+          </p:cNvPr>
+          <p:cNvCxnSpPr>
+            <a:cxnSpLocks/>
+            <a:stCxn id="104" idx="1"/>
+            <a:endCxn id="133" idx="3"/>
+          </p:cNvCxnSpPr>
+          <p:nvPr/>
+        </p:nvCxnSpPr>
+        <p:spPr>
+          <a:xfrm flipH="1" flipV="1">
+            <a:off x="31341258" y="9915728"/>
+            <a:ext cx="694371" cy="5630"/>
+          </a:xfrm>
+          <a:prstGeom prst="straightConnector1">
+            <a:avLst/>
+          </a:prstGeom>
+          <a:noFill/>
+          <a:ln w="6350" cap="flat" cmpd="sng" algn="ctr">
+            <a:solidFill>
+              <a:srgbClr val="5B9BD5"/>
+            </a:solidFill>
+            <a:prstDash val="solid"/>
+            <a:miter lim="800000"/>
+            <a:tailEnd type="triangle"/>
+          </a:ln>
+          <a:effectLst/>
+        </p:spPr>
+      </p:cxnSp>
+      <p:sp>
+        <p:nvSpPr>
+          <p:cNvPr id="133" name="Rechteck 132">
+            <a:extLst>
+              <a:ext uri="{FF2B5EF4-FFF2-40B4-BE49-F238E27FC236}">
+                <a16:creationId xmlns:a16="http://schemas.microsoft.com/office/drawing/2014/main" id="{28F3EEA8-5964-A8AA-2D18-98327179810D}"/>
+              </a:ext>
+            </a:extLst>
+          </p:cNvPr>
+          <p:cNvSpPr/>
+          <p:nvPr/>
+        </p:nvSpPr>
+        <p:spPr>
+          <a:xfrm>
+            <a:off x="29432427" y="9769908"/>
+            <a:ext cx="1908831" cy="291640"/>
+          </a:xfrm>
+          <a:prstGeom prst="rect">
+            <a:avLst/>
+          </a:prstGeom>
+          <a:solidFill>
+            <a:sysClr val="window" lastClr="FFFFFF"/>
+          </a:solidFill>
+          <a:ln w="12700" cap="flat" cmpd="sng" algn="ctr">
+            <a:solidFill>
+              <a:srgbClr val="A5A5A5"/>
+            </a:solidFill>
+            <a:prstDash val="solid"/>
+            <a:miter lim="800000"/>
+          </a:ln>
+          <a:effectLst/>
+        </p:spPr>
+        <p:txBody>
+          <a:bodyPr lIns="36000" tIns="36000" rIns="36000" bIns="36000" rtlCol="0" anchor="t"/>
+          <a:lstStyle/>
+          <a:p>
+            <a:pPr defTabSz="914411"/>
+            <a:r>
+              <a:rPr lang="en-US" sz="800" kern="0" noProof="0" dirty="0">
+                <a:solidFill>
+                  <a:prstClr val="black"/>
+                </a:solidFill>
+                <a:latin typeface="Calibri" panose="020F0502020204030204"/>
+              </a:rPr>
+              <a:t>local-id=controller-manager</a:t>
+            </a:r>
+          </a:p>
+        </p:txBody>
+      </p:sp>
+      <p:cxnSp>
+        <p:nvCxnSpPr>
+          <p:cNvPr id="145" name="Verbinder: gewinkelt 144">
+            <a:extLst>
+              <a:ext uri="{FF2B5EF4-FFF2-40B4-BE49-F238E27FC236}">
+                <a16:creationId xmlns:a16="http://schemas.microsoft.com/office/drawing/2014/main" id="{98A8010B-843A-5167-086C-829D211E6A03}"/>
+              </a:ext>
+            </a:extLst>
+          </p:cNvPr>
+          <p:cNvCxnSpPr>
+            <a:cxnSpLocks/>
+            <a:stCxn id="24" idx="2"/>
+            <a:endCxn id="65" idx="0"/>
+          </p:cNvCxnSpPr>
+          <p:nvPr/>
+        </p:nvCxnSpPr>
+        <p:spPr>
+          <a:xfrm rot="16200000" flipH="1">
+            <a:off x="31274916" y="10334311"/>
+            <a:ext cx="2555918" cy="500057"/>
+          </a:xfrm>
+          <a:prstGeom prst="bentConnector3">
+            <a:avLst>
+              <a:gd name="adj1" fmla="val 5653"/>
+            </a:avLst>
+          </a:prstGeom>
+          <a:noFill/>
+          <a:ln w="6350" cap="flat" cmpd="sng" algn="ctr">
+            <a:solidFill>
+              <a:srgbClr val="5B9BD5"/>
+            </a:solidFill>
+            <a:prstDash val="solid"/>
+            <a:miter lim="800000"/>
+            <a:tailEnd type="triangle"/>
+          </a:ln>
+          <a:effectLst/>
+        </p:spPr>
+      </p:cxnSp>
+      <p:cxnSp>
+        <p:nvCxnSpPr>
+          <p:cNvPr id="158" name="Gerade Verbindung mit Pfeil 157">
+            <a:extLst>
+              <a:ext uri="{FF2B5EF4-FFF2-40B4-BE49-F238E27FC236}">
+                <a16:creationId xmlns:a16="http://schemas.microsoft.com/office/drawing/2014/main" id="{14973330-68FD-29B1-66EA-E6EB75F5EC5D}"/>
+              </a:ext>
+            </a:extLst>
+          </p:cNvPr>
+          <p:cNvCxnSpPr>
+            <a:cxnSpLocks/>
+            <a:stCxn id="7" idx="3"/>
+            <a:endCxn id="107" idx="1"/>
+          </p:cNvCxnSpPr>
+          <p:nvPr/>
+        </p:nvCxnSpPr>
+        <p:spPr>
+          <a:xfrm flipV="1">
+            <a:off x="31545030" y="10824294"/>
+            <a:ext cx="490599" cy="222786"/>
+          </a:xfrm>
+          <a:prstGeom prst="straightConnector1">
+            <a:avLst/>
+          </a:prstGeom>
+          <a:noFill/>
+          <a:ln w="6350" cap="flat" cmpd="sng" algn="ctr">
+            <a:solidFill>
+              <a:srgbClr val="5B9BD5"/>
+            </a:solidFill>
+            <a:prstDash val="dash"/>
+            <a:miter lim="800000"/>
+            <a:tailEnd type="triangle"/>
+          </a:ln>
+          <a:effectLst/>
+        </p:spPr>
+      </p:cxnSp>
+      <p:cxnSp>
+        <p:nvCxnSpPr>
+          <p:cNvPr id="162" name="Gerade Verbindung mit Pfeil 161">
+            <a:extLst>
+              <a:ext uri="{FF2B5EF4-FFF2-40B4-BE49-F238E27FC236}">
+                <a16:creationId xmlns:a16="http://schemas.microsoft.com/office/drawing/2014/main" id="{1D3BD0E6-982C-160A-CD25-EF95AADDA086}"/>
+              </a:ext>
+            </a:extLst>
+          </p:cNvPr>
+          <p:cNvCxnSpPr>
+            <a:cxnSpLocks/>
+            <a:stCxn id="7" idx="1"/>
+            <a:endCxn id="16" idx="3"/>
+          </p:cNvCxnSpPr>
+          <p:nvPr/>
+        </p:nvCxnSpPr>
+        <p:spPr>
+          <a:xfrm flipH="1" flipV="1">
+            <a:off x="29947901" y="11047079"/>
+            <a:ext cx="435676" cy="1"/>
+          </a:xfrm>
+          <a:prstGeom prst="straightConnector1">
+            <a:avLst/>
+          </a:prstGeom>
+          <a:noFill/>
+          <a:ln w="6350" cap="flat" cmpd="sng" algn="ctr">
+            <a:solidFill>
+              <a:srgbClr val="5B9BD5"/>
+            </a:solidFill>
+            <a:prstDash val="solid"/>
+            <a:miter lim="800000"/>
+            <a:tailEnd type="triangle"/>
+          </a:ln>
+          <a:effectLst/>
+        </p:spPr>
+      </p:cxnSp>
+      <p:sp>
+        <p:nvSpPr>
+          <p:cNvPr id="243" name="Ellipse 242">
+            <a:extLst>
+              <a:ext uri="{FF2B5EF4-FFF2-40B4-BE49-F238E27FC236}">
+                <a16:creationId xmlns:a16="http://schemas.microsoft.com/office/drawing/2014/main" id="{8A62DB68-E572-F9C6-FA24-54502C6CE2FF}"/>
+              </a:ext>
+            </a:extLst>
+          </p:cNvPr>
+          <p:cNvSpPr/>
+          <p:nvPr/>
+        </p:nvSpPr>
+        <p:spPr>
+          <a:xfrm>
+            <a:off x="30445003" y="12778269"/>
+            <a:ext cx="45719" cy="45719"/>
+          </a:xfrm>
+          <a:prstGeom prst="ellipse">
+            <a:avLst/>
+          </a:prstGeom>
+          <a:solidFill>
+            <a:srgbClr val="4472C4">
+              <a:lumMod val="60000"/>
+              <a:lumOff val="40000"/>
+            </a:srgbClr>
+          </a:solidFill>
+          <a:ln w="12700" cap="flat" cmpd="sng" algn="ctr">
+            <a:noFill/>
+            <a:prstDash val="solid"/>
+            <a:miter lim="800000"/>
+          </a:ln>
+          <a:effectLst/>
+        </p:spPr>
+        <p:txBody>
+          <a:bodyPr rtlCol="0" anchor="ctr"/>
+          <a:lstStyle/>
+          <a:p>
+            <a:pPr algn="ctr" defTabSz="914411"/>
+            <a:endParaRPr lang="en-US" sz="1050" kern="0" noProof="0" dirty="0">
+              <a:solidFill>
+                <a:prstClr val="white"/>
+              </a:solidFill>
+              <a:latin typeface="Calibri" panose="020F0502020204030204"/>
+            </a:endParaRPr>
+          </a:p>
+        </p:txBody>
+      </p:sp>
     </p:spTree>
     <p:extLst>
       <p:ext uri="{BB962C8B-B14F-4D97-AF65-F5344CB8AC3E}">
@@ -37074,6 +37339,12 @@
 </file>
 
 <file path=ppt/tags/tag1.xml><?xml version="1.0" encoding="utf-8"?>
+<p:tagLst xmlns:a="http://schemas.openxmlformats.org/drawingml/2006/main" xmlns:r="http://schemas.openxmlformats.org/officeDocument/2006/relationships" xmlns:p="http://schemas.openxmlformats.org/presentationml/2006/main">
+  <p:tag name="THINKCELLSHAPEDONOTDELETE" val="thinkcellActiveDocDoNotDelete"/>
+</p:tagLst>
+</file>
+
+<file path=ppt/tags/tag2.xml><?xml version="1.0" encoding="utf-8"?>
 <p:tagLst xmlns:a="http://schemas.openxmlformats.org/drawingml/2006/main" xmlns:r="http://schemas.openxmlformats.org/officeDocument/2006/relationships" xmlns:p="http://schemas.openxmlformats.org/presentationml/2006/main">
   <p:tag name="THINKCELLSHAPEDONOTDELETE" val="thinkcellActiveDocDoNotDelete"/>
 </p:tagLst>

</xml_diff>